<commit_message>
Apresentação - quase pronta
Falta mais umas duas ferramentas
</commit_message>
<xml_diff>
--- a/Trab Eng Software/Projeto sobre Testes/Teste de Software apoiado por ferramentas livres.pptx
+++ b/Trab Eng Software/Projeto sobre Testes/Teste de Software apoiado por ferramentas livres.pptx
@@ -5,10 +5,10 @@
     <p:sldMasterId id="2147483660" r:id="rId1"/>
   </p:sldMasterIdLst>
   <p:notesMasterIdLst>
-    <p:notesMasterId r:id="rId12"/>
+    <p:notesMasterId r:id="rId26"/>
   </p:notesMasterIdLst>
   <p:handoutMasterIdLst>
-    <p:handoutMasterId r:id="rId13"/>
+    <p:handoutMasterId r:id="rId27"/>
   </p:handoutMasterIdLst>
   <p:sldIdLst>
     <p:sldId id="256" r:id="rId2"/>
@@ -20,7 +20,21 @@
     <p:sldId id="263" r:id="rId8"/>
     <p:sldId id="264" r:id="rId9"/>
     <p:sldId id="265" r:id="rId10"/>
-    <p:sldId id="262" r:id="rId11"/>
+    <p:sldId id="266" r:id="rId11"/>
+    <p:sldId id="267" r:id="rId12"/>
+    <p:sldId id="268" r:id="rId13"/>
+    <p:sldId id="269" r:id="rId14"/>
+    <p:sldId id="270" r:id="rId15"/>
+    <p:sldId id="271" r:id="rId16"/>
+    <p:sldId id="274" r:id="rId17"/>
+    <p:sldId id="275" r:id="rId18"/>
+    <p:sldId id="276" r:id="rId19"/>
+    <p:sldId id="277" r:id="rId20"/>
+    <p:sldId id="278" r:id="rId21"/>
+    <p:sldId id="279" r:id="rId22"/>
+    <p:sldId id="262" r:id="rId23"/>
+    <p:sldId id="273" r:id="rId24"/>
+    <p:sldId id="272" r:id="rId25"/>
   </p:sldIdLst>
   <p:sldSz cx="9144000" cy="6858000" type="screen4x3"/>
   <p:notesSz cx="6858000" cy="9144000"/>
@@ -204,7 +218,8 @@
           <a:p>
             <a:fld id="{8ECA350A-9120-4740-A09A-E05B3F258FEE}" type="datetimeFigureOut">
               <a:rPr lang="pt-BR" smtClean="0"/>
-              <a:t>06/11/2014</a:t>
+              <a:pPr/>
+              <a:t>07/11/2014</a:t>
             </a:fld>
             <a:endParaRPr lang="pt-BR"/>
           </a:p>
@@ -270,6 +285,7 @@
           <a:p>
             <a:fld id="{DC0B8DD6-025F-4AA7-837B-E185A747C8CC}" type="slidenum">
               <a:rPr lang="pt-BR" smtClean="0"/>
+              <a:pPr/>
               <a:t>‹#›</a:t>
             </a:fld>
             <a:endParaRPr lang="pt-BR"/>
@@ -365,7 +381,8 @@
           <a:p>
             <a:fld id="{500FE4AF-9B9E-4022-9096-D6F2294A996F}" type="datetimeFigureOut">
               <a:rPr lang="pt-BR" smtClean="0"/>
-              <a:t>06/11/2014</a:t>
+              <a:pPr/>
+              <a:t>07/11/2014</a:t>
             </a:fld>
             <a:endParaRPr lang="pt-BR"/>
           </a:p>
@@ -526,6 +543,7 @@
           <a:p>
             <a:fld id="{C3C02C3A-BECB-4F85-AE55-DF7E9B45DCC3}" type="slidenum">
               <a:rPr lang="pt-BR" smtClean="0"/>
+              <a:pPr/>
               <a:t>‹#›</a:t>
             </a:fld>
             <a:endParaRPr lang="pt-BR"/>
@@ -698,6 +716,7 @@
           <a:p>
             <a:fld id="{C3C02C3A-BECB-4F85-AE55-DF7E9B45DCC3}" type="slidenum">
               <a:rPr lang="pt-BR" smtClean="0"/>
+              <a:pPr/>
               <a:t>1</a:t>
             </a:fld>
             <a:endParaRPr lang="pt-BR"/>
@@ -779,6 +798,7 @@
           <a:p>
             <a:fld id="{C3C02C3A-BECB-4F85-AE55-DF7E9B45DCC3}" type="slidenum">
               <a:rPr lang="pt-BR" smtClean="0"/>
+              <a:pPr/>
               <a:t>2</a:t>
             </a:fld>
             <a:endParaRPr lang="pt-BR"/>
@@ -927,7 +947,8 @@
           <a:p>
             <a:fld id="{3D5EB6CE-51EF-4243-A18D-2C9725AAAA2A}" type="datetime1">
               <a:rPr lang="pt-BR" smtClean="0"/>
-              <a:t>06/11/2014</a:t>
+              <a:pPr/>
+              <a:t>07/11/2014</a:t>
             </a:fld>
             <a:endParaRPr lang="pt-BR"/>
           </a:p>
@@ -973,6 +994,7 @@
           <a:p>
             <a:fld id="{3D12642F-FC9C-42CD-9EE4-23EF85AE02E3}" type="slidenum">
               <a:rPr lang="pt-BR" smtClean="0"/>
+              <a:pPr/>
               <a:t>‹#›</a:t>
             </a:fld>
             <a:endParaRPr lang="pt-BR"/>
@@ -1240,7 +1262,8 @@
           <a:p>
             <a:fld id="{45DB4A68-9BF5-48A3-BB34-4F17C127FE2E}" type="datetime1">
               <a:rPr lang="pt-BR" smtClean="0"/>
-              <a:t>06/11/2014</a:t>
+              <a:pPr/>
+              <a:t>07/11/2014</a:t>
             </a:fld>
             <a:endParaRPr lang="pt-BR"/>
           </a:p>
@@ -1286,6 +1309,7 @@
           <a:p>
             <a:fld id="{3D12642F-FC9C-42CD-9EE4-23EF85AE02E3}" type="slidenum">
               <a:rPr lang="pt-BR" smtClean="0"/>
+              <a:pPr/>
               <a:t>‹#›</a:t>
             </a:fld>
             <a:endParaRPr lang="pt-BR"/>
@@ -1425,7 +1449,8 @@
           <a:p>
             <a:fld id="{092747C0-4693-4CE5-8ED6-A9DB658AD036}" type="datetime1">
               <a:rPr lang="pt-BR" smtClean="0"/>
-              <a:t>06/11/2014</a:t>
+              <a:pPr/>
+              <a:t>07/11/2014</a:t>
             </a:fld>
             <a:endParaRPr lang="pt-BR"/>
           </a:p>
@@ -1471,6 +1496,7 @@
           <a:p>
             <a:fld id="{3D12642F-FC9C-42CD-9EE4-23EF85AE02E3}" type="slidenum">
               <a:rPr lang="pt-BR" smtClean="0"/>
+              <a:pPr/>
               <a:t>‹#›</a:t>
             </a:fld>
             <a:endParaRPr lang="pt-BR"/>
@@ -1600,7 +1626,8 @@
           <a:p>
             <a:fld id="{3D031BF3-93E8-4A9B-A1BB-2A15A3522158}" type="datetime1">
               <a:rPr lang="pt-BR" smtClean="0"/>
-              <a:t>06/11/2014</a:t>
+              <a:pPr/>
+              <a:t>07/11/2014</a:t>
             </a:fld>
             <a:endParaRPr lang="pt-BR"/>
           </a:p>
@@ -1646,6 +1673,7 @@
           <a:p>
             <a:fld id="{3D12642F-FC9C-42CD-9EE4-23EF85AE02E3}" type="slidenum">
               <a:rPr lang="pt-BR" smtClean="0"/>
+              <a:pPr/>
               <a:t>‹#›</a:t>
             </a:fld>
             <a:endParaRPr lang="pt-BR"/>
@@ -1868,7 +1896,8 @@
           <a:p>
             <a:fld id="{E18DCAEF-3C14-4DAA-9D0E-141CCFBC985D}" type="datetime1">
               <a:rPr lang="pt-BR" smtClean="0"/>
-              <a:t>06/11/2014</a:t>
+              <a:pPr/>
+              <a:t>07/11/2014</a:t>
             </a:fld>
             <a:endParaRPr lang="pt-BR"/>
           </a:p>
@@ -1914,6 +1943,7 @@
           <a:p>
             <a:fld id="{3D12642F-FC9C-42CD-9EE4-23EF85AE02E3}" type="slidenum">
               <a:rPr lang="pt-BR" smtClean="0"/>
+              <a:pPr/>
               <a:t>‹#›</a:t>
             </a:fld>
             <a:endParaRPr lang="pt-BR"/>
@@ -2336,7 +2366,8 @@
           <a:p>
             <a:fld id="{E72E9EC3-BA23-463D-8887-379B218D7842}" type="datetime1">
               <a:rPr lang="pt-BR" smtClean="0"/>
-              <a:t>06/11/2014</a:t>
+              <a:pPr/>
+              <a:t>07/11/2014</a:t>
             </a:fld>
             <a:endParaRPr lang="pt-BR"/>
           </a:p>
@@ -2382,6 +2413,7 @@
           <a:p>
             <a:fld id="{3D12642F-FC9C-42CD-9EE4-23EF85AE02E3}" type="slidenum">
               <a:rPr lang="pt-BR" smtClean="0"/>
+              <a:pPr/>
               <a:t>‹#›</a:t>
             </a:fld>
             <a:endParaRPr lang="pt-BR"/>
@@ -2825,7 +2857,8 @@
           <a:p>
             <a:fld id="{F9669525-1799-4BBC-A7FF-5B72EE56D405}" type="datetime1">
               <a:rPr lang="pt-BR" smtClean="0"/>
-              <a:t>06/11/2014</a:t>
+              <a:pPr/>
+              <a:t>07/11/2014</a:t>
             </a:fld>
             <a:endParaRPr lang="pt-BR"/>
           </a:p>
@@ -2871,6 +2904,7 @@
           <a:p>
             <a:fld id="{3D12642F-FC9C-42CD-9EE4-23EF85AE02E3}" type="slidenum">
               <a:rPr lang="pt-BR" smtClean="0"/>
+              <a:pPr/>
               <a:t>‹#›</a:t>
             </a:fld>
             <a:endParaRPr lang="pt-BR"/>
@@ -2951,7 +2985,8 @@
           <a:p>
             <a:fld id="{B83CD03C-7D16-4549-9194-91C7F7B5D57C}" type="datetime1">
               <a:rPr lang="pt-BR" smtClean="0"/>
-              <a:t>06/11/2014</a:t>
+              <a:pPr/>
+              <a:t>07/11/2014</a:t>
             </a:fld>
             <a:endParaRPr lang="pt-BR"/>
           </a:p>
@@ -2997,6 +3032,7 @@
           <a:p>
             <a:fld id="{3D12642F-FC9C-42CD-9EE4-23EF85AE02E3}" type="slidenum">
               <a:rPr lang="pt-BR" smtClean="0"/>
+              <a:pPr/>
               <a:t>‹#›</a:t>
             </a:fld>
             <a:endParaRPr lang="pt-BR"/>
@@ -3095,7 +3131,8 @@
           <a:p>
             <a:fld id="{6F74E048-6EEB-465B-87C6-D1C8B86B4539}" type="datetime1">
               <a:rPr lang="pt-BR" smtClean="0"/>
-              <a:t>06/11/2014</a:t>
+              <a:pPr/>
+              <a:t>07/11/2014</a:t>
             </a:fld>
             <a:endParaRPr lang="pt-BR"/>
           </a:p>
@@ -3141,6 +3178,7 @@
           <a:p>
             <a:fld id="{3D12642F-FC9C-42CD-9EE4-23EF85AE02E3}" type="slidenum">
               <a:rPr lang="pt-BR" smtClean="0"/>
+              <a:pPr/>
               <a:t>‹#›</a:t>
             </a:fld>
             <a:endParaRPr lang="pt-BR"/>
@@ -3417,7 +3455,8 @@
           <a:p>
             <a:fld id="{B48CCDEE-E7DE-4F0F-9F05-E7461F54A15C}" type="datetime1">
               <a:rPr lang="pt-BR" smtClean="0"/>
-              <a:t>06/11/2014</a:t>
+              <a:pPr/>
+              <a:t>07/11/2014</a:t>
             </a:fld>
             <a:endParaRPr lang="pt-BR"/>
           </a:p>
@@ -3463,6 +3502,7 @@
           <a:p>
             <a:fld id="{3D12642F-FC9C-42CD-9EE4-23EF85AE02E3}" type="slidenum">
               <a:rPr lang="pt-BR" smtClean="0"/>
+              <a:pPr/>
               <a:t>‹#›</a:t>
             </a:fld>
             <a:endParaRPr lang="pt-BR"/>
@@ -3551,7 +3591,8 @@
           <a:p>
             <a:fld id="{DFF5A7F5-DF60-4C7E-83F0-5B92176DE04B}" type="datetime1">
               <a:rPr lang="pt-BR" smtClean="0"/>
-              <a:t>06/11/2014</a:t>
+              <a:pPr/>
+              <a:t>07/11/2014</a:t>
             </a:fld>
             <a:endParaRPr lang="pt-BR"/>
           </a:p>
@@ -3597,6 +3638,7 @@
           <a:p>
             <a:fld id="{3D12642F-FC9C-42CD-9EE4-23EF85AE02E3}" type="slidenum">
               <a:rPr lang="pt-BR" smtClean="0"/>
+              <a:pPr/>
               <a:t>‹#›</a:t>
             </a:fld>
             <a:endParaRPr lang="pt-BR"/>
@@ -4332,7 +4374,8 @@
           <a:p>
             <a:fld id="{908F65CE-4363-401E-846A-2D77E676049C}" type="datetime1">
               <a:rPr lang="pt-BR" smtClean="0"/>
-              <a:t>06/11/2014</a:t>
+              <a:pPr/>
+              <a:t>07/11/2014</a:t>
             </a:fld>
             <a:endParaRPr lang="pt-BR"/>
           </a:p>
@@ -4416,6 +4459,7 @@
           <a:p>
             <a:fld id="{3D12642F-FC9C-42CD-9EE4-23EF85AE02E3}" type="slidenum">
               <a:rPr lang="pt-BR" smtClean="0"/>
+              <a:pPr/>
               <a:t>‹#›</a:t>
             </a:fld>
             <a:endParaRPr lang="pt-BR"/>
@@ -4918,6 +4962,7 @@
           <a:p>
             <a:fld id="{3D12642F-FC9C-42CD-9EE4-23EF85AE02E3}" type="slidenum">
               <a:rPr lang="pt-BR" smtClean="0"/>
+              <a:pPr/>
               <a:t>1</a:t>
             </a:fld>
             <a:endParaRPr lang="pt-BR"/>
@@ -4973,7 +5018,7 @@
           <a:p>
             <a:r>
               <a:rPr lang="pt-BR" dirty="0" smtClean="0"/>
-              <a:t>Fontes e Referencias</a:t>
+              <a:t>Teste Funcional / Caixa Preta</a:t>
             </a:r>
             <a:endParaRPr lang="pt-BR" dirty="0"/>
           </a:p>
@@ -4996,30 +5041,25 @@
           <a:p>
             <a:r>
               <a:rPr lang="pt-BR" dirty="0" smtClean="0"/>
-              <a:t>¹</a:t>
+              <a:t>Não </a:t>
             </a:r>
             <a:r>
               <a:rPr lang="pt-BR" dirty="0" smtClean="0"/>
-              <a:t>Qualidade de Software – Teoria e Prática” (ROCHA </a:t>
-            </a:r>
-            <a:r>
-              <a:rPr lang="pt-BR" i="1" dirty="0" err="1" smtClean="0"/>
-              <a:t>et</a:t>
-            </a:r>
-            <a:r>
-              <a:rPr lang="pt-BR" i="1" dirty="0" smtClean="0"/>
-              <a:t> al</a:t>
-            </a:r>
+              <a:t>se considera o comportamento interno </a:t>
+            </a:r>
+            <a:endParaRPr lang="pt-BR" dirty="0" smtClean="0"/>
+          </a:p>
+          <a:p>
             <a:r>
               <a:rPr lang="pt-BR" dirty="0" smtClean="0"/>
-              <a:t>., 2001</a:t>
-            </a:r>
+              <a:t>Comparação de resultados</a:t>
+            </a:r>
+          </a:p>
+          <a:p>
             <a:r>
               <a:rPr lang="pt-BR" dirty="0" smtClean="0"/>
-              <a:t>)</a:t>
-            </a:r>
-          </a:p>
-          <a:p>
+              <a:t>A técnica de teste funcional é aplicável a todos os níveis de teste (PRESSMAN, 2005)</a:t>
+            </a:r>
             <a:endParaRPr lang="pt-BR" dirty="0"/>
           </a:p>
         </p:txBody>
@@ -5041,17 +5081,1506 @@
           <a:p>
             <a:fld id="{3D12642F-FC9C-42CD-9EE4-23EF85AE02E3}" type="slidenum">
               <a:rPr lang="pt-BR" smtClean="0"/>
+              <a:pPr/>
               <a:t>10</a:t>
             </a:fld>
             <a:endParaRPr lang="pt-BR"/>
           </a:p>
         </p:txBody>
       </p:sp>
+      <p:pic>
+        <p:nvPicPr>
+          <p:cNvPr id="27650" name="Picture 2" descr="http://upload.wikimedia.org/wikipedia/commons/thumb/c/c7/Caixa_preta.svg/220px-Caixa_preta.svg.png"/>
+          <p:cNvPicPr>
+            <a:picLocks noChangeAspect="1" noChangeArrowheads="1"/>
+          </p:cNvPicPr>
+          <p:nvPr/>
+        </p:nvPicPr>
+        <p:blipFill>
+          <a:blip r:embed="rId2" cstate="print"/>
+          <a:srcRect/>
+          <a:stretch>
+            <a:fillRect/>
+          </a:stretch>
+        </p:blipFill>
+        <p:spPr bwMode="auto">
+          <a:xfrm>
+            <a:off x="2411760" y="5157192"/>
+            <a:ext cx="4709699" cy="792088"/>
+          </a:xfrm>
+          <a:prstGeom prst="rect">
+            <a:avLst/>
+          </a:prstGeom>
+          <a:noFill/>
+        </p:spPr>
+      </p:pic>
     </p:spTree>
   </p:cSld>
   <p:clrMapOvr>
     <a:masterClrMapping/>
   </p:clrMapOvr>
+  <p:timing>
+    <p:tnLst>
+      <p:par>
+        <p:cTn id="1" dur="indefinite" restart="never" nodeType="tmRoot"/>
+      </p:par>
+    </p:tnLst>
+  </p:timing>
+</p:sld>
+</file>
+
+<file path=ppt/slides/slide11.xml><?xml version="1.0" encoding="utf-8"?>
+<p:sld xmlns:a="http://schemas.openxmlformats.org/drawingml/2006/main" xmlns:r="http://schemas.openxmlformats.org/officeDocument/2006/relationships" xmlns:p="http://schemas.openxmlformats.org/presentationml/2006/main">
+  <p:cSld>
+    <p:spTree>
+      <p:nvGrpSpPr>
+        <p:cNvPr id="1" name=""/>
+        <p:cNvGrpSpPr/>
+        <p:nvPr/>
+      </p:nvGrpSpPr>
+      <p:grpSpPr>
+        <a:xfrm>
+          <a:off x="0" y="0"/>
+          <a:ext cx="0" cy="0"/>
+          <a:chOff x="0" y="0"/>
+          <a:chExt cx="0" cy="0"/>
+        </a:xfrm>
+      </p:grpSpPr>
+      <p:sp>
+        <p:nvSpPr>
+          <p:cNvPr id="2" name="Title 1"/>
+          <p:cNvSpPr>
+            <a:spLocks noGrp="1"/>
+          </p:cNvSpPr>
+          <p:nvPr>
+            <p:ph type="title"/>
+          </p:nvPr>
+        </p:nvSpPr>
+        <p:spPr/>
+        <p:txBody>
+          <a:bodyPr>
+            <a:normAutofit fontScale="90000"/>
+          </a:bodyPr>
+          <a:lstStyle/>
+          <a:p>
+            <a:r>
+              <a:rPr lang="pt-BR" dirty="0" smtClean="0"/>
+              <a:t>Teste de Análise do Valor Limite</a:t>
+            </a:r>
+            <a:endParaRPr lang="pt-BR" dirty="0"/>
+          </a:p>
+        </p:txBody>
+      </p:sp>
+      <p:sp>
+        <p:nvSpPr>
+          <p:cNvPr id="3" name="Content Placeholder 2"/>
+          <p:cNvSpPr>
+            <a:spLocks noGrp="1"/>
+          </p:cNvSpPr>
+          <p:nvPr>
+            <p:ph idx="1"/>
+          </p:nvPr>
+        </p:nvSpPr>
+        <p:spPr/>
+        <p:txBody>
+          <a:bodyPr/>
+          <a:lstStyle/>
+          <a:p>
+            <a:r>
+              <a:rPr lang="pt-BR" dirty="0" smtClean="0"/>
+              <a:t>Erros frequentes nos limites</a:t>
+            </a:r>
+          </a:p>
+          <a:p>
+            <a:r>
+              <a:rPr lang="pt-BR" dirty="0" smtClean="0"/>
+              <a:t>Esse critério de teste explora os limites dos valores de cada classe de equivalência para preparar os casos de teste (Pressman, 2005</a:t>
+            </a:r>
+            <a:r>
+              <a:rPr lang="pt-BR" dirty="0" smtClean="0"/>
+              <a:t>)</a:t>
+            </a:r>
+          </a:p>
+          <a:p>
+            <a:r>
+              <a:rPr lang="pt-BR" dirty="0" smtClean="0"/>
+              <a:t>Exemplo: Intervalo = {1..10}; Casos de Teste à {1, 10, 0,11}.</a:t>
+            </a:r>
+            <a:endParaRPr lang="pt-BR" dirty="0"/>
+          </a:p>
+        </p:txBody>
+      </p:sp>
+      <p:sp>
+        <p:nvSpPr>
+          <p:cNvPr id="4" name="Slide Number Placeholder 3"/>
+          <p:cNvSpPr>
+            <a:spLocks noGrp="1"/>
+          </p:cNvSpPr>
+          <p:nvPr>
+            <p:ph type="sldNum" sz="quarter" idx="12"/>
+          </p:nvPr>
+        </p:nvSpPr>
+        <p:spPr/>
+        <p:txBody>
+          <a:bodyPr/>
+          <a:lstStyle/>
+          <a:p>
+            <a:fld id="{3D12642F-FC9C-42CD-9EE4-23EF85AE02E3}" type="slidenum">
+              <a:rPr lang="pt-BR" smtClean="0"/>
+              <a:pPr/>
+              <a:t>11</a:t>
+            </a:fld>
+            <a:endParaRPr lang="pt-BR"/>
+          </a:p>
+        </p:txBody>
+      </p:sp>
+    </p:spTree>
+  </p:cSld>
+  <p:clrMapOvr>
+    <a:masterClrMapping/>
+  </p:clrMapOvr>
+  <p:timing>
+    <p:tnLst>
+      <p:par>
+        <p:cTn id="1" dur="indefinite" restart="never" nodeType="tmRoot"/>
+      </p:par>
+    </p:tnLst>
+  </p:timing>
+</p:sld>
+</file>
+
+<file path=ppt/slides/slide12.xml><?xml version="1.0" encoding="utf-8"?>
+<p:sld xmlns:a="http://schemas.openxmlformats.org/drawingml/2006/main" xmlns:r="http://schemas.openxmlformats.org/officeDocument/2006/relationships" xmlns:p="http://schemas.openxmlformats.org/presentationml/2006/main">
+  <p:cSld>
+    <p:spTree>
+      <p:nvGrpSpPr>
+        <p:cNvPr id="1" name=""/>
+        <p:cNvGrpSpPr/>
+        <p:nvPr/>
+      </p:nvGrpSpPr>
+      <p:grpSpPr>
+        <a:xfrm>
+          <a:off x="0" y="0"/>
+          <a:ext cx="0" cy="0"/>
+          <a:chOff x="0" y="0"/>
+          <a:chExt cx="0" cy="0"/>
+        </a:xfrm>
+      </p:grpSpPr>
+      <p:sp>
+        <p:nvSpPr>
+          <p:cNvPr id="2" name="Title 1"/>
+          <p:cNvSpPr>
+            <a:spLocks noGrp="1"/>
+          </p:cNvSpPr>
+          <p:nvPr>
+            <p:ph type="title"/>
+          </p:nvPr>
+        </p:nvSpPr>
+        <p:spPr/>
+        <p:txBody>
+          <a:bodyPr/>
+          <a:lstStyle/>
+          <a:p>
+            <a:r>
+              <a:rPr lang="pt-BR" dirty="0" smtClean="0"/>
+              <a:t>Ferramentas de Teste</a:t>
+            </a:r>
+            <a:endParaRPr lang="pt-BR" dirty="0"/>
+          </a:p>
+        </p:txBody>
+      </p:sp>
+      <p:sp>
+        <p:nvSpPr>
+          <p:cNvPr id="3" name="Content Placeholder 2"/>
+          <p:cNvSpPr>
+            <a:spLocks noGrp="1"/>
+          </p:cNvSpPr>
+          <p:nvPr>
+            <p:ph idx="1"/>
+          </p:nvPr>
+        </p:nvSpPr>
+        <p:spPr/>
+        <p:txBody>
+          <a:bodyPr/>
+          <a:lstStyle/>
+          <a:p>
+            <a:r>
+              <a:rPr lang="pt-BR" dirty="0" smtClean="0"/>
+              <a:t>A</a:t>
+            </a:r>
+          </a:p>
+          <a:p>
+            <a:r>
+              <a:rPr lang="pt-BR" dirty="0" smtClean="0"/>
+              <a:t>B</a:t>
+            </a:r>
+          </a:p>
+          <a:p>
+            <a:r>
+              <a:rPr lang="pt-BR" dirty="0" err="1" smtClean="0"/>
+              <a:t>JUnit</a:t>
+            </a:r>
+            <a:endParaRPr lang="pt-BR" dirty="0"/>
+          </a:p>
+        </p:txBody>
+      </p:sp>
+      <p:sp>
+        <p:nvSpPr>
+          <p:cNvPr id="4" name="Slide Number Placeholder 3"/>
+          <p:cNvSpPr>
+            <a:spLocks noGrp="1"/>
+          </p:cNvSpPr>
+          <p:nvPr>
+            <p:ph type="sldNum" sz="quarter" idx="12"/>
+          </p:nvPr>
+        </p:nvSpPr>
+        <p:spPr/>
+        <p:txBody>
+          <a:bodyPr/>
+          <a:lstStyle/>
+          <a:p>
+            <a:fld id="{3D12642F-FC9C-42CD-9EE4-23EF85AE02E3}" type="slidenum">
+              <a:rPr lang="pt-BR" smtClean="0"/>
+              <a:pPr/>
+              <a:t>12</a:t>
+            </a:fld>
+            <a:endParaRPr lang="pt-BR"/>
+          </a:p>
+        </p:txBody>
+      </p:sp>
+      <p:pic>
+        <p:nvPicPr>
+          <p:cNvPr id="28674" name="Picture 2" descr="http://acontecendoaqui.com.br/wp-content/uploads/2012/07/poppetjes-3.gif"/>
+          <p:cNvPicPr>
+            <a:picLocks noChangeAspect="1" noChangeArrowheads="1"/>
+          </p:cNvPicPr>
+          <p:nvPr/>
+        </p:nvPicPr>
+        <p:blipFill>
+          <a:blip r:embed="rId2" cstate="print"/>
+          <a:srcRect/>
+          <a:stretch>
+            <a:fillRect/>
+          </a:stretch>
+        </p:blipFill>
+        <p:spPr bwMode="auto">
+          <a:xfrm>
+            <a:off x="5076056" y="3645024"/>
+            <a:ext cx="3810000" cy="2695576"/>
+          </a:xfrm>
+          <a:prstGeom prst="rect">
+            <a:avLst/>
+          </a:prstGeom>
+          <a:noFill/>
+        </p:spPr>
+      </p:pic>
+    </p:spTree>
+  </p:cSld>
+  <p:clrMapOvr>
+    <a:masterClrMapping/>
+  </p:clrMapOvr>
+  <p:timing>
+    <p:tnLst>
+      <p:par>
+        <p:cTn id="1" dur="indefinite" restart="never" nodeType="tmRoot"/>
+      </p:par>
+    </p:tnLst>
+  </p:timing>
+</p:sld>
+</file>
+
+<file path=ppt/slides/slide13.xml><?xml version="1.0" encoding="utf-8"?>
+<p:sld xmlns:a="http://schemas.openxmlformats.org/drawingml/2006/main" xmlns:r="http://schemas.openxmlformats.org/officeDocument/2006/relationships" xmlns:p="http://schemas.openxmlformats.org/presentationml/2006/main">
+  <p:cSld>
+    <p:spTree>
+      <p:nvGrpSpPr>
+        <p:cNvPr id="1" name=""/>
+        <p:cNvGrpSpPr/>
+        <p:nvPr/>
+      </p:nvGrpSpPr>
+      <p:grpSpPr>
+        <a:xfrm>
+          <a:off x="0" y="0"/>
+          <a:ext cx="0" cy="0"/>
+          <a:chOff x="0" y="0"/>
+          <a:chExt cx="0" cy="0"/>
+        </a:xfrm>
+      </p:grpSpPr>
+      <p:sp>
+        <p:nvSpPr>
+          <p:cNvPr id="2" name="Title 1"/>
+          <p:cNvSpPr>
+            <a:spLocks noGrp="1"/>
+          </p:cNvSpPr>
+          <p:nvPr>
+            <p:ph type="title"/>
+          </p:nvPr>
+        </p:nvSpPr>
+        <p:spPr/>
+        <p:txBody>
+          <a:bodyPr/>
+          <a:lstStyle/>
+          <a:p>
+            <a:r>
+              <a:rPr lang="pt-BR" dirty="0" err="1" smtClean="0"/>
+              <a:t>JUnit</a:t>
+            </a:r>
+            <a:endParaRPr lang="pt-BR" dirty="0"/>
+          </a:p>
+        </p:txBody>
+      </p:sp>
+      <p:sp>
+        <p:nvSpPr>
+          <p:cNvPr id="3" name="Content Placeholder 2"/>
+          <p:cNvSpPr>
+            <a:spLocks noGrp="1"/>
+          </p:cNvSpPr>
+          <p:nvPr>
+            <p:ph idx="1"/>
+          </p:nvPr>
+        </p:nvSpPr>
+        <p:spPr/>
+        <p:txBody>
+          <a:bodyPr/>
+          <a:lstStyle/>
+          <a:p>
+            <a:r>
+              <a:rPr lang="pt-BR" dirty="0" smtClean="0"/>
+              <a:t>Framework open source para programas em Java</a:t>
+            </a:r>
+          </a:p>
+          <a:p>
+            <a:r>
+              <a:rPr lang="pt-BR" dirty="0" err="1" smtClean="0"/>
+              <a:t>IDEs</a:t>
+            </a:r>
+            <a:r>
+              <a:rPr lang="pt-BR" dirty="0" smtClean="0"/>
+              <a:t> com suporte: (permite uma área nativa para rodar os testes)</a:t>
+            </a:r>
+          </a:p>
+          <a:p>
+            <a:pPr lvl="1"/>
+            <a:r>
+              <a:rPr lang="pt-BR" dirty="0" err="1" smtClean="0"/>
+              <a:t>NetBeans</a:t>
+            </a:r>
+            <a:endParaRPr lang="pt-BR" dirty="0" smtClean="0"/>
+          </a:p>
+          <a:p>
+            <a:pPr lvl="1"/>
+            <a:r>
+              <a:rPr lang="pt-BR" dirty="0" smtClean="0"/>
+              <a:t>Eclipse</a:t>
+            </a:r>
+            <a:endParaRPr lang="pt-BR" dirty="0" smtClean="0"/>
+          </a:p>
+          <a:p>
+            <a:pPr lvl="1"/>
+            <a:r>
+              <a:rPr lang="pt-BR" dirty="0" err="1" smtClean="0"/>
+              <a:t>IntelliJ</a:t>
+            </a:r>
+            <a:r>
+              <a:rPr lang="pt-BR" dirty="0" smtClean="0"/>
+              <a:t> </a:t>
+            </a:r>
+            <a:r>
+              <a:rPr lang="pt-BR" dirty="0" smtClean="0"/>
+              <a:t>Idea</a:t>
+            </a:r>
+          </a:p>
+          <a:p>
+            <a:endParaRPr lang="pt-BR" dirty="0"/>
+          </a:p>
+        </p:txBody>
+      </p:sp>
+      <p:sp>
+        <p:nvSpPr>
+          <p:cNvPr id="4" name="Slide Number Placeholder 3"/>
+          <p:cNvSpPr>
+            <a:spLocks noGrp="1"/>
+          </p:cNvSpPr>
+          <p:nvPr>
+            <p:ph type="sldNum" sz="quarter" idx="12"/>
+          </p:nvPr>
+        </p:nvSpPr>
+        <p:spPr/>
+        <p:txBody>
+          <a:bodyPr/>
+          <a:lstStyle/>
+          <a:p>
+            <a:fld id="{3D12642F-FC9C-42CD-9EE4-23EF85AE02E3}" type="slidenum">
+              <a:rPr lang="pt-BR" smtClean="0"/>
+              <a:pPr/>
+              <a:t>13</a:t>
+            </a:fld>
+            <a:endParaRPr lang="pt-BR"/>
+          </a:p>
+        </p:txBody>
+      </p:sp>
+      <p:pic>
+        <p:nvPicPr>
+          <p:cNvPr id="30722" name="Picture 2" descr="http://valentinroudge.com/wp-content/uploads/2014/05/netbeans0.png"/>
+          <p:cNvPicPr>
+            <a:picLocks noChangeAspect="1" noChangeArrowheads="1"/>
+          </p:cNvPicPr>
+          <p:nvPr/>
+        </p:nvPicPr>
+        <p:blipFill>
+          <a:blip r:embed="rId2" cstate="print"/>
+          <a:srcRect/>
+          <a:stretch>
+            <a:fillRect/>
+          </a:stretch>
+        </p:blipFill>
+        <p:spPr bwMode="auto">
+          <a:xfrm>
+            <a:off x="1115616" y="5112568"/>
+            <a:ext cx="1872208" cy="1679594"/>
+          </a:xfrm>
+          <a:prstGeom prst="rect">
+            <a:avLst/>
+          </a:prstGeom>
+          <a:noFill/>
+        </p:spPr>
+      </p:pic>
+      <p:pic>
+        <p:nvPicPr>
+          <p:cNvPr id="30724" name="Picture 4" descr="http://www.eclipse.org/xtend/images/eclipse_logo.png"/>
+          <p:cNvPicPr>
+            <a:picLocks noChangeAspect="1" noChangeArrowheads="1"/>
+          </p:cNvPicPr>
+          <p:nvPr/>
+        </p:nvPicPr>
+        <p:blipFill>
+          <a:blip r:embed="rId3" cstate="print"/>
+          <a:srcRect/>
+          <a:stretch>
+            <a:fillRect/>
+          </a:stretch>
+        </p:blipFill>
+        <p:spPr bwMode="auto">
+          <a:xfrm>
+            <a:off x="3059832" y="4581152"/>
+            <a:ext cx="3587552" cy="2520256"/>
+          </a:xfrm>
+          <a:prstGeom prst="rect">
+            <a:avLst/>
+          </a:prstGeom>
+          <a:noFill/>
+        </p:spPr>
+      </p:pic>
+      <p:pic>
+        <p:nvPicPr>
+          <p:cNvPr id="30726" name="Picture 6" descr="http://blog.idrsolutions.com/wp-content/uploads/2013/07/idea.png"/>
+          <p:cNvPicPr>
+            <a:picLocks noChangeAspect="1" noChangeArrowheads="1"/>
+          </p:cNvPicPr>
+          <p:nvPr/>
+        </p:nvPicPr>
+        <p:blipFill>
+          <a:blip r:embed="rId4" cstate="print"/>
+          <a:srcRect/>
+          <a:stretch>
+            <a:fillRect/>
+          </a:stretch>
+        </p:blipFill>
+        <p:spPr bwMode="auto">
+          <a:xfrm>
+            <a:off x="6732240" y="4149080"/>
+            <a:ext cx="2232248" cy="2232248"/>
+          </a:xfrm>
+          <a:prstGeom prst="rect">
+            <a:avLst/>
+          </a:prstGeom>
+          <a:noFill/>
+        </p:spPr>
+      </p:pic>
+      <p:pic>
+        <p:nvPicPr>
+          <p:cNvPr id="30728" name="Picture 8" descr="http://junit.org/images/junit-logo.png"/>
+          <p:cNvPicPr>
+            <a:picLocks noChangeAspect="1" noChangeArrowheads="1"/>
+          </p:cNvPicPr>
+          <p:nvPr/>
+        </p:nvPicPr>
+        <p:blipFill>
+          <a:blip r:embed="rId5" cstate="print"/>
+          <a:srcRect/>
+          <a:stretch>
+            <a:fillRect/>
+          </a:stretch>
+        </p:blipFill>
+        <p:spPr bwMode="auto">
+          <a:xfrm>
+            <a:off x="3059832" y="548680"/>
+            <a:ext cx="1524000" cy="609600"/>
+          </a:xfrm>
+          <a:prstGeom prst="rect">
+            <a:avLst/>
+          </a:prstGeom>
+          <a:noFill/>
+        </p:spPr>
+      </p:pic>
+    </p:spTree>
+  </p:cSld>
+  <p:clrMapOvr>
+    <a:masterClrMapping/>
+  </p:clrMapOvr>
+  <p:timing>
+    <p:tnLst>
+      <p:par>
+        <p:cTn id="1" dur="indefinite" restart="never" nodeType="tmRoot"/>
+      </p:par>
+    </p:tnLst>
+  </p:timing>
+</p:sld>
+</file>
+
+<file path=ppt/slides/slide14.xml><?xml version="1.0" encoding="utf-8"?>
+<p:sld xmlns:a="http://schemas.openxmlformats.org/drawingml/2006/main" xmlns:r="http://schemas.openxmlformats.org/officeDocument/2006/relationships" xmlns:p="http://schemas.openxmlformats.org/presentationml/2006/main">
+  <p:cSld>
+    <p:spTree>
+      <p:nvGrpSpPr>
+        <p:cNvPr id="1" name=""/>
+        <p:cNvGrpSpPr/>
+        <p:nvPr/>
+      </p:nvGrpSpPr>
+      <p:grpSpPr>
+        <a:xfrm>
+          <a:off x="0" y="0"/>
+          <a:ext cx="0" cy="0"/>
+          <a:chOff x="0" y="0"/>
+          <a:chExt cx="0" cy="0"/>
+        </a:xfrm>
+      </p:grpSpPr>
+      <p:sp>
+        <p:nvSpPr>
+          <p:cNvPr id="2" name="Title 1"/>
+          <p:cNvSpPr>
+            <a:spLocks noGrp="1"/>
+          </p:cNvSpPr>
+          <p:nvPr>
+            <p:ph type="title"/>
+          </p:nvPr>
+        </p:nvSpPr>
+        <p:spPr/>
+        <p:txBody>
+          <a:bodyPr/>
+          <a:lstStyle/>
+          <a:p>
+            <a:r>
+              <a:rPr lang="pt-BR" dirty="0" err="1" smtClean="0"/>
+              <a:t>JUnit</a:t>
+            </a:r>
+            <a:endParaRPr lang="pt-BR" dirty="0"/>
+          </a:p>
+        </p:txBody>
+      </p:sp>
+      <p:sp>
+        <p:nvSpPr>
+          <p:cNvPr id="3" name="Content Placeholder 2"/>
+          <p:cNvSpPr>
+            <a:spLocks noGrp="1"/>
+          </p:cNvSpPr>
+          <p:nvPr>
+            <p:ph idx="1"/>
+          </p:nvPr>
+        </p:nvSpPr>
+        <p:spPr/>
+        <p:txBody>
+          <a:bodyPr/>
+          <a:lstStyle/>
+          <a:p>
+            <a:r>
+              <a:rPr lang="pt-BR" dirty="0" smtClean="0"/>
+              <a:t>Uso do </a:t>
+            </a:r>
+            <a:r>
+              <a:rPr lang="pt-BR" dirty="0" err="1" smtClean="0"/>
+              <a:t>GitHub</a:t>
+            </a:r>
+            <a:r>
+              <a:rPr lang="pt-BR" dirty="0" smtClean="0"/>
+              <a:t> </a:t>
+            </a:r>
+            <a:endParaRPr lang="pt-BR" dirty="0" smtClean="0"/>
+          </a:p>
+          <a:p>
+            <a:r>
+              <a:rPr lang="pt-BR" dirty="0" smtClean="0"/>
+              <a:t>Testes realizados a partir de métodos de validação, como por exemplo:</a:t>
+            </a:r>
+          </a:p>
+          <a:p>
+            <a:pPr lvl="1"/>
+            <a:r>
+              <a:rPr lang="pt-BR" dirty="0" smtClean="0"/>
+              <a:t>Igualdade (valores ou objetos)</a:t>
+            </a:r>
+          </a:p>
+          <a:p>
+            <a:pPr lvl="1"/>
+            <a:r>
+              <a:rPr lang="pt-BR" dirty="0" smtClean="0"/>
+              <a:t>Existência de valores</a:t>
+            </a:r>
+          </a:p>
+          <a:p>
+            <a:pPr lvl="1"/>
+            <a:r>
+              <a:rPr lang="pt-BR" dirty="0" smtClean="0"/>
+              <a:t>Valores </a:t>
+            </a:r>
+            <a:r>
+              <a:rPr lang="pt-BR" dirty="0" smtClean="0"/>
+              <a:t>Incorretos</a:t>
+            </a:r>
+            <a:endParaRPr lang="pt-BR" dirty="0" smtClean="0"/>
+          </a:p>
+          <a:p>
+            <a:endParaRPr lang="pt-BR" dirty="0" smtClean="0"/>
+          </a:p>
+        </p:txBody>
+      </p:sp>
+      <p:sp>
+        <p:nvSpPr>
+          <p:cNvPr id="4" name="Slide Number Placeholder 3"/>
+          <p:cNvSpPr>
+            <a:spLocks noGrp="1"/>
+          </p:cNvSpPr>
+          <p:nvPr>
+            <p:ph type="sldNum" sz="quarter" idx="12"/>
+          </p:nvPr>
+        </p:nvSpPr>
+        <p:spPr/>
+        <p:txBody>
+          <a:bodyPr/>
+          <a:lstStyle/>
+          <a:p>
+            <a:fld id="{3D12642F-FC9C-42CD-9EE4-23EF85AE02E3}" type="slidenum">
+              <a:rPr lang="pt-BR" smtClean="0"/>
+              <a:pPr/>
+              <a:t>14</a:t>
+            </a:fld>
+            <a:endParaRPr lang="pt-BR"/>
+          </a:p>
+        </p:txBody>
+      </p:sp>
+    </p:spTree>
+  </p:cSld>
+  <p:clrMapOvr>
+    <a:masterClrMapping/>
+  </p:clrMapOvr>
+  <p:timing>
+    <p:tnLst>
+      <p:par>
+        <p:cTn id="1" dur="indefinite" restart="never" nodeType="tmRoot"/>
+      </p:par>
+    </p:tnLst>
+  </p:timing>
+</p:sld>
+</file>
+
+<file path=ppt/slides/slide15.xml><?xml version="1.0" encoding="utf-8"?>
+<p:sld xmlns:a="http://schemas.openxmlformats.org/drawingml/2006/main" xmlns:r="http://schemas.openxmlformats.org/officeDocument/2006/relationships" xmlns:p="http://schemas.openxmlformats.org/presentationml/2006/main">
+  <p:cSld>
+    <p:spTree>
+      <p:nvGrpSpPr>
+        <p:cNvPr id="1" name=""/>
+        <p:cNvGrpSpPr/>
+        <p:nvPr/>
+      </p:nvGrpSpPr>
+      <p:grpSpPr>
+        <a:xfrm>
+          <a:off x="0" y="0"/>
+          <a:ext cx="0" cy="0"/>
+          <a:chOff x="0" y="0"/>
+          <a:chExt cx="0" cy="0"/>
+        </a:xfrm>
+      </p:grpSpPr>
+      <p:sp>
+        <p:nvSpPr>
+          <p:cNvPr id="2" name="Title 1"/>
+          <p:cNvSpPr>
+            <a:spLocks noGrp="1"/>
+          </p:cNvSpPr>
+          <p:nvPr>
+            <p:ph type="title"/>
+          </p:nvPr>
+        </p:nvSpPr>
+        <p:spPr/>
+        <p:txBody>
+          <a:bodyPr/>
+          <a:lstStyle/>
+          <a:p>
+            <a:r>
+              <a:rPr lang="pt-BR" dirty="0" err="1" smtClean="0"/>
+              <a:t>JUnit</a:t>
+            </a:r>
+            <a:endParaRPr lang="pt-BR" dirty="0"/>
+          </a:p>
+        </p:txBody>
+      </p:sp>
+      <p:sp>
+        <p:nvSpPr>
+          <p:cNvPr id="3" name="Content Placeholder 2"/>
+          <p:cNvSpPr>
+            <a:spLocks noGrp="1"/>
+          </p:cNvSpPr>
+          <p:nvPr>
+            <p:ph idx="1"/>
+          </p:nvPr>
+        </p:nvSpPr>
+        <p:spPr/>
+        <p:txBody>
+          <a:bodyPr>
+            <a:normAutofit/>
+          </a:bodyPr>
+          <a:lstStyle/>
+          <a:p>
+            <a:r>
+              <a:rPr lang="pt-BR" dirty="0" smtClean="0"/>
+              <a:t>Ferramentas (</a:t>
+            </a:r>
+            <a:r>
+              <a:rPr lang="pt-BR" dirty="0" err="1" smtClean="0"/>
+              <a:t>Runners</a:t>
+            </a:r>
+            <a:r>
+              <a:rPr lang="pt-BR" dirty="0" smtClean="0"/>
+              <a:t> - @)</a:t>
+            </a:r>
+            <a:endParaRPr lang="pt-BR" dirty="0" smtClean="0"/>
+          </a:p>
+          <a:p>
+            <a:pPr lvl="1"/>
+            <a:r>
+              <a:rPr lang="pt-BR" dirty="0" err="1" smtClean="0"/>
+              <a:t>RunWith</a:t>
+            </a:r>
+            <a:endParaRPr lang="pt-BR" dirty="0" smtClean="0"/>
+          </a:p>
+          <a:p>
+            <a:pPr lvl="1"/>
+            <a:r>
+              <a:rPr lang="pt-BR" dirty="0" err="1" smtClean="0"/>
+              <a:t>Suite</a:t>
+            </a:r>
+            <a:r>
+              <a:rPr lang="pt-BR" dirty="0" smtClean="0"/>
+              <a:t> </a:t>
+            </a:r>
+          </a:p>
+          <a:p>
+            <a:pPr lvl="1"/>
+            <a:r>
+              <a:rPr lang="pt-BR" dirty="0" err="1" smtClean="0"/>
+              <a:t>Parameterized</a:t>
+            </a:r>
+            <a:r>
+              <a:rPr lang="pt-BR" dirty="0" smtClean="0"/>
+              <a:t> </a:t>
+            </a:r>
+          </a:p>
+          <a:p>
+            <a:pPr lvl="1"/>
+            <a:r>
+              <a:rPr lang="pt-BR" dirty="0" err="1" smtClean="0"/>
+              <a:t>Categories</a:t>
+            </a:r>
+            <a:r>
+              <a:rPr lang="pt-BR" dirty="0" smtClean="0"/>
+              <a:t> </a:t>
+            </a:r>
+          </a:p>
+          <a:p>
+            <a:pPr lvl="1"/>
+            <a:r>
+              <a:rPr lang="pt-BR" dirty="0" err="1" smtClean="0"/>
+              <a:t>Enclosed</a:t>
+            </a:r>
+            <a:r>
+              <a:rPr lang="pt-BR" dirty="0" smtClean="0"/>
+              <a:t> </a:t>
+            </a:r>
+          </a:p>
+          <a:p>
+            <a:pPr lvl="1"/>
+            <a:r>
+              <a:rPr lang="pt-BR" dirty="0" smtClean="0"/>
+              <a:t>Outras para serem usadas com o </a:t>
+            </a:r>
+            <a:r>
+              <a:rPr lang="pt-BR" dirty="0" err="1" smtClean="0"/>
+              <a:t>RunWith</a:t>
+            </a:r>
+            <a:r>
+              <a:rPr lang="pt-BR" dirty="0" smtClean="0"/>
+              <a:t> ou para customizar as já existentes</a:t>
+            </a:r>
+            <a:r>
+              <a:rPr lang="pt-BR" dirty="0" smtClean="0"/>
+              <a:t>. Ex: </a:t>
+            </a:r>
+            <a:r>
+              <a:rPr lang="pt-BR" dirty="0" err="1" smtClean="0"/>
+              <a:t>Mockito</a:t>
+            </a:r>
+            <a:endParaRPr lang="pt-BR" dirty="0" smtClean="0"/>
+          </a:p>
+          <a:p>
+            <a:endParaRPr lang="pt-BR" dirty="0"/>
+          </a:p>
+        </p:txBody>
+      </p:sp>
+      <p:sp>
+        <p:nvSpPr>
+          <p:cNvPr id="4" name="Slide Number Placeholder 3"/>
+          <p:cNvSpPr>
+            <a:spLocks noGrp="1"/>
+          </p:cNvSpPr>
+          <p:nvPr>
+            <p:ph type="sldNum" sz="quarter" idx="12"/>
+          </p:nvPr>
+        </p:nvSpPr>
+        <p:spPr/>
+        <p:txBody>
+          <a:bodyPr/>
+          <a:lstStyle/>
+          <a:p>
+            <a:fld id="{3D12642F-FC9C-42CD-9EE4-23EF85AE02E3}" type="slidenum">
+              <a:rPr lang="pt-BR" smtClean="0"/>
+              <a:pPr/>
+              <a:t>15</a:t>
+            </a:fld>
+            <a:endParaRPr lang="pt-BR"/>
+          </a:p>
+        </p:txBody>
+      </p:sp>
+      <p:pic>
+        <p:nvPicPr>
+          <p:cNvPr id="32770" name="Picture 2" descr="http://mockito.googlecode.com/svn/wiki/images/logo.jpg"/>
+          <p:cNvPicPr>
+            <a:picLocks noChangeAspect="1" noChangeArrowheads="1"/>
+          </p:cNvPicPr>
+          <p:nvPr/>
+        </p:nvPicPr>
+        <p:blipFill>
+          <a:blip r:embed="rId2" cstate="print"/>
+          <a:srcRect/>
+          <a:stretch>
+            <a:fillRect/>
+          </a:stretch>
+        </p:blipFill>
+        <p:spPr bwMode="auto">
+          <a:xfrm>
+            <a:off x="5940152" y="5373216"/>
+            <a:ext cx="2657103" cy="1232835"/>
+          </a:xfrm>
+          <a:prstGeom prst="rect">
+            <a:avLst/>
+          </a:prstGeom>
+          <a:noFill/>
+        </p:spPr>
+      </p:pic>
+    </p:spTree>
+  </p:cSld>
+  <p:clrMapOvr>
+    <a:masterClrMapping/>
+  </p:clrMapOvr>
+  <p:timing>
+    <p:tnLst>
+      <p:par>
+        <p:cTn id="1" dur="indefinite" restart="never" nodeType="tmRoot"/>
+      </p:par>
+    </p:tnLst>
+  </p:timing>
+</p:sld>
+</file>
+
+<file path=ppt/slides/slide16.xml><?xml version="1.0" encoding="utf-8"?>
+<p:sld xmlns:a="http://schemas.openxmlformats.org/drawingml/2006/main" xmlns:r="http://schemas.openxmlformats.org/officeDocument/2006/relationships" xmlns:p="http://schemas.openxmlformats.org/presentationml/2006/main">
+  <p:cSld>
+    <p:spTree>
+      <p:nvGrpSpPr>
+        <p:cNvPr id="1" name=""/>
+        <p:cNvGrpSpPr/>
+        <p:nvPr/>
+      </p:nvGrpSpPr>
+      <p:grpSpPr>
+        <a:xfrm>
+          <a:off x="0" y="0"/>
+          <a:ext cx="0" cy="0"/>
+          <a:chOff x="0" y="0"/>
+          <a:chExt cx="0" cy="0"/>
+        </a:xfrm>
+      </p:grpSpPr>
+      <p:sp>
+        <p:nvSpPr>
+          <p:cNvPr id="2" name="Title 1"/>
+          <p:cNvSpPr>
+            <a:spLocks noGrp="1"/>
+          </p:cNvSpPr>
+          <p:nvPr>
+            <p:ph type="title"/>
+          </p:nvPr>
+        </p:nvSpPr>
+        <p:spPr/>
+        <p:txBody>
+          <a:bodyPr/>
+          <a:lstStyle/>
+          <a:p>
+            <a:r>
+              <a:rPr lang="pt-BR" dirty="0" smtClean="0"/>
+              <a:t>Dinâmica</a:t>
+            </a:r>
+            <a:endParaRPr lang="pt-BR" dirty="0"/>
+          </a:p>
+        </p:txBody>
+      </p:sp>
+      <p:sp>
+        <p:nvSpPr>
+          <p:cNvPr id="3" name="Content Placeholder 2"/>
+          <p:cNvSpPr>
+            <a:spLocks noGrp="1"/>
+          </p:cNvSpPr>
+          <p:nvPr>
+            <p:ph idx="1"/>
+          </p:nvPr>
+        </p:nvSpPr>
+        <p:spPr/>
+        <p:txBody>
+          <a:bodyPr/>
+          <a:lstStyle/>
+          <a:p>
+            <a:endParaRPr lang="pt-BR" dirty="0"/>
+          </a:p>
+        </p:txBody>
+      </p:sp>
+      <p:sp>
+        <p:nvSpPr>
+          <p:cNvPr id="4" name="Slide Number Placeholder 3"/>
+          <p:cNvSpPr>
+            <a:spLocks noGrp="1"/>
+          </p:cNvSpPr>
+          <p:nvPr>
+            <p:ph type="sldNum" sz="quarter" idx="12"/>
+          </p:nvPr>
+        </p:nvSpPr>
+        <p:spPr/>
+        <p:txBody>
+          <a:bodyPr/>
+          <a:lstStyle/>
+          <a:p>
+            <a:fld id="{3D12642F-FC9C-42CD-9EE4-23EF85AE02E3}" type="slidenum">
+              <a:rPr lang="pt-BR" smtClean="0"/>
+              <a:pPr/>
+              <a:t>16</a:t>
+            </a:fld>
+            <a:endParaRPr lang="pt-BR"/>
+          </a:p>
+        </p:txBody>
+      </p:sp>
+      <p:pic>
+        <p:nvPicPr>
+          <p:cNvPr id="33794" name="Picture 2"/>
+          <p:cNvPicPr>
+            <a:picLocks noChangeAspect="1" noChangeArrowheads="1"/>
+          </p:cNvPicPr>
+          <p:nvPr/>
+        </p:nvPicPr>
+        <p:blipFill>
+          <a:blip r:embed="rId2" cstate="print"/>
+          <a:srcRect/>
+          <a:stretch>
+            <a:fillRect/>
+          </a:stretch>
+        </p:blipFill>
+        <p:spPr bwMode="auto">
+          <a:xfrm>
+            <a:off x="227856" y="1110453"/>
+            <a:ext cx="8736632" cy="5460395"/>
+          </a:xfrm>
+          <a:prstGeom prst="rect">
+            <a:avLst/>
+          </a:prstGeom>
+          <a:noFill/>
+          <a:ln w="9525">
+            <a:noFill/>
+            <a:miter lim="800000"/>
+            <a:headEnd/>
+            <a:tailEnd/>
+          </a:ln>
+        </p:spPr>
+      </p:pic>
+      <p:pic>
+        <p:nvPicPr>
+          <p:cNvPr id="33795" name="Picture 3"/>
+          <p:cNvPicPr>
+            <a:picLocks noChangeAspect="1" noChangeArrowheads="1"/>
+          </p:cNvPicPr>
+          <p:nvPr/>
+        </p:nvPicPr>
+        <p:blipFill>
+          <a:blip r:embed="rId3" cstate="print"/>
+          <a:srcRect/>
+          <a:stretch>
+            <a:fillRect/>
+          </a:stretch>
+        </p:blipFill>
+        <p:spPr bwMode="auto">
+          <a:xfrm>
+            <a:off x="251520" y="5589240"/>
+            <a:ext cx="4680520" cy="2925325"/>
+          </a:xfrm>
+          <a:prstGeom prst="rect">
+            <a:avLst/>
+          </a:prstGeom>
+          <a:noFill/>
+          <a:ln w="9525">
+            <a:noFill/>
+            <a:miter lim="800000"/>
+            <a:headEnd/>
+            <a:tailEnd/>
+          </a:ln>
+        </p:spPr>
+      </p:pic>
+    </p:spTree>
+  </p:cSld>
+  <p:clrMapOvr>
+    <a:masterClrMapping/>
+  </p:clrMapOvr>
+  <p:timing>
+    <p:tnLst>
+      <p:par>
+        <p:cTn id="1" dur="indefinite" restart="never" nodeType="tmRoot"/>
+      </p:par>
+    </p:tnLst>
+  </p:timing>
+</p:sld>
+</file>
+
+<file path=ppt/slides/slide17.xml><?xml version="1.0" encoding="utf-8"?>
+<p:sld xmlns:a="http://schemas.openxmlformats.org/drawingml/2006/main" xmlns:r="http://schemas.openxmlformats.org/officeDocument/2006/relationships" xmlns:p="http://schemas.openxmlformats.org/presentationml/2006/main">
+  <p:cSld>
+    <p:spTree>
+      <p:nvGrpSpPr>
+        <p:cNvPr id="1" name=""/>
+        <p:cNvGrpSpPr/>
+        <p:nvPr/>
+      </p:nvGrpSpPr>
+      <p:grpSpPr>
+        <a:xfrm>
+          <a:off x="0" y="0"/>
+          <a:ext cx="0" cy="0"/>
+          <a:chOff x="0" y="0"/>
+          <a:chExt cx="0" cy="0"/>
+        </a:xfrm>
+      </p:grpSpPr>
+      <p:sp>
+        <p:nvSpPr>
+          <p:cNvPr id="2" name="Title 1"/>
+          <p:cNvSpPr>
+            <a:spLocks noGrp="1"/>
+          </p:cNvSpPr>
+          <p:nvPr>
+            <p:ph type="title"/>
+          </p:nvPr>
+        </p:nvSpPr>
+        <p:spPr/>
+        <p:txBody>
+          <a:bodyPr/>
+          <a:lstStyle/>
+          <a:p>
+            <a:r>
+              <a:rPr lang="pt-BR" dirty="0" smtClean="0"/>
+              <a:t>Executando o teste</a:t>
+            </a:r>
+            <a:endParaRPr lang="pt-BR" dirty="0"/>
+          </a:p>
+        </p:txBody>
+      </p:sp>
+      <p:sp>
+        <p:nvSpPr>
+          <p:cNvPr id="3" name="Content Placeholder 2"/>
+          <p:cNvSpPr>
+            <a:spLocks noGrp="1"/>
+          </p:cNvSpPr>
+          <p:nvPr>
+            <p:ph idx="1"/>
+          </p:nvPr>
+        </p:nvSpPr>
+        <p:spPr/>
+        <p:txBody>
+          <a:bodyPr/>
+          <a:lstStyle/>
+          <a:p>
+            <a:endParaRPr lang="pt-BR"/>
+          </a:p>
+        </p:txBody>
+      </p:sp>
+      <p:sp>
+        <p:nvSpPr>
+          <p:cNvPr id="4" name="Slide Number Placeholder 3"/>
+          <p:cNvSpPr>
+            <a:spLocks noGrp="1"/>
+          </p:cNvSpPr>
+          <p:nvPr>
+            <p:ph type="sldNum" sz="quarter" idx="12"/>
+          </p:nvPr>
+        </p:nvSpPr>
+        <p:spPr/>
+        <p:txBody>
+          <a:bodyPr/>
+          <a:lstStyle/>
+          <a:p>
+            <a:fld id="{3D12642F-FC9C-42CD-9EE4-23EF85AE02E3}" type="slidenum">
+              <a:rPr lang="pt-BR" smtClean="0"/>
+              <a:pPr/>
+              <a:t>17</a:t>
+            </a:fld>
+            <a:endParaRPr lang="pt-BR"/>
+          </a:p>
+        </p:txBody>
+      </p:sp>
+      <p:pic>
+        <p:nvPicPr>
+          <p:cNvPr id="34820" name="Picture 4"/>
+          <p:cNvPicPr>
+            <a:picLocks noChangeAspect="1" noChangeArrowheads="1"/>
+          </p:cNvPicPr>
+          <p:nvPr/>
+        </p:nvPicPr>
+        <p:blipFill>
+          <a:blip r:embed="rId2" cstate="print"/>
+          <a:srcRect/>
+          <a:stretch>
+            <a:fillRect/>
+          </a:stretch>
+        </p:blipFill>
+        <p:spPr bwMode="auto">
+          <a:xfrm>
+            <a:off x="827584" y="2924944"/>
+            <a:ext cx="8039100" cy="3771900"/>
+          </a:xfrm>
+          <a:prstGeom prst="rect">
+            <a:avLst/>
+          </a:prstGeom>
+          <a:noFill/>
+          <a:ln w="9525">
+            <a:noFill/>
+            <a:miter lim="800000"/>
+            <a:headEnd/>
+            <a:tailEnd/>
+          </a:ln>
+        </p:spPr>
+      </p:pic>
+      <p:pic>
+        <p:nvPicPr>
+          <p:cNvPr id="34821" name="Picture 5"/>
+          <p:cNvPicPr>
+            <a:picLocks noChangeAspect="1" noChangeArrowheads="1"/>
+          </p:cNvPicPr>
+          <p:nvPr/>
+        </p:nvPicPr>
+        <p:blipFill>
+          <a:blip r:embed="rId3" cstate="print"/>
+          <a:srcRect/>
+          <a:stretch>
+            <a:fillRect/>
+          </a:stretch>
+        </p:blipFill>
+        <p:spPr bwMode="auto">
+          <a:xfrm>
+            <a:off x="781100" y="1484784"/>
+            <a:ext cx="8362900" cy="1421693"/>
+          </a:xfrm>
+          <a:prstGeom prst="rect">
+            <a:avLst/>
+          </a:prstGeom>
+          <a:noFill/>
+          <a:ln w="9525">
+            <a:noFill/>
+            <a:miter lim="800000"/>
+            <a:headEnd/>
+            <a:tailEnd/>
+          </a:ln>
+        </p:spPr>
+      </p:pic>
+    </p:spTree>
+  </p:cSld>
+  <p:clrMapOvr>
+    <a:masterClrMapping/>
+  </p:clrMapOvr>
+  <p:timing>
+    <p:tnLst>
+      <p:par>
+        <p:cTn id="1" dur="indefinite" restart="never" nodeType="tmRoot"/>
+      </p:par>
+    </p:tnLst>
+  </p:timing>
+</p:sld>
+</file>
+
+<file path=ppt/slides/slide18.xml><?xml version="1.0" encoding="utf-8"?>
+<p:sld xmlns:a="http://schemas.openxmlformats.org/drawingml/2006/main" xmlns:r="http://schemas.openxmlformats.org/officeDocument/2006/relationships" xmlns:p="http://schemas.openxmlformats.org/presentationml/2006/main">
+  <p:cSld>
+    <p:spTree>
+      <p:nvGrpSpPr>
+        <p:cNvPr id="1" name=""/>
+        <p:cNvGrpSpPr/>
+        <p:nvPr/>
+      </p:nvGrpSpPr>
+      <p:grpSpPr>
+        <a:xfrm>
+          <a:off x="0" y="0"/>
+          <a:ext cx="0" cy="0"/>
+          <a:chOff x="0" y="0"/>
+          <a:chExt cx="0" cy="0"/>
+        </a:xfrm>
+      </p:grpSpPr>
+      <p:sp>
+        <p:nvSpPr>
+          <p:cNvPr id="2" name="Title 1"/>
+          <p:cNvSpPr>
+            <a:spLocks noGrp="1"/>
+          </p:cNvSpPr>
+          <p:nvPr>
+            <p:ph type="title"/>
+          </p:nvPr>
+        </p:nvSpPr>
+        <p:spPr/>
+        <p:txBody>
+          <a:bodyPr/>
+          <a:lstStyle/>
+          <a:p>
+            <a:r>
+              <a:rPr lang="pt-BR" dirty="0" smtClean="0"/>
+              <a:t>Exemplo</a:t>
+            </a:r>
+            <a:endParaRPr lang="pt-BR" dirty="0"/>
+          </a:p>
+        </p:txBody>
+      </p:sp>
+      <p:sp>
+        <p:nvSpPr>
+          <p:cNvPr id="3" name="Content Placeholder 2"/>
+          <p:cNvSpPr>
+            <a:spLocks noGrp="1"/>
+          </p:cNvSpPr>
+          <p:nvPr>
+            <p:ph idx="1"/>
+          </p:nvPr>
+        </p:nvSpPr>
+        <p:spPr/>
+        <p:txBody>
+          <a:bodyPr/>
+          <a:lstStyle/>
+          <a:p>
+            <a:endParaRPr lang="pt-BR"/>
+          </a:p>
+        </p:txBody>
+      </p:sp>
+      <p:sp>
+        <p:nvSpPr>
+          <p:cNvPr id="4" name="Slide Number Placeholder 3"/>
+          <p:cNvSpPr>
+            <a:spLocks noGrp="1"/>
+          </p:cNvSpPr>
+          <p:nvPr>
+            <p:ph type="sldNum" sz="quarter" idx="12"/>
+          </p:nvPr>
+        </p:nvSpPr>
+        <p:spPr/>
+        <p:txBody>
+          <a:bodyPr/>
+          <a:lstStyle/>
+          <a:p>
+            <a:fld id="{3D12642F-FC9C-42CD-9EE4-23EF85AE02E3}" type="slidenum">
+              <a:rPr lang="pt-BR" smtClean="0"/>
+              <a:pPr/>
+              <a:t>18</a:t>
+            </a:fld>
+            <a:endParaRPr lang="pt-BR"/>
+          </a:p>
+        </p:txBody>
+      </p:sp>
+      <p:pic>
+        <p:nvPicPr>
+          <p:cNvPr id="35842" name="Picture 2"/>
+          <p:cNvPicPr>
+            <a:picLocks noChangeAspect="1" noChangeArrowheads="1"/>
+          </p:cNvPicPr>
+          <p:nvPr/>
+        </p:nvPicPr>
+        <p:blipFill>
+          <a:blip r:embed="rId2" cstate="print"/>
+          <a:srcRect/>
+          <a:stretch>
+            <a:fillRect/>
+          </a:stretch>
+        </p:blipFill>
+        <p:spPr bwMode="auto">
+          <a:xfrm>
+            <a:off x="179512" y="1196752"/>
+            <a:ext cx="8663608" cy="5414755"/>
+          </a:xfrm>
+          <a:prstGeom prst="rect">
+            <a:avLst/>
+          </a:prstGeom>
+          <a:noFill/>
+          <a:ln w="9525">
+            <a:noFill/>
+            <a:miter lim="800000"/>
+            <a:headEnd/>
+            <a:tailEnd/>
+          </a:ln>
+        </p:spPr>
+      </p:pic>
+    </p:spTree>
+  </p:cSld>
+  <p:clrMapOvr>
+    <a:masterClrMapping/>
+  </p:clrMapOvr>
+  <p:timing>
+    <p:tnLst>
+      <p:par>
+        <p:cTn id="1" dur="indefinite" restart="never" nodeType="tmRoot"/>
+      </p:par>
+    </p:tnLst>
+  </p:timing>
+</p:sld>
+</file>
+
+<file path=ppt/slides/slide19.xml><?xml version="1.0" encoding="utf-8"?>
+<p:sld xmlns:a="http://schemas.openxmlformats.org/drawingml/2006/main" xmlns:r="http://schemas.openxmlformats.org/officeDocument/2006/relationships" xmlns:p="http://schemas.openxmlformats.org/presentationml/2006/main">
+  <p:cSld>
+    <p:spTree>
+      <p:nvGrpSpPr>
+        <p:cNvPr id="1" name=""/>
+        <p:cNvGrpSpPr/>
+        <p:nvPr/>
+      </p:nvGrpSpPr>
+      <p:grpSpPr>
+        <a:xfrm>
+          <a:off x="0" y="0"/>
+          <a:ext cx="0" cy="0"/>
+          <a:chOff x="0" y="0"/>
+          <a:chExt cx="0" cy="0"/>
+        </a:xfrm>
+      </p:grpSpPr>
+      <p:sp>
+        <p:nvSpPr>
+          <p:cNvPr id="2" name="Title 1"/>
+          <p:cNvSpPr>
+            <a:spLocks noGrp="1"/>
+          </p:cNvSpPr>
+          <p:nvPr>
+            <p:ph type="title"/>
+          </p:nvPr>
+        </p:nvSpPr>
+        <p:spPr/>
+        <p:txBody>
+          <a:bodyPr/>
+          <a:lstStyle/>
+          <a:p>
+            <a:r>
+              <a:rPr lang="pt-BR" dirty="0" smtClean="0"/>
+              <a:t>DOJO</a:t>
+            </a:r>
+            <a:endParaRPr lang="pt-BR" dirty="0"/>
+          </a:p>
+        </p:txBody>
+      </p:sp>
+      <p:sp>
+        <p:nvSpPr>
+          <p:cNvPr id="3" name="Content Placeholder 2"/>
+          <p:cNvSpPr>
+            <a:spLocks noGrp="1"/>
+          </p:cNvSpPr>
+          <p:nvPr>
+            <p:ph idx="1"/>
+          </p:nvPr>
+        </p:nvSpPr>
+        <p:spPr/>
+        <p:txBody>
+          <a:bodyPr/>
+          <a:lstStyle/>
+          <a:p>
+            <a:endParaRPr lang="pt-BR"/>
+          </a:p>
+        </p:txBody>
+      </p:sp>
+      <p:sp>
+        <p:nvSpPr>
+          <p:cNvPr id="4" name="Slide Number Placeholder 3"/>
+          <p:cNvSpPr>
+            <a:spLocks noGrp="1"/>
+          </p:cNvSpPr>
+          <p:nvPr>
+            <p:ph type="sldNum" sz="quarter" idx="12"/>
+          </p:nvPr>
+        </p:nvSpPr>
+        <p:spPr/>
+        <p:txBody>
+          <a:bodyPr/>
+          <a:lstStyle/>
+          <a:p>
+            <a:fld id="{3D12642F-FC9C-42CD-9EE4-23EF85AE02E3}" type="slidenum">
+              <a:rPr lang="pt-BR" smtClean="0"/>
+              <a:pPr/>
+              <a:t>19</a:t>
+            </a:fld>
+            <a:endParaRPr lang="pt-BR"/>
+          </a:p>
+        </p:txBody>
+      </p:sp>
+      <p:pic>
+        <p:nvPicPr>
+          <p:cNvPr id="36866" name="Picture 2"/>
+          <p:cNvPicPr>
+            <a:picLocks noChangeAspect="1" noChangeArrowheads="1"/>
+          </p:cNvPicPr>
+          <p:nvPr/>
+        </p:nvPicPr>
+        <p:blipFill>
+          <a:blip r:embed="rId2" cstate="print"/>
+          <a:srcRect/>
+          <a:stretch>
+            <a:fillRect/>
+          </a:stretch>
+        </p:blipFill>
+        <p:spPr bwMode="auto">
+          <a:xfrm>
+            <a:off x="1835696" y="1209153"/>
+            <a:ext cx="6697613" cy="5648847"/>
+          </a:xfrm>
+          <a:prstGeom prst="rect">
+            <a:avLst/>
+          </a:prstGeom>
+          <a:noFill/>
+          <a:ln w="9525">
+            <a:noFill/>
+            <a:miter lim="800000"/>
+            <a:headEnd/>
+            <a:tailEnd/>
+          </a:ln>
+        </p:spPr>
+      </p:pic>
+    </p:spTree>
+  </p:cSld>
+  <p:clrMapOvr>
+    <a:masterClrMapping/>
+  </p:clrMapOvr>
+  <p:timing>
+    <p:tnLst>
+      <p:par>
+        <p:cTn id="1" dur="indefinite" restart="never" nodeType="tmRoot"/>
+      </p:par>
+    </p:tnLst>
+  </p:timing>
 </p:sld>
 </file>
 
@@ -5153,6 +6682,7 @@
           <a:p>
             <a:fld id="{3D12642F-FC9C-42CD-9EE4-23EF85AE02E3}" type="slidenum">
               <a:rPr lang="pt-BR" smtClean="0"/>
+              <a:pPr/>
               <a:t>2</a:t>
             </a:fld>
             <a:endParaRPr lang="pt-BR"/>
@@ -5200,6 +6730,766 @@
 </p:sld>
 </file>
 
+<file path=ppt/slides/slide20.xml><?xml version="1.0" encoding="utf-8"?>
+<p:sld xmlns:a="http://schemas.openxmlformats.org/drawingml/2006/main" xmlns:r="http://schemas.openxmlformats.org/officeDocument/2006/relationships" xmlns:p="http://schemas.openxmlformats.org/presentationml/2006/main">
+  <p:cSld>
+    <p:spTree>
+      <p:nvGrpSpPr>
+        <p:cNvPr id="1" name=""/>
+        <p:cNvGrpSpPr/>
+        <p:nvPr/>
+      </p:nvGrpSpPr>
+      <p:grpSpPr>
+        <a:xfrm>
+          <a:off x="0" y="0"/>
+          <a:ext cx="0" cy="0"/>
+          <a:chOff x="0" y="0"/>
+          <a:chExt cx="0" cy="0"/>
+        </a:xfrm>
+      </p:grpSpPr>
+      <p:sp>
+        <p:nvSpPr>
+          <p:cNvPr id="2" name="Title 1"/>
+          <p:cNvSpPr>
+            <a:spLocks noGrp="1"/>
+          </p:cNvSpPr>
+          <p:nvPr>
+            <p:ph type="title"/>
+          </p:nvPr>
+        </p:nvSpPr>
+        <p:spPr/>
+        <p:txBody>
+          <a:bodyPr/>
+          <a:lstStyle/>
+          <a:p>
+            <a:r>
+              <a:rPr lang="pt-BR" dirty="0" smtClean="0"/>
+              <a:t>DOJO</a:t>
+            </a:r>
+            <a:endParaRPr lang="pt-BR" dirty="0"/>
+          </a:p>
+        </p:txBody>
+      </p:sp>
+      <p:sp>
+        <p:nvSpPr>
+          <p:cNvPr id="3" name="Content Placeholder 2"/>
+          <p:cNvSpPr>
+            <a:spLocks noGrp="1"/>
+          </p:cNvSpPr>
+          <p:nvPr>
+            <p:ph idx="1"/>
+          </p:nvPr>
+        </p:nvSpPr>
+        <p:spPr/>
+        <p:txBody>
+          <a:bodyPr/>
+          <a:lstStyle/>
+          <a:p>
+            <a:r>
+              <a:rPr lang="pt-BR" dirty="0" smtClean="0"/>
+              <a:t>Ambiente Seguro</a:t>
+            </a:r>
+          </a:p>
+          <a:p>
+            <a:r>
+              <a:rPr lang="pt-BR" dirty="0" smtClean="0"/>
+              <a:t>Aprendizado contínuo</a:t>
+            </a:r>
+          </a:p>
+          <a:p>
+            <a:r>
+              <a:rPr lang="pt-BR" dirty="0" smtClean="0"/>
+              <a:t>Regras:</a:t>
+            </a:r>
+          </a:p>
+          <a:p>
+            <a:pPr lvl="1"/>
+            <a:r>
+              <a:rPr lang="pt-BR" dirty="0" smtClean="0"/>
+              <a:t>Usar TDD</a:t>
+            </a:r>
+          </a:p>
+          <a:p>
+            <a:pPr lvl="1"/>
+            <a:r>
+              <a:rPr lang="pt-BR" dirty="0" smtClean="0"/>
+              <a:t>Baby </a:t>
+            </a:r>
+            <a:r>
+              <a:rPr lang="pt-BR" dirty="0" err="1" smtClean="0"/>
+              <a:t>Steps</a:t>
+            </a:r>
+            <a:endParaRPr lang="pt-BR" dirty="0" smtClean="0"/>
+          </a:p>
+          <a:p>
+            <a:pPr lvl="1"/>
+            <a:r>
+              <a:rPr lang="pt-BR" dirty="0" smtClean="0"/>
+              <a:t>Programação em Par</a:t>
+            </a:r>
+          </a:p>
+          <a:p>
+            <a:pPr lvl="1"/>
+            <a:r>
+              <a:rPr lang="pt-BR" dirty="0" smtClean="0"/>
+              <a:t>Todos devem entender</a:t>
+            </a:r>
+            <a:endParaRPr lang="pt-BR" dirty="0"/>
+          </a:p>
+        </p:txBody>
+      </p:sp>
+      <p:sp>
+        <p:nvSpPr>
+          <p:cNvPr id="4" name="Slide Number Placeholder 3"/>
+          <p:cNvSpPr>
+            <a:spLocks noGrp="1"/>
+          </p:cNvSpPr>
+          <p:nvPr>
+            <p:ph type="sldNum" sz="quarter" idx="12"/>
+          </p:nvPr>
+        </p:nvSpPr>
+        <p:spPr/>
+        <p:txBody>
+          <a:bodyPr/>
+          <a:lstStyle/>
+          <a:p>
+            <a:fld id="{3D12642F-FC9C-42CD-9EE4-23EF85AE02E3}" type="slidenum">
+              <a:rPr lang="pt-BR" smtClean="0"/>
+              <a:pPr/>
+              <a:t>20</a:t>
+            </a:fld>
+            <a:endParaRPr lang="pt-BR"/>
+          </a:p>
+        </p:txBody>
+      </p:sp>
+    </p:spTree>
+  </p:cSld>
+  <p:clrMapOvr>
+    <a:masterClrMapping/>
+  </p:clrMapOvr>
+  <p:timing>
+    <p:tnLst>
+      <p:par>
+        <p:cTn id="1" dur="indefinite" restart="never" nodeType="tmRoot"/>
+      </p:par>
+    </p:tnLst>
+  </p:timing>
+</p:sld>
+</file>
+
+<file path=ppt/slides/slide21.xml><?xml version="1.0" encoding="utf-8"?>
+<p:sld xmlns:a="http://schemas.openxmlformats.org/drawingml/2006/main" xmlns:r="http://schemas.openxmlformats.org/officeDocument/2006/relationships" xmlns:p="http://schemas.openxmlformats.org/presentationml/2006/main">
+  <p:cSld>
+    <p:spTree>
+      <p:nvGrpSpPr>
+        <p:cNvPr id="1" name=""/>
+        <p:cNvGrpSpPr/>
+        <p:nvPr/>
+      </p:nvGrpSpPr>
+      <p:grpSpPr>
+        <a:xfrm>
+          <a:off x="0" y="0"/>
+          <a:ext cx="0" cy="0"/>
+          <a:chOff x="0" y="0"/>
+          <a:chExt cx="0" cy="0"/>
+        </a:xfrm>
+      </p:grpSpPr>
+      <p:sp>
+        <p:nvSpPr>
+          <p:cNvPr id="2" name="Title 1"/>
+          <p:cNvSpPr>
+            <a:spLocks noGrp="1"/>
+          </p:cNvSpPr>
+          <p:nvPr>
+            <p:ph type="title"/>
+          </p:nvPr>
+        </p:nvSpPr>
+        <p:spPr/>
+        <p:txBody>
+          <a:bodyPr/>
+          <a:lstStyle/>
+          <a:p>
+            <a:r>
+              <a:rPr lang="pt-BR" dirty="0" smtClean="0"/>
+              <a:t>Vamos praticar?</a:t>
+            </a:r>
+            <a:endParaRPr lang="pt-BR" dirty="0"/>
+          </a:p>
+        </p:txBody>
+      </p:sp>
+      <p:sp>
+        <p:nvSpPr>
+          <p:cNvPr id="3" name="Content Placeholder 2"/>
+          <p:cNvSpPr>
+            <a:spLocks noGrp="1"/>
+          </p:cNvSpPr>
+          <p:nvPr>
+            <p:ph idx="1"/>
+          </p:nvPr>
+        </p:nvSpPr>
+        <p:spPr>
+          <a:xfrm>
+            <a:off x="1435608" y="1268760"/>
+            <a:ext cx="7498080" cy="4800600"/>
+          </a:xfrm>
+        </p:spPr>
+        <p:txBody>
+          <a:bodyPr/>
+          <a:lstStyle/>
+          <a:p>
+            <a:endParaRPr lang="pt-BR"/>
+          </a:p>
+        </p:txBody>
+      </p:sp>
+      <p:sp>
+        <p:nvSpPr>
+          <p:cNvPr id="4" name="Slide Number Placeholder 3"/>
+          <p:cNvSpPr>
+            <a:spLocks noGrp="1"/>
+          </p:cNvSpPr>
+          <p:nvPr>
+            <p:ph type="sldNum" sz="quarter" idx="12"/>
+          </p:nvPr>
+        </p:nvSpPr>
+        <p:spPr/>
+        <p:txBody>
+          <a:bodyPr/>
+          <a:lstStyle/>
+          <a:p>
+            <a:fld id="{3D12642F-FC9C-42CD-9EE4-23EF85AE02E3}" type="slidenum">
+              <a:rPr lang="pt-BR" smtClean="0"/>
+              <a:pPr/>
+              <a:t>21</a:t>
+            </a:fld>
+            <a:endParaRPr lang="pt-BR"/>
+          </a:p>
+        </p:txBody>
+      </p:sp>
+      <p:sp>
+        <p:nvSpPr>
+          <p:cNvPr id="37890" name="AutoShape 2" descr="data:image/jpeg;base64,/9j/4AAQSkZJRgABAQAAAQABAAD/2wCEAAkGBwwPDQ8NDQ8PDQ8NDQ8MDAwMDQ8NDQwNFBEWFhQRFBQYHCggGBonHBQUITMiJikrLi4uFx8zRDMsOCgtLisBCgoKDg0OGhAQGiwlHyUtLSwsLCwsLCwsLCwsLCwtLCwsLCwsLCwsLCwsLCwsLCwsLCwsLCwsLCwsLCwsLCwsLP/AABEIANAA8gMBEQACEQEDEQH/xAAcAAEAAgMBAQEAAAAAAAAAAAAAAgMBBAUHBgj/xAA5EAACAgEBBQQHBwIHAAAAAAAAAQIDEQQFBhIhMRNBYXEHIjJRcoGxFDNCUpGhwSOCU2KjwtHS4v/EABsBAQEAAwEBAQAAAAAAAAAAAAABAgMEBQYH/8QAKBEBAAICAQQBAwQDAAAAAAAAAAECAxEEBRIhMUETIjJRYXGhBiMz/9oADAMBAAIRAxEAPwD3EAAAAAAAAAAAAAAAAAAAAAAAAAAAAAAAAAAAAAAAAAAAAAAAAAAAAAAAAAAAAAAAAAAAAAAAAAAAAAAAAAAAAAAAAAAAAAAAAAAAAAAAAAAAAwAAAAAAAAAAAAAABoarbGkqvq01t0IXX57KqUkpT+RjNoidNtcN7Vm0R4hvmTUAAAAAAAAAAAAAAyAAAAMAAAAAAAAAAAABrbT1kNPRbqJ8o01ztk3yWIrJLTqNs8dJvaKx8vD92fSRq6tfO/VWTuovn/WocuJUR/C613Y5cl18zirntW259PqM3TMWTDFcfi0f2+c3n2vdtHbF06Izsd13Z6WEc8brhyhw+5tLi+Yv9890Jx5ji0jHeP5et+jffxa1fZNY1DVw5Rb9X7Ql15d013r5+W7Fl34n28rn8GMf+zH5rP8AT7TXbW0enwtRqKaG+itthBvyTZum0R7l5+PBkyfjWZW6PXae+PHRbXdH81U42R/VFiYn0xvjvT8omGwVgAAAAAAAAAAGQAAAAAAAAAAAAAAAGGwPifSytRZsm2vTYcnOt2w4lGVlCeZRjnq8pcu9ZRryxuuodnCtWmWLWeVbg7v03VayethKPa1xq0v4bYTUuJ2JPpjEV45Zqrj3Gpd+XmzjyRakqNiTjs3atV2rqcnp5NrheE8ppWr8yw3yNFd4refT1c1a83B3V9r9+draG/Xx1eg4qrOUrrIepCdyeY2Q71L3vv5eIy3iZ3U4HGtjpNMvr9HC1GrndZK22crLJvM7JvilJ+ZzWmZ8y9rDXHSuqRpds3aF+mtV2mslTYvxQeM+El0a8GK3tWdwZuNizV7bxt95sv0t66DS1dFV8eScquKmzHe8NtN/odNeXPzDws/+PUnzjtpXvt6SrnqNHZs3UOursnO2pxWe24/YtT7sJfqzbfNvzWXDxunRSbVz1/iXrG7216tbpKtVV7NscuOcuE1ylF+KeUdNLd0beNyMM4rzSXSMmlkAAAAAAAAAAAYAAAAAAAbAAAABoDQ1mz42JqSTz7yMolxb93ILnCKi/BEXb4zfTc/Uaitdmo9pXns596T6xfgzC+OLOzi8u+CfDzu3dXV157dWJrOOzimsmuMMOqep3m23Fu7Wp4nFrHfh4Zqtgeji6pWY8s1atZ/5NVsUw9DD1CkzrbdhNM0TEw9WmSLQhdKPR889EZV2055p6l9Fu3vftHZ9UqdLOChOztWrYdpwywk+HnyzhGdc9qxqHHm6ThzzFrvu91/Sq52Rp2lCEFNqK1NKahFvpxxeWl4o6cfK34s8bm9BnHWbYp3+z1GEk0mnlNZTXRo7HzkxqdSyEAAAABkAAAAYAAAAAABVqn6jfuw/3QGKr0+vX3gXAAAAA0BTZp4sml252r2PXPrFP5DS7fN7T3M09mc1x/QaZbfHbW9HqWXVHHkTTKLzE7h8NtPZVmksxZ0aeI+RxZ6RD6XpXKvaJ7vhTdsfWxj9psqcaklmTkspPo8CcWqsq86t88QjXNHJMPoKZI0lOa+RNM7ZIe/+i2+6extNK5ttdpGuUurpjZJQ/ZY8kj1cG+yNvz7qcUjk27H1hucAAAAAMgAAAAAAAAAACnVfdy+X1A062BfCTAtVjAmpgS4gHEBjiQGHNAU2XL3fqRXL2jqZcLxhcu5BlDxXe6p3bQpqfPtbEnn8rms/tk5c3m0Pc6dPbhvMPSNFs+uUXCcVOEouMoyWVKLWGmdPb408Wclot3Q+T2j6Ir5Sdmz9RDs3LlTqeJTh4KazxLn3pfM57cfb2MPWLVjVob27/oemrI2bR1EJwi8vT6ZS9fwlY8YXgl8xXjxHtM/Wr2jVI09Y09EK4RrrioQrioQhFJRjFLCSR06+IeJa02ncrSoAAAAAAAAAAAAAAAAKtT93L4WBz62BdFgWJgTTAkmBnIEXICEpBWvbMg5WvlyYZQ8y3wo7O7R6pfh1kK5v/K3xf7ZHPmjzEvX6db7b0/Z6PpUdEPIv4mYfQ7L+7fxP6IrBtgAMgAAAAAAAAAAAAAAAAFeo9ifwv6AcutgXRYFiYE0wJZAcQEHICqcwrUusIrkbQvwmFh5tvztiDqekUZOybjbGfSNfDLk8976nPnvqNPY6Xx7XtNoejbC10NRp6tRDKjbBSSfWL70/mbqW3DzeVjmmWYl9Vsv7r+5mbmbgAAAAAAAAAAAAAAAAAAAQuXqS+F/QDjVMC+LAsTAmmBnIGHICEpAUWTIrQ1FgVx9bLPIMnz2192qdbBQlJ12QbdV0ebjnqmu9Gu9ItDq4vKtht4dP0faiL2fXUlwy00p6a6PerIyeW/PqMU+NLz6zF+6fl6Dsv7pecvqbXA2wMgAAAAAAAAAADAAAAAAAI2dH5P6AcKpgXxYFqYEkwM5Aw5AVTkBq3TIrm6mwK5d9gVrajaFWnqnfa8QgsvHWT7orxbMbW7Y23YMNs14rDzqrePV1Xam3SS+zR1dvbTrSjZwy5+9dXl55HnTmtE+H2VOl0tSIyedPs9xvSLqvtNOk1vDbXfZGmFyjwTrsm8Rzjk020vDJuw8iZnUvM6j0alMc5Mfx8PYUdz5cAAAAAABkAAAAYAAAAAABiXR+QHztbAvgwLUwJJgZyBGUgKLJhWlqLCK5WqtCubbYQfK+kGcvs9CXsu9uXxKD4frI5+R6e10bX1J2+Mja8Y95wTD66Mnhv7v1St1+jqhlynq6Esc8LtE2/kk38jPFXdocvPyxGC0z+j9PI9Z+fMgAAAAAAyAAAAAGAADIGMgYbAxkD5yL5vzf1AujIC1SAmpAOICEpAa9siK5+pmFcjVTCufKfMg4G+20aIaX7PODtstxKuKfD2TXSxv+O805bRrT1On4Ms276vPIWy6NM5JrD6Gma/qYeuehTd2ElPalqbnCyVGlTXqpcK47F73zcfkzpwUj8ni9X5N9xieu5Op4LOQM5AZAyAAAZAAAAGAAGGwMNgRbAw2BFyA+cb9eXxP6gXRkBZGQE1IDLYFc2BrWyIrnamQVx9VIK0uLmYz6ZVjdnmm1NU53WWSeXK2WH7o55JeCR51p7rS+2w1riw1iGszB0+HvPojWNi0eNt7/ANWR6OD8HxnVfPIl9nxG55ySYGcgZyBnIGcgZAyAAAAIgYbAw2BFsCLYEHICEpAfP2P+pP45fUCyEgLYyAmpAOICE5Aat0iK52pkFcfVSIrm6q3hhOX5YSf7GN/TfgjeSIeX6iWXH9X5nBX5fX5p81rCeeRhp0b8P0RuBp3TsnRwaw3SrJL3OfrfyeljjVXxPOv3Zpl9EpGxyJqQEkwJJgSTAygMgSQAAAAgwMMCLYEGwINgVykBVOYHBul/Vn8TAshIC1SAmpAZcgK5yA1rWRXO1LCuPqmFcbbNnDpb37qp488cjXk/GXVwo3mrDzdrMvLkcPqH1Wt2WSTwYx7b7VntfpjZs12FOOS7GvC9y4Vg9Ovp8Nn/AOkt2MjJqWxkBNMCaYEkwJJgSQEkBkAAArYEWBFgQbAhJgUzYGrdMDh2T/qS8/4AuhIC1SAmpAZcgISkBrWsK0NQyK5OpQHzm9UrFpZKEeJTko2NJvgh1zheSNObfb4el02K/V3aXwUE0zjn0+kx7i3ls6aiV1sKYe1bONcfDLxkUruWXIzRSky/RWiklCEV0jGMV5JYR6UeIfEZLd1plv1yKwXxYFkWBYmBJATTAygLIgZAAAK2BFgRYEGBVICmYGrcgOBq/Ut58lPo+7i9wFkJAXRkBYpAZ4gISkBRZIDRvZFc28K4u8N3Z6S+S5Pg4E/GTUV9TXln7ZdfBp3Zoh8RsXZUtXeqYequFynP8kV0/fBx0r3S+k5eeuGm23uLpZPadcZ8pVuzk+6cU019TdSI79ODk2tPH7numlWEkdb51vVsDYiwLYsCxMCaAkgJIC2PQDIAABWwIsCLAgwK5AVSQGvZEDn6zSxmnGSymBx7K7qXzTth3Nc7I+a7/r5gWUaqE/Zkm11j0kvNdwGwpAZ4gIykBTZIDUuZFc69hXD3irVmltg2k+FSjl4zKLUkv2MMkbrLr4WT6eWsub6P1OTvhWkm+zlKb6qPrYWO/ozRx59w9PrFZ+2YZjp1o94ak36ttsJ597ti4vP9zyLfbkhcM/V4kx+j16lHU+f026yovgwLYgWoCSAmgJoCyHQCQAABWBFgRYEGBCSArkgKpRApsgBrWUgc/VbMrn7UU2ukukl5PqgNOWzbY/d3TXuU8WL9+YFbjrI/4VnylW/5AhK7Vd9MPlc/+oFM7tV/gR+d3/kKosjq5fhqh852P+CDWls66Xt2vyhFRX8sK5Nm09l0XumyWbE+Cc5RlNRfenNmq2SseHbi4eWYi8R4fB622VM7VXZKKVso5rm4qUVJ8L5PmjkjfdOn0dorOGs3Thte+2+iy6xzendaja+c+CM+LMn3tGUzO4200pWK27fl+gqZ5O2PT5e9dWlt1srDTYgyi2IRbECaAmgJIC2HQCQAABBgRwBFgRaAi0BCSArcQK5RAqlACuVYFUqgK5UgVSpCq5UkFE6QrU1NLw8EllDy/eLdjVK6y2CdsbJubS9tN9fM5cmOfcPf4nNpFYpZz93tHJ6qFc65c1OMoyg+XLvMMdZ7vLp5uSk4ftl9hTuLpLJqUoyis5lGEuFM6JxxMvHpy71jT0XTV4SNseIcN53O27XErBsQQRdFBFkUUTSCJoCSAth0AkAAARYEWBhgRaAi0BFoCLiBW4gQcQIOAEHACDgBCUCKrlWFVSqApnQRlDWs0kX3ElsrZCvQxTzhE1DZ9SdabtOnS7itcy3K6ysGxCBWK2MQi2KAsSKiSQEkESQFsegGQAADAGAMARYGGgItARaAi0BBxAi4gRcQIuIEHEioOAFbgFQlWGUIdkRdsqoLtbCsC6MAiyMQxWxiVFiQE0giSRUSSAzgCcQMgAAGAAGAMAYwBFoDGAItAYaAi0BFxAi4gRcQqLiRUHECPARWOzCsqAE4wAsUQJqIROKKkppASSKiSQRIDOAMoDIAAB//2Q=="/>
+          <p:cNvSpPr>
+            <a:spLocks noChangeAspect="1" noChangeArrowheads="1"/>
+          </p:cNvSpPr>
+          <p:nvPr/>
+        </p:nvSpPr>
+        <p:spPr bwMode="auto">
+          <a:xfrm>
+            <a:off x="155575" y="-144463"/>
+            <a:ext cx="304800" cy="304801"/>
+          </a:xfrm>
+          <a:prstGeom prst="rect">
+            <a:avLst/>
+          </a:prstGeom>
+          <a:noFill/>
+        </p:spPr>
+        <p:txBody>
+          <a:bodyPr vert="horz" wrap="square" lIns="91440" tIns="45720" rIns="91440" bIns="45720" numCol="1" anchor="t" anchorCtr="0" compatLnSpc="1">
+            <a:prstTxWarp prst="textNoShape">
+              <a:avLst/>
+            </a:prstTxWarp>
+          </a:bodyPr>
+          <a:lstStyle/>
+          <a:p>
+            <a:endParaRPr lang="pt-BR"/>
+          </a:p>
+        </p:txBody>
+      </p:sp>
+      <p:sp>
+        <p:nvSpPr>
+          <p:cNvPr id="37892" name="AutoShape 4" descr="data:image/jpeg;base64,/9j/4AAQSkZJRgABAQAAAQABAAD/2wCEAAkGBwwPDQ8NDQ8PDQ8NDQ8MDAwMDQ8NDQwNFBEWFhQRFBQYHCggGBonHBQUITMiJikrLi4uFx8zRDMsOCgtLisBCgoKDg0OGhAQGiwlHyUtLSwsLCwsLCwsLCwsLCwtLCwsLCwsLCwsLCwsLCwsLCwsLCwsLCwsLCwsLCwsLCwsLP/AABEIANAA8gMBEQACEQEDEQH/xAAcAAEAAgMBAQEAAAAAAAAAAAAAAgMBBAUHBgj/xAA5EAACAgEBBQQHBwIHAAAAAAAAAQIDEQQFBhIhMRNBYXEHIjJRcoGxFDNCUpGhwSOCU2KjwtHS4v/EABsBAQEAAwEBAQAAAAAAAAAAAAABAgMEBQYH/8QAKBEBAAICAQQBAwQDAAAAAAAAAAECAxEEBRIhMUETIjJRYXGhBiMz/9oADAMBAAIRAxEAPwD3EAAAAAAAAAAAAAAAAAAAAAAAAAAAAAAAAAAAAAAAAAAAAAAAAAAAAAAAAAAAAAAAAAAAAAAAAAAAAAAAAAAAAAAAAAAAAAAAAAAAAAAAAAAAAwAAAAAAAAAAAAAABoarbGkqvq01t0IXX57KqUkpT+RjNoidNtcN7Vm0R4hvmTUAAAAAAAAAAAAAAyAAAAMAAAAAAAAAAAABrbT1kNPRbqJ8o01ztk3yWIrJLTqNs8dJvaKx8vD92fSRq6tfO/VWTuovn/WocuJUR/C613Y5cl18zirntW259PqM3TMWTDFcfi0f2+c3n2vdtHbF06Izsd13Z6WEc8brhyhw+5tLi+Yv9890Jx5ji0jHeP5et+jffxa1fZNY1DVw5Rb9X7Ql15d013r5+W7Fl34n28rn8GMf+zH5rP8AT7TXbW0enwtRqKaG+itthBvyTZum0R7l5+PBkyfjWZW6PXae+PHRbXdH81U42R/VFiYn0xvjvT8omGwVgAAAAAAAAAAGQAAAAAAAAAAAAAAAGGwPifSytRZsm2vTYcnOt2w4lGVlCeZRjnq8pcu9ZRryxuuodnCtWmWLWeVbg7v03VayethKPa1xq0v4bYTUuJ2JPpjEV45Zqrj3Gpd+XmzjyRakqNiTjs3atV2rqcnp5NrheE8ppWr8yw3yNFd4refT1c1a83B3V9r9+draG/Xx1eg4qrOUrrIepCdyeY2Q71L3vv5eIy3iZ3U4HGtjpNMvr9HC1GrndZK22crLJvM7JvilJ+ZzWmZ8y9rDXHSuqRpds3aF+mtV2mslTYvxQeM+El0a8GK3tWdwZuNizV7bxt95sv0t66DS1dFV8eScquKmzHe8NtN/odNeXPzDws/+PUnzjtpXvt6SrnqNHZs3UOursnO2pxWe24/YtT7sJfqzbfNvzWXDxunRSbVz1/iXrG7216tbpKtVV7NscuOcuE1ylF+KeUdNLd0beNyMM4rzSXSMmlkAAAAAAAAAAAYAAAAAAAbAAAABoDQ1mz42JqSTz7yMolxb93ILnCKi/BEXb4zfTc/Uaitdmo9pXns596T6xfgzC+OLOzi8u+CfDzu3dXV157dWJrOOzimsmuMMOqep3m23Fu7Wp4nFrHfh4Zqtgeji6pWY8s1atZ/5NVsUw9DD1CkzrbdhNM0TEw9WmSLQhdKPR889EZV2055p6l9Fu3vftHZ9UqdLOChOztWrYdpwywk+HnyzhGdc9qxqHHm6ThzzFrvu91/Sq52Rp2lCEFNqK1NKahFvpxxeWl4o6cfK34s8bm9BnHWbYp3+z1GEk0mnlNZTXRo7HzkxqdSyEAAAABkAAAAYAAAAAABVqn6jfuw/3QGKr0+vX3gXAAAAA0BTZp4sml252r2PXPrFP5DS7fN7T3M09mc1x/QaZbfHbW9HqWXVHHkTTKLzE7h8NtPZVmksxZ0aeI+RxZ6RD6XpXKvaJ7vhTdsfWxj9psqcaklmTkspPo8CcWqsq86t88QjXNHJMPoKZI0lOa+RNM7ZIe/+i2+6extNK5ttdpGuUurpjZJQ/ZY8kj1cG+yNvz7qcUjk27H1hucAAAAAMgAAAAAAAAAACnVfdy+X1A062BfCTAtVjAmpgS4gHEBjiQGHNAU2XL3fqRXL2jqZcLxhcu5BlDxXe6p3bQpqfPtbEnn8rms/tk5c3m0Pc6dPbhvMPSNFs+uUXCcVOEouMoyWVKLWGmdPb408Wclot3Q+T2j6Ir5Sdmz9RDs3LlTqeJTh4KazxLn3pfM57cfb2MPWLVjVob27/oemrI2bR1EJwi8vT6ZS9fwlY8YXgl8xXjxHtM/Wr2jVI09Y09EK4RrrioQrioQhFJRjFLCSR06+IeJa02ncrSoAAAAAAAAAAAAAAAAKtT93L4WBz62BdFgWJgTTAkmBnIEXICEpBWvbMg5WvlyYZQ8y3wo7O7R6pfh1kK5v/K3xf7ZHPmjzEvX6db7b0/Z6PpUdEPIv4mYfQ7L+7fxP6IrBtgAMgAAAAAAAAAAAAAAAAFeo9ifwv6AcutgXRYFiYE0wJZAcQEHICqcwrUusIrkbQvwmFh5tvztiDqekUZOybjbGfSNfDLk8976nPnvqNPY6Xx7XtNoejbC10NRp6tRDKjbBSSfWL70/mbqW3DzeVjmmWYl9Vsv7r+5mbmbgAAAAAAAAAAAAAAAAAAAQuXqS+F/QDjVMC+LAsTAmmBnIGHICEpAUWTIrQ1FgVx9bLPIMnz2192qdbBQlJ12QbdV0ebjnqmu9Gu9ItDq4vKtht4dP0faiL2fXUlwy00p6a6PerIyeW/PqMU+NLz6zF+6fl6Dsv7pecvqbXA2wMgAAAAAAAAAADAAAAAAAI2dH5P6AcKpgXxYFqYEkwM5Aw5AVTkBq3TIrm6mwK5d9gVrajaFWnqnfa8QgsvHWT7orxbMbW7Y23YMNs14rDzqrePV1Xam3SS+zR1dvbTrSjZwy5+9dXl55HnTmtE+H2VOl0tSIyedPs9xvSLqvtNOk1vDbXfZGmFyjwTrsm8Rzjk020vDJuw8iZnUvM6j0alMc5Mfx8PYUdz5cAAAAAABkAAAAYAAAAAABiXR+QHztbAvgwLUwJJgZyBGUgKLJhWlqLCK5WqtCubbYQfK+kGcvs9CXsu9uXxKD4frI5+R6e10bX1J2+Mja8Y95wTD66Mnhv7v1St1+jqhlynq6Esc8LtE2/kk38jPFXdocvPyxGC0z+j9PI9Z+fMgAAAAAAyAAAAAGAADIGMgYbAxkD5yL5vzf1AujIC1SAmpAOICEpAa9siK5+pmFcjVTCufKfMg4G+20aIaX7PODtstxKuKfD2TXSxv+O805bRrT1On4Ms276vPIWy6NM5JrD6Gma/qYeuehTd2ElPalqbnCyVGlTXqpcK47F73zcfkzpwUj8ni9X5N9xieu5Op4LOQM5AZAyAAAZAAAAGAAGGwMNgRbAw2BFyA+cb9eXxP6gXRkBZGQE1IDLYFc2BrWyIrnamQVx9VIK0uLmYz6ZVjdnmm1NU53WWSeXK2WH7o55JeCR51p7rS+2w1riw1iGszB0+HvPojWNi0eNt7/ANWR6OD8HxnVfPIl9nxG55ySYGcgZyBnIGcgZAyAAAAIgYbAw2BFsCLYEHICEpAfP2P+pP45fUCyEgLYyAmpAOICE5Aat0iK52pkFcfVSIrm6q3hhOX5YSf7GN/TfgjeSIeX6iWXH9X5nBX5fX5p81rCeeRhp0b8P0RuBp3TsnRwaw3SrJL3OfrfyeljjVXxPOv3Zpl9EpGxyJqQEkwJJgSTAygMgSQAAAAgwMMCLYEGwINgVykBVOYHBul/Vn8TAshIC1SAmpAZcgK5yA1rWRXO1LCuPqmFcbbNnDpb37qp488cjXk/GXVwo3mrDzdrMvLkcPqH1Wt2WSTwYx7b7VntfpjZs12FOOS7GvC9y4Vg9Ovp8Nn/AOkt2MjJqWxkBNMCaYEkwJJgSQEkBkAAArYEWBFgQbAhJgUzYGrdMDh2T/qS8/4AuhIC1SAmpAZcgISkBrWsK0NQyK5OpQHzm9UrFpZKEeJTko2NJvgh1zheSNObfb4el02K/V3aXwUE0zjn0+kx7i3ls6aiV1sKYe1bONcfDLxkUruWXIzRSky/RWiklCEV0jGMV5JYR6UeIfEZLd1plv1yKwXxYFkWBYmBJATTAygLIgZAAAK2BFgRYEGBVICmYGrcgOBq/Ut58lPo+7i9wFkJAXRkBYpAZ4gISkBRZIDRvZFc28K4u8N3Z6S+S5Pg4E/GTUV9TXln7ZdfBp3Zoh8RsXZUtXeqYequFynP8kV0/fBx0r3S+k5eeuGm23uLpZPadcZ8pVuzk+6cU019TdSI79ODk2tPH7numlWEkdb51vVsDYiwLYsCxMCaAkgJIC2PQDIAABWwIsCLAgwK5AVSQGvZEDn6zSxmnGSymBx7K7qXzTth3Nc7I+a7/r5gWUaqE/Zkm11j0kvNdwGwpAZ4gIykBTZIDUuZFc69hXD3irVmltg2k+FSjl4zKLUkv2MMkbrLr4WT6eWsub6P1OTvhWkm+zlKb6qPrYWO/ozRx59w9PrFZ+2YZjp1o94ak36ttsJ597ti4vP9zyLfbkhcM/V4kx+j16lHU+f026yovgwLYgWoCSAmgJoCyHQCQAABWBFgRYEGBCSArkgKpRApsgBrWUgc/VbMrn7UU2ukukl5PqgNOWzbY/d3TXuU8WL9+YFbjrI/4VnylW/5AhK7Vd9MPlc/+oFM7tV/gR+d3/kKosjq5fhqh852P+CDWls66Xt2vyhFRX8sK5Nm09l0XumyWbE+Cc5RlNRfenNmq2SseHbi4eWYi8R4fB622VM7VXZKKVso5rm4qUVJ8L5PmjkjfdOn0dorOGs3Thte+2+iy6xzendaja+c+CM+LMn3tGUzO4200pWK27fl+gqZ5O2PT5e9dWlt1srDTYgyi2IRbECaAmgJIC2HQCQAABBgRwBFgRaAi0BCSArcQK5RAqlACuVYFUqgK5UgVSpCq5UkFE6QrU1NLw8EllDy/eLdjVK6y2CdsbJubS9tN9fM5cmOfcPf4nNpFYpZz93tHJ6qFc65c1OMoyg+XLvMMdZ7vLp5uSk4ftl9hTuLpLJqUoyis5lGEuFM6JxxMvHpy71jT0XTV4SNseIcN53O27XErBsQQRdFBFkUUTSCJoCSAth0AkAAARYEWBhgRaAi0BFoCLiBW4gQcQIOAEHACDgBCUCKrlWFVSqApnQRlDWs0kX3ElsrZCvQxTzhE1DZ9SdabtOnS7itcy3K6ysGxCBWK2MQi2KAsSKiSQEkESQFsegGQAADAGAMARYGGgItARaAi0BBxAi4gRcQIuIEHEioOAFbgFQlWGUIdkRdsqoLtbCsC6MAiyMQxWxiVFiQE0giSRUSSAzgCcQMgAAGAAGAMAYwBFoDGAItAYaAi0BFxAi4gRcQqLiRUHECPARWOzCsqAE4wAsUQJqIROKKkppASSKiSQRIDOAMoDIAAB//2Q=="/>
+          <p:cNvSpPr>
+            <a:spLocks noChangeAspect="1" noChangeArrowheads="1"/>
+          </p:cNvSpPr>
+          <p:nvPr/>
+        </p:nvSpPr>
+        <p:spPr bwMode="auto">
+          <a:xfrm>
+            <a:off x="155575" y="-144463"/>
+            <a:ext cx="304800" cy="304801"/>
+          </a:xfrm>
+          <a:prstGeom prst="rect">
+            <a:avLst/>
+          </a:prstGeom>
+          <a:noFill/>
+        </p:spPr>
+        <p:txBody>
+          <a:bodyPr vert="horz" wrap="square" lIns="91440" tIns="45720" rIns="91440" bIns="45720" numCol="1" anchor="t" anchorCtr="0" compatLnSpc="1">
+            <a:prstTxWarp prst="textNoShape">
+              <a:avLst/>
+            </a:prstTxWarp>
+          </a:bodyPr>
+          <a:lstStyle/>
+          <a:p>
+            <a:endParaRPr lang="pt-BR"/>
+          </a:p>
+        </p:txBody>
+      </p:sp>
+      <p:sp>
+        <p:nvSpPr>
+          <p:cNvPr id="37894" name="AutoShape 6" descr="data:image/jpeg;base64,/9j/4AAQSkZJRgABAQAAAQABAAD/2wCEAAkGBwwPDQ8NDQ8PDQ8NDQ8MDAwMDQ8NDQwNFBEWFhQRFBQYHCggGBonHBQUITMiJikrLi4uFx8zRDMsOCgtLisBCgoKDg0OGhAQGiwlHyUtLSwsLCwsLCwsLCwsLCwtLCwsLCwsLCwsLCwsLCwsLCwsLCwsLCwsLCwsLCwsLCwsLP/AABEIANAA8gMBEQACEQEDEQH/xAAcAAEAAgMBAQEAAAAAAAAAAAAAAgMBBAUHBgj/xAA5EAACAgEBBQQHBwIHAAAAAAAAAQIDEQQFBhIhMRNBYXEHIjJRcoGxFDNCUpGhwSOCU2KjwtHS4v/EABsBAQEAAwEBAQAAAAAAAAAAAAABAgMEBQYH/8QAKBEBAAICAQQBAwQDAAAAAAAAAAECAxEEBRIhMUETIjJRYXGhBiMz/9oADAMBAAIRAxEAPwD3EAAAAAAAAAAAAAAAAAAAAAAAAAAAAAAAAAAAAAAAAAAAAAAAAAAAAAAAAAAAAAAAAAAAAAAAAAAAAAAAAAAAAAAAAAAAAAAAAAAAAAAAAAAAAwAAAAAAAAAAAAAABoarbGkqvq01t0IXX57KqUkpT+RjNoidNtcN7Vm0R4hvmTUAAAAAAAAAAAAAAyAAAAMAAAAAAAAAAAABrbT1kNPRbqJ8o01ztk3yWIrJLTqNs8dJvaKx8vD92fSRq6tfO/VWTuovn/WocuJUR/C613Y5cl18zirntW259PqM3TMWTDFcfi0f2+c3n2vdtHbF06Izsd13Z6WEc8brhyhw+5tLi+Yv9890Jx5ji0jHeP5et+jffxa1fZNY1DVw5Rb9X7Ql15d013r5+W7Fl34n28rn8GMf+zH5rP8AT7TXbW0enwtRqKaG+itthBvyTZum0R7l5+PBkyfjWZW6PXae+PHRbXdH81U42R/VFiYn0xvjvT8omGwVgAAAAAAAAAAGQAAAAAAAAAAAAAAAGGwPifSytRZsm2vTYcnOt2w4lGVlCeZRjnq8pcu9ZRryxuuodnCtWmWLWeVbg7v03VayethKPa1xq0v4bYTUuJ2JPpjEV45Zqrj3Gpd+XmzjyRakqNiTjs3atV2rqcnp5NrheE8ppWr8yw3yNFd4refT1c1a83B3V9r9+draG/Xx1eg4qrOUrrIepCdyeY2Q71L3vv5eIy3iZ3U4HGtjpNMvr9HC1GrndZK22crLJvM7JvilJ+ZzWmZ8y9rDXHSuqRpds3aF+mtV2mslTYvxQeM+El0a8GK3tWdwZuNizV7bxt95sv0t66DS1dFV8eScquKmzHe8NtN/odNeXPzDws/+PUnzjtpXvt6SrnqNHZs3UOursnO2pxWe24/YtT7sJfqzbfNvzWXDxunRSbVz1/iXrG7216tbpKtVV7NscuOcuE1ylF+KeUdNLd0beNyMM4rzSXSMmlkAAAAAAAAAAAYAAAAAAAbAAAABoDQ1mz42JqSTz7yMolxb93ILnCKi/BEXb4zfTc/Uaitdmo9pXns596T6xfgzC+OLOzi8u+CfDzu3dXV157dWJrOOzimsmuMMOqep3m23Fu7Wp4nFrHfh4Zqtgeji6pWY8s1atZ/5NVsUw9DD1CkzrbdhNM0TEw9WmSLQhdKPR889EZV2055p6l9Fu3vftHZ9UqdLOChOztWrYdpwywk+HnyzhGdc9qxqHHm6ThzzFrvu91/Sq52Rp2lCEFNqK1NKahFvpxxeWl4o6cfK34s8bm9BnHWbYp3+z1GEk0mnlNZTXRo7HzkxqdSyEAAAABkAAAAYAAAAAABVqn6jfuw/3QGKr0+vX3gXAAAAA0BTZp4sml252r2PXPrFP5DS7fN7T3M09mc1x/QaZbfHbW9HqWXVHHkTTKLzE7h8NtPZVmksxZ0aeI+RxZ6RD6XpXKvaJ7vhTdsfWxj9psqcaklmTkspPo8CcWqsq86t88QjXNHJMPoKZI0lOa+RNM7ZIe/+i2+6extNK5ttdpGuUurpjZJQ/ZY8kj1cG+yNvz7qcUjk27H1hucAAAAAMgAAAAAAAAAACnVfdy+X1A062BfCTAtVjAmpgS4gHEBjiQGHNAU2XL3fqRXL2jqZcLxhcu5BlDxXe6p3bQpqfPtbEnn8rms/tk5c3m0Pc6dPbhvMPSNFs+uUXCcVOEouMoyWVKLWGmdPb408Wclot3Q+T2j6Ir5Sdmz9RDs3LlTqeJTh4KazxLn3pfM57cfb2MPWLVjVob27/oemrI2bR1EJwi8vT6ZS9fwlY8YXgl8xXjxHtM/Wr2jVI09Y09EK4RrrioQrioQhFJRjFLCSR06+IeJa02ncrSoAAAAAAAAAAAAAAAAKtT93L4WBz62BdFgWJgTTAkmBnIEXICEpBWvbMg5WvlyYZQ8y3wo7O7R6pfh1kK5v/K3xf7ZHPmjzEvX6db7b0/Z6PpUdEPIv4mYfQ7L+7fxP6IrBtgAMgAAAAAAAAAAAAAAAAFeo9ifwv6AcutgXRYFiYE0wJZAcQEHICqcwrUusIrkbQvwmFh5tvztiDqekUZOybjbGfSNfDLk8976nPnvqNPY6Xx7XtNoejbC10NRp6tRDKjbBSSfWL70/mbqW3DzeVjmmWYl9Vsv7r+5mbmbgAAAAAAAAAAAAAAAAAAAQuXqS+F/QDjVMC+LAsTAmmBnIGHICEpAUWTIrQ1FgVx9bLPIMnz2192qdbBQlJ12QbdV0ebjnqmu9Gu9ItDq4vKtht4dP0faiL2fXUlwy00p6a6PerIyeW/PqMU+NLz6zF+6fl6Dsv7pecvqbXA2wMgAAAAAAAAAADAAAAAAAI2dH5P6AcKpgXxYFqYEkwM5Aw5AVTkBq3TIrm6mwK5d9gVrajaFWnqnfa8QgsvHWT7orxbMbW7Y23YMNs14rDzqrePV1Xam3SS+zR1dvbTrSjZwy5+9dXl55HnTmtE+H2VOl0tSIyedPs9xvSLqvtNOk1vDbXfZGmFyjwTrsm8Rzjk020vDJuw8iZnUvM6j0alMc5Mfx8PYUdz5cAAAAAABkAAAAYAAAAAABiXR+QHztbAvgwLUwJJgZyBGUgKLJhWlqLCK5WqtCubbYQfK+kGcvs9CXsu9uXxKD4frI5+R6e10bX1J2+Mja8Y95wTD66Mnhv7v1St1+jqhlynq6Esc8LtE2/kk38jPFXdocvPyxGC0z+j9PI9Z+fMgAAAAAAyAAAAAGAADIGMgYbAxkD5yL5vzf1AujIC1SAmpAOICEpAa9siK5+pmFcjVTCufKfMg4G+20aIaX7PODtstxKuKfD2TXSxv+O805bRrT1On4Ms276vPIWy6NM5JrD6Gma/qYeuehTd2ElPalqbnCyVGlTXqpcK47F73zcfkzpwUj8ni9X5N9xieu5Op4LOQM5AZAyAAAZAAAAGAAGGwMNgRbAw2BFyA+cb9eXxP6gXRkBZGQE1IDLYFc2BrWyIrnamQVx9VIK0uLmYz6ZVjdnmm1NU53WWSeXK2WH7o55JeCR51p7rS+2w1riw1iGszB0+HvPojWNi0eNt7/ANWR6OD8HxnVfPIl9nxG55ySYGcgZyBnIGcgZAyAAAAIgYbAw2BFsCLYEHICEpAfP2P+pP45fUCyEgLYyAmpAOICE5Aat0iK52pkFcfVSIrm6q3hhOX5YSf7GN/TfgjeSIeX6iWXH9X5nBX5fX5p81rCeeRhp0b8P0RuBp3TsnRwaw3SrJL3OfrfyeljjVXxPOv3Zpl9EpGxyJqQEkwJJgSTAygMgSQAAAAgwMMCLYEGwINgVykBVOYHBul/Vn8TAshIC1SAmpAZcgK5yA1rWRXO1LCuPqmFcbbNnDpb37qp488cjXk/GXVwo3mrDzdrMvLkcPqH1Wt2WSTwYx7b7VntfpjZs12FOOS7GvC9y4Vg9Ovp8Nn/AOkt2MjJqWxkBNMCaYEkwJJgSQEkBkAAArYEWBFgQbAhJgUzYGrdMDh2T/qS8/4AuhIC1SAmpAZcgISkBrWsK0NQyK5OpQHzm9UrFpZKEeJTko2NJvgh1zheSNObfb4el02K/V3aXwUE0zjn0+kx7i3ls6aiV1sKYe1bONcfDLxkUruWXIzRSky/RWiklCEV0jGMV5JYR6UeIfEZLd1plv1yKwXxYFkWBYmBJATTAygLIgZAAAK2BFgRYEGBVICmYGrcgOBq/Ut58lPo+7i9wFkJAXRkBYpAZ4gISkBRZIDRvZFc28K4u8N3Z6S+S5Pg4E/GTUV9TXln7ZdfBp3Zoh8RsXZUtXeqYequFynP8kV0/fBx0r3S+k5eeuGm23uLpZPadcZ8pVuzk+6cU019TdSI79ODk2tPH7numlWEkdb51vVsDYiwLYsCxMCaAkgJIC2PQDIAABWwIsCLAgwK5AVSQGvZEDn6zSxmnGSymBx7K7qXzTth3Nc7I+a7/r5gWUaqE/Zkm11j0kvNdwGwpAZ4gIykBTZIDUuZFc69hXD3irVmltg2k+FSjl4zKLUkv2MMkbrLr4WT6eWsub6P1OTvhWkm+zlKb6qPrYWO/ozRx59w9PrFZ+2YZjp1o94ak36ttsJ597ti4vP9zyLfbkhcM/V4kx+j16lHU+f026yovgwLYgWoCSAmgJoCyHQCQAABWBFgRYEGBCSArkgKpRApsgBrWUgc/VbMrn7UU2ukukl5PqgNOWzbY/d3TXuU8WL9+YFbjrI/4VnylW/5AhK7Vd9MPlc/+oFM7tV/gR+d3/kKosjq5fhqh852P+CDWls66Xt2vyhFRX8sK5Nm09l0XumyWbE+Cc5RlNRfenNmq2SseHbi4eWYi8R4fB622VM7VXZKKVso5rm4qUVJ8L5PmjkjfdOn0dorOGs3Thte+2+iy6xzendaja+c+CM+LMn3tGUzO4200pWK27fl+gqZ5O2PT5e9dWlt1srDTYgyi2IRbECaAmgJIC2HQCQAABBgRwBFgRaAi0BCSArcQK5RAqlACuVYFUqgK5UgVSpCq5UkFE6QrU1NLw8EllDy/eLdjVK6y2CdsbJubS9tN9fM5cmOfcPf4nNpFYpZz93tHJ6qFc65c1OMoyg+XLvMMdZ7vLp5uSk4ftl9hTuLpLJqUoyis5lGEuFM6JxxMvHpy71jT0XTV4SNseIcN53O27XErBsQQRdFBFkUUTSCJoCSAth0AkAAARYEWBhgRaAi0BFoCLiBW4gQcQIOAEHACDgBCUCKrlWFVSqApnQRlDWs0kX3ElsrZCvQxTzhE1DZ9SdabtOnS7itcy3K6ysGxCBWK2MQi2KAsSKiSQEkESQFsegGQAADAGAMARYGGgItARaAi0BBxAi4gRcQIuIEHEioOAFbgFQlWGUIdkRdsqoLtbCsC6MAiyMQxWxiVFiQE0giSRUSSAzgCcQMgAAGAAGAMAYwBFoDGAItAYaAi0BFxAi4gRcQqLiRUHECPARWOzCsqAE4wAsUQJqIROKKkppASSKiSQRIDOAMoDIAAB//2Q=="/>
+          <p:cNvSpPr>
+            <a:spLocks noChangeAspect="1" noChangeArrowheads="1"/>
+          </p:cNvSpPr>
+          <p:nvPr/>
+        </p:nvSpPr>
+        <p:spPr bwMode="auto">
+          <a:xfrm>
+            <a:off x="155575" y="-144463"/>
+            <a:ext cx="304800" cy="304801"/>
+          </a:xfrm>
+          <a:prstGeom prst="rect">
+            <a:avLst/>
+          </a:prstGeom>
+          <a:noFill/>
+        </p:spPr>
+        <p:txBody>
+          <a:bodyPr vert="horz" wrap="square" lIns="91440" tIns="45720" rIns="91440" bIns="45720" numCol="1" anchor="t" anchorCtr="0" compatLnSpc="1">
+            <a:prstTxWarp prst="textNoShape">
+              <a:avLst/>
+            </a:prstTxWarp>
+          </a:bodyPr>
+          <a:lstStyle/>
+          <a:p>
+            <a:endParaRPr lang="pt-BR"/>
+          </a:p>
+        </p:txBody>
+      </p:sp>
+      <p:pic>
+        <p:nvPicPr>
+          <p:cNvPr id="37895" name="Picture 7"/>
+          <p:cNvPicPr>
+            <a:picLocks noChangeAspect="1" noChangeArrowheads="1"/>
+          </p:cNvPicPr>
+          <p:nvPr/>
+        </p:nvPicPr>
+        <p:blipFill>
+          <a:blip r:embed="rId2" cstate="print"/>
+          <a:srcRect/>
+          <a:stretch>
+            <a:fillRect/>
+          </a:stretch>
+        </p:blipFill>
+        <p:spPr bwMode="auto">
+          <a:xfrm>
+            <a:off x="2411760" y="1988840"/>
+            <a:ext cx="4992887" cy="4291407"/>
+          </a:xfrm>
+          <a:prstGeom prst="rect">
+            <a:avLst/>
+          </a:prstGeom>
+          <a:noFill/>
+          <a:ln w="9525">
+            <a:noFill/>
+            <a:miter lim="800000"/>
+            <a:headEnd/>
+            <a:tailEnd/>
+          </a:ln>
+        </p:spPr>
+      </p:pic>
+    </p:spTree>
+  </p:cSld>
+  <p:clrMapOvr>
+    <a:masterClrMapping/>
+  </p:clrMapOvr>
+  <p:timing>
+    <p:tnLst>
+      <p:par>
+        <p:cTn id="1" dur="indefinite" restart="never" nodeType="tmRoot"/>
+      </p:par>
+    </p:tnLst>
+  </p:timing>
+</p:sld>
+</file>
+
+<file path=ppt/slides/slide22.xml><?xml version="1.0" encoding="utf-8"?>
+<p:sld xmlns:a="http://schemas.openxmlformats.org/drawingml/2006/main" xmlns:r="http://schemas.openxmlformats.org/officeDocument/2006/relationships" xmlns:p="http://schemas.openxmlformats.org/presentationml/2006/main">
+  <p:cSld>
+    <p:spTree>
+      <p:nvGrpSpPr>
+        <p:cNvPr id="1" name=""/>
+        <p:cNvGrpSpPr/>
+        <p:nvPr/>
+      </p:nvGrpSpPr>
+      <p:grpSpPr>
+        <a:xfrm>
+          <a:off x="0" y="0"/>
+          <a:ext cx="0" cy="0"/>
+          <a:chOff x="0" y="0"/>
+          <a:chExt cx="0" cy="0"/>
+        </a:xfrm>
+      </p:grpSpPr>
+      <p:sp>
+        <p:nvSpPr>
+          <p:cNvPr id="2" name="Title 1"/>
+          <p:cNvSpPr>
+            <a:spLocks noGrp="1"/>
+          </p:cNvSpPr>
+          <p:nvPr>
+            <p:ph type="title"/>
+          </p:nvPr>
+        </p:nvSpPr>
+        <p:spPr/>
+        <p:txBody>
+          <a:bodyPr/>
+          <a:lstStyle/>
+          <a:p>
+            <a:r>
+              <a:rPr lang="pt-BR" dirty="0" smtClean="0"/>
+              <a:t>Fontes e Referencias</a:t>
+            </a:r>
+            <a:endParaRPr lang="pt-BR" dirty="0"/>
+          </a:p>
+        </p:txBody>
+      </p:sp>
+      <p:sp>
+        <p:nvSpPr>
+          <p:cNvPr id="3" name="Content Placeholder 2"/>
+          <p:cNvSpPr>
+            <a:spLocks noGrp="1"/>
+          </p:cNvSpPr>
+          <p:nvPr>
+            <p:ph idx="1"/>
+          </p:nvPr>
+        </p:nvSpPr>
+        <p:spPr/>
+        <p:txBody>
+          <a:bodyPr>
+            <a:normAutofit fontScale="92500" lnSpcReduction="10000"/>
+          </a:bodyPr>
+          <a:lstStyle/>
+          <a:p>
+            <a:r>
+              <a:rPr lang="pt-BR" dirty="0" smtClean="0"/>
+              <a:t>¹Qualidade de Software – Teoria e Prática” (ROCHA </a:t>
+            </a:r>
+            <a:r>
+              <a:rPr lang="pt-BR" i="1" dirty="0" err="1" smtClean="0"/>
+              <a:t>et</a:t>
+            </a:r>
+            <a:r>
+              <a:rPr lang="pt-BR" i="1" dirty="0" smtClean="0"/>
+              <a:t> al</a:t>
+            </a:r>
+            <a:r>
+              <a:rPr lang="pt-BR" dirty="0" smtClean="0"/>
+              <a:t>., 2001</a:t>
+            </a:r>
+            <a:r>
+              <a:rPr lang="pt-BR" dirty="0" smtClean="0"/>
+              <a:t>)</a:t>
+            </a:r>
+          </a:p>
+          <a:p>
+            <a:r>
+              <a:rPr lang="pt-BR" u="sng" dirty="0" smtClean="0">
+                <a:hlinkClick r:id="rId2"/>
+              </a:rPr>
+              <a:t>www.devmedia.com.br/artigo-engenharia-de-software-introducao-a-teste-de-software/8035</a:t>
+            </a:r>
+            <a:endParaRPr lang="pt-BR" dirty="0" smtClean="0"/>
+          </a:p>
+          <a:p>
+            <a:r>
+              <a:rPr lang="pt-BR" dirty="0" smtClean="0"/>
+              <a:t>Pressman</a:t>
+            </a:r>
+            <a:r>
+              <a:rPr lang="pt-BR" dirty="0" smtClean="0"/>
+              <a:t>, 2005</a:t>
+            </a:r>
+          </a:p>
+          <a:p>
+            <a:r>
+              <a:rPr lang="pt-BR" dirty="0" smtClean="0">
+                <a:hlinkClick r:id="rId3"/>
+              </a:rPr>
+              <a:t>https</a:t>
+            </a:r>
+            <a:r>
+              <a:rPr lang="pt-BR" dirty="0" smtClean="0">
+                <a:hlinkClick r:id="rId3"/>
+              </a:rPr>
+              <a:t>://prezi.com/.../desenvolvimento-orientado-a-testes</a:t>
+            </a:r>
+            <a:r>
+              <a:rPr lang="pt-BR" dirty="0" smtClean="0">
+                <a:hlinkClick r:id="rId3"/>
+              </a:rPr>
+              <a:t>.../</a:t>
+            </a:r>
+            <a:endParaRPr lang="pt-BR" dirty="0" smtClean="0"/>
+          </a:p>
+          <a:p>
+            <a:r>
+              <a:rPr lang="pt-BR" dirty="0" smtClean="0">
+                <a:hlinkClick r:id="rId4"/>
+              </a:rPr>
+              <a:t>https</a:t>
+            </a:r>
+            <a:r>
+              <a:rPr lang="pt-BR" dirty="0" smtClean="0">
+                <a:hlinkClick r:id="rId4"/>
+              </a:rPr>
+              <a:t>://github.com/.../getcomp-tdd-solucao/tree/master/src</a:t>
+            </a:r>
+            <a:endParaRPr lang="pt-BR" dirty="0" smtClean="0"/>
+          </a:p>
+          <a:p>
+            <a:endParaRPr lang="pt-BR" dirty="0"/>
+          </a:p>
+        </p:txBody>
+      </p:sp>
+      <p:sp>
+        <p:nvSpPr>
+          <p:cNvPr id="4" name="Slide Number Placeholder 3"/>
+          <p:cNvSpPr>
+            <a:spLocks noGrp="1"/>
+          </p:cNvSpPr>
+          <p:nvPr>
+            <p:ph type="sldNum" sz="quarter" idx="12"/>
+          </p:nvPr>
+        </p:nvSpPr>
+        <p:spPr/>
+        <p:txBody>
+          <a:bodyPr/>
+          <a:lstStyle/>
+          <a:p>
+            <a:fld id="{3D12642F-FC9C-42CD-9EE4-23EF85AE02E3}" type="slidenum">
+              <a:rPr lang="pt-BR" smtClean="0"/>
+              <a:pPr/>
+              <a:t>22</a:t>
+            </a:fld>
+            <a:endParaRPr lang="pt-BR"/>
+          </a:p>
+        </p:txBody>
+      </p:sp>
+    </p:spTree>
+  </p:cSld>
+  <p:clrMapOvr>
+    <a:masterClrMapping/>
+  </p:clrMapOvr>
+  <p:timing>
+    <p:tnLst>
+      <p:par>
+        <p:cTn id="1" dur="indefinite" restart="never" nodeType="tmRoot"/>
+      </p:par>
+    </p:tnLst>
+  </p:timing>
+</p:sld>
+</file>
+
+<file path=ppt/slides/slide23.xml><?xml version="1.0" encoding="utf-8"?>
+<p:sld xmlns:a="http://schemas.openxmlformats.org/drawingml/2006/main" xmlns:r="http://schemas.openxmlformats.org/officeDocument/2006/relationships" xmlns:p="http://schemas.openxmlformats.org/presentationml/2006/main">
+  <p:cSld>
+    <p:spTree>
+      <p:nvGrpSpPr>
+        <p:cNvPr id="1" name=""/>
+        <p:cNvGrpSpPr/>
+        <p:nvPr/>
+      </p:nvGrpSpPr>
+      <p:grpSpPr>
+        <a:xfrm>
+          <a:off x="0" y="0"/>
+          <a:ext cx="0" cy="0"/>
+          <a:chOff x="0" y="0"/>
+          <a:chExt cx="0" cy="0"/>
+        </a:xfrm>
+      </p:grpSpPr>
+      <p:sp>
+        <p:nvSpPr>
+          <p:cNvPr id="2" name="Title 1"/>
+          <p:cNvSpPr>
+            <a:spLocks noGrp="1"/>
+          </p:cNvSpPr>
+          <p:nvPr>
+            <p:ph type="title"/>
+          </p:nvPr>
+        </p:nvSpPr>
+        <p:spPr/>
+        <p:txBody>
+          <a:bodyPr/>
+          <a:lstStyle/>
+          <a:p>
+            <a:r>
+              <a:rPr lang="pt-BR" dirty="0" smtClean="0"/>
+              <a:t>Fontes e Referencias</a:t>
+            </a:r>
+            <a:endParaRPr lang="pt-BR" dirty="0"/>
+          </a:p>
+        </p:txBody>
+      </p:sp>
+      <p:sp>
+        <p:nvSpPr>
+          <p:cNvPr id="3" name="Content Placeholder 2"/>
+          <p:cNvSpPr>
+            <a:spLocks noGrp="1"/>
+          </p:cNvSpPr>
+          <p:nvPr>
+            <p:ph idx="1"/>
+          </p:nvPr>
+        </p:nvSpPr>
+        <p:spPr/>
+        <p:txBody>
+          <a:bodyPr/>
+          <a:lstStyle/>
+          <a:p>
+            <a:r>
+              <a:rPr lang="pt-BR" dirty="0" smtClean="0">
+                <a:hlinkClick r:id="rId2"/>
+              </a:rPr>
+              <a:t>http://junit.org</a:t>
+            </a:r>
+            <a:r>
+              <a:rPr lang="pt-BR" dirty="0" smtClean="0">
+                <a:hlinkClick r:id="rId2"/>
+              </a:rPr>
+              <a:t>/</a:t>
+            </a:r>
+            <a:endParaRPr lang="pt-BR" dirty="0" smtClean="0"/>
+          </a:p>
+          <a:p>
+            <a:endParaRPr lang="pt-BR" dirty="0"/>
+          </a:p>
+        </p:txBody>
+      </p:sp>
+      <p:sp>
+        <p:nvSpPr>
+          <p:cNvPr id="4" name="Slide Number Placeholder 3"/>
+          <p:cNvSpPr>
+            <a:spLocks noGrp="1"/>
+          </p:cNvSpPr>
+          <p:nvPr>
+            <p:ph type="sldNum" sz="quarter" idx="12"/>
+          </p:nvPr>
+        </p:nvSpPr>
+        <p:spPr/>
+        <p:txBody>
+          <a:bodyPr/>
+          <a:lstStyle/>
+          <a:p>
+            <a:fld id="{3D12642F-FC9C-42CD-9EE4-23EF85AE02E3}" type="slidenum">
+              <a:rPr lang="pt-BR" smtClean="0"/>
+              <a:pPr/>
+              <a:t>23</a:t>
+            </a:fld>
+            <a:endParaRPr lang="pt-BR"/>
+          </a:p>
+        </p:txBody>
+      </p:sp>
+    </p:spTree>
+  </p:cSld>
+  <p:clrMapOvr>
+    <a:masterClrMapping/>
+  </p:clrMapOvr>
+  <p:timing>
+    <p:tnLst>
+      <p:par>
+        <p:cTn id="1" dur="indefinite" restart="never" nodeType="tmRoot"/>
+      </p:par>
+    </p:tnLst>
+  </p:timing>
+</p:sld>
+</file>
+
+<file path=ppt/slides/slide24.xml><?xml version="1.0" encoding="utf-8"?>
+<p:sld xmlns:a="http://schemas.openxmlformats.org/drawingml/2006/main" xmlns:r="http://schemas.openxmlformats.org/officeDocument/2006/relationships" xmlns:p="http://schemas.openxmlformats.org/presentationml/2006/main">
+  <p:cSld>
+    <p:spTree>
+      <p:nvGrpSpPr>
+        <p:cNvPr id="1" name=""/>
+        <p:cNvGrpSpPr/>
+        <p:nvPr/>
+      </p:nvGrpSpPr>
+      <p:grpSpPr>
+        <a:xfrm>
+          <a:off x="0" y="0"/>
+          <a:ext cx="0" cy="0"/>
+          <a:chOff x="0" y="0"/>
+          <a:chExt cx="0" cy="0"/>
+        </a:xfrm>
+      </p:grpSpPr>
+      <p:sp>
+        <p:nvSpPr>
+          <p:cNvPr id="2" name="Title 1"/>
+          <p:cNvSpPr>
+            <a:spLocks noGrp="1"/>
+          </p:cNvSpPr>
+          <p:nvPr>
+            <p:ph type="title"/>
+          </p:nvPr>
+        </p:nvSpPr>
+        <p:spPr/>
+        <p:txBody>
+          <a:bodyPr/>
+          <a:lstStyle/>
+          <a:p>
+            <a:r>
+              <a:rPr lang="pt-BR" dirty="0" smtClean="0"/>
+              <a:t>Obrigado</a:t>
+            </a:r>
+            <a:endParaRPr lang="pt-BR" dirty="0"/>
+          </a:p>
+        </p:txBody>
+      </p:sp>
+      <p:sp>
+        <p:nvSpPr>
+          <p:cNvPr id="3" name="Content Placeholder 2"/>
+          <p:cNvSpPr>
+            <a:spLocks noGrp="1"/>
+          </p:cNvSpPr>
+          <p:nvPr>
+            <p:ph idx="1"/>
+          </p:nvPr>
+        </p:nvSpPr>
+        <p:spPr/>
+        <p:txBody>
+          <a:bodyPr/>
+          <a:lstStyle/>
+          <a:p>
+            <a:endParaRPr lang="pt-BR"/>
+          </a:p>
+        </p:txBody>
+      </p:sp>
+      <p:sp>
+        <p:nvSpPr>
+          <p:cNvPr id="4" name="Slide Number Placeholder 3"/>
+          <p:cNvSpPr>
+            <a:spLocks noGrp="1"/>
+          </p:cNvSpPr>
+          <p:nvPr>
+            <p:ph type="sldNum" sz="quarter" idx="12"/>
+          </p:nvPr>
+        </p:nvSpPr>
+        <p:spPr/>
+        <p:txBody>
+          <a:bodyPr/>
+          <a:lstStyle/>
+          <a:p>
+            <a:fld id="{3D12642F-FC9C-42CD-9EE4-23EF85AE02E3}" type="slidenum">
+              <a:rPr lang="pt-BR" smtClean="0"/>
+              <a:pPr/>
+              <a:t>24</a:t>
+            </a:fld>
+            <a:endParaRPr lang="pt-BR"/>
+          </a:p>
+        </p:txBody>
+      </p:sp>
+    </p:spTree>
+  </p:cSld>
+  <p:clrMapOvr>
+    <a:masterClrMapping/>
+  </p:clrMapOvr>
+  <p:timing>
+    <p:tnLst>
+      <p:par>
+        <p:cTn id="1" dur="indefinite" restart="never" nodeType="tmRoot"/>
+      </p:par>
+    </p:tnLst>
+  </p:timing>
+</p:sld>
+</file>
+
 <file path=ppt/slides/slide3.xml><?xml version="1.0" encoding="utf-8"?>
 <p:sld xmlns:a="http://schemas.openxmlformats.org/drawingml/2006/main" xmlns:r="http://schemas.openxmlformats.org/officeDocument/2006/relationships" xmlns:p="http://schemas.openxmlformats.org/presentationml/2006/main">
   <p:cSld>
@@ -5234,11 +7524,7 @@
           <a:p>
             <a:r>
               <a:rPr lang="pt-BR" dirty="0" smtClean="0"/>
-              <a:t>Teste de </a:t>
-            </a:r>
-            <a:r>
-              <a:rPr lang="pt-BR" dirty="0" smtClean="0"/>
-              <a:t>software</a:t>
+              <a:t>Teste de software</a:t>
             </a:r>
             <a:endParaRPr lang="pt-BR" dirty="0"/>
           </a:p>
@@ -5268,15 +7554,7 @@
             <a:pPr lvl="1"/>
             <a:r>
               <a:rPr lang="pt-BR" dirty="0" smtClean="0"/>
-              <a:t>“Testar </a:t>
-            </a:r>
-            <a:r>
-              <a:rPr lang="pt-BR" dirty="0" smtClean="0"/>
-              <a:t>um software significa verificar através de uma execução controlada se o seu comportamento corre de acordo com o especificado</a:t>
-            </a:r>
-            <a:r>
-              <a:rPr lang="pt-BR" dirty="0" smtClean="0"/>
-              <a:t>.”</a:t>
+              <a:t>“Testar um software significa verificar através de uma execução controlada se o seu comportamento corre de acordo com o especificado.”</a:t>
             </a:r>
             <a:endParaRPr lang="pt-BR" dirty="0"/>
           </a:p>
@@ -5299,6 +7577,7 @@
           <a:p>
             <a:fld id="{3D12642F-FC9C-42CD-9EE4-23EF85AE02E3}" type="slidenum">
               <a:rPr lang="pt-BR" smtClean="0"/>
+              <a:pPr/>
               <a:t>3</a:t>
             </a:fld>
             <a:endParaRPr lang="pt-BR"/>
@@ -5447,11 +7726,7 @@
             </a:r>
             <a:r>
               <a:rPr lang="en-US" dirty="0" smtClean="0"/>
-              <a:t>– (IEEE 610, </a:t>
-            </a:r>
-            <a:r>
-              <a:rPr lang="en-US" dirty="0" smtClean="0"/>
-              <a:t>1990)</a:t>
+              <a:t>– (IEEE 610, 1990)</a:t>
             </a:r>
           </a:p>
           <a:p>
@@ -5461,19 +7736,7 @@
             </a:r>
             <a:r>
               <a:rPr lang="pt-BR" dirty="0" smtClean="0"/>
-              <a:t> – Ex.: </a:t>
-            </a:r>
-            <a:r>
-              <a:rPr lang="pt-BR" dirty="0" smtClean="0"/>
-              <a:t>Instrução </a:t>
-            </a:r>
-            <a:r>
-              <a:rPr lang="pt-BR" dirty="0" smtClean="0"/>
-              <a:t>ou comando </a:t>
-            </a:r>
-            <a:r>
-              <a:rPr lang="pt-BR" dirty="0" smtClean="0"/>
-              <a:t>incorreto</a:t>
+              <a:t> – Ex.: Instrução ou comando incorreto</a:t>
             </a:r>
           </a:p>
           <a:p>
@@ -5508,6 +7771,7 @@
           <a:p>
             <a:fld id="{3D12642F-FC9C-42CD-9EE4-23EF85AE02E3}" type="slidenum">
               <a:rPr lang="pt-BR" smtClean="0"/>
+              <a:pPr/>
               <a:t>4</a:t>
             </a:fld>
             <a:endParaRPr lang="pt-BR"/>
@@ -5519,6 +7783,13 @@
   <p:clrMapOvr>
     <a:masterClrMapping/>
   </p:clrMapOvr>
+  <p:timing>
+    <p:tnLst>
+      <p:par>
+        <p:cTn id="1" dur="indefinite" restart="never" nodeType="tmRoot"/>
+      </p:par>
+    </p:tnLst>
+  </p:timing>
 </p:sld>
 </file>
 
@@ -5579,6 +7850,7 @@
           <a:p>
             <a:fld id="{3D12642F-FC9C-42CD-9EE4-23EF85AE02E3}" type="slidenum">
               <a:rPr lang="pt-BR" smtClean="0"/>
+              <a:pPr/>
               <a:t>5</a:t>
             </a:fld>
             <a:endParaRPr lang="pt-BR"/>
@@ -5620,6 +7892,13 @@
   <p:clrMapOvr>
     <a:masterClrMapping/>
   </p:clrMapOvr>
+  <p:timing>
+    <p:tnLst>
+      <p:par>
+        <p:cTn id="1" dur="indefinite" restart="never" nodeType="tmRoot"/>
+      </p:par>
+    </p:tnLst>
+  </p:timing>
 </p:sld>
 </file>
 
@@ -5683,55 +7962,31 @@
             </a:pPr>
             <a:r>
               <a:rPr lang="pt-BR" dirty="0" smtClean="0"/>
-              <a:t>Podemos classificar </a:t>
-            </a:r>
-            <a:r>
-              <a:rPr lang="pt-BR" dirty="0" smtClean="0"/>
-              <a:t>os principais níveis de teste de </a:t>
-            </a:r>
-            <a:r>
-              <a:rPr lang="pt-BR" dirty="0" smtClean="0"/>
-              <a:t>software assim¹:</a:t>
+              <a:t>Podemos classificar os principais níveis de teste de software assim¹:</a:t>
             </a:r>
           </a:p>
           <a:p>
             <a:r>
               <a:rPr lang="pt-BR" b="1" dirty="0" smtClean="0"/>
-              <a:t>Teste de </a:t>
-            </a:r>
+              <a:t>Teste de Unidade</a:t>
+            </a:r>
+          </a:p>
+          <a:p>
             <a:r>
               <a:rPr lang="pt-BR" b="1" dirty="0" smtClean="0"/>
-              <a:t>Unidade</a:t>
+              <a:t>Teste de Integração</a:t>
             </a:r>
           </a:p>
           <a:p>
             <a:r>
               <a:rPr lang="pt-BR" b="1" dirty="0" smtClean="0"/>
-              <a:t>Teste de </a:t>
-            </a:r>
+              <a:t>Teste de Sistema</a:t>
+            </a:r>
+          </a:p>
+          <a:p>
             <a:r>
               <a:rPr lang="pt-BR" b="1" dirty="0" smtClean="0"/>
-              <a:t>Integração</a:t>
-            </a:r>
-          </a:p>
-          <a:p>
-            <a:r>
-              <a:rPr lang="pt-BR" b="1" dirty="0" smtClean="0"/>
-              <a:t>Teste de </a:t>
-            </a:r>
-            <a:r>
-              <a:rPr lang="pt-BR" b="1" dirty="0" smtClean="0"/>
-              <a:t>Sistema</a:t>
-            </a:r>
-          </a:p>
-          <a:p>
-            <a:r>
-              <a:rPr lang="pt-BR" b="1" dirty="0" smtClean="0"/>
-              <a:t>Teste de </a:t>
-            </a:r>
-            <a:r>
-              <a:rPr lang="pt-BR" b="1" dirty="0" smtClean="0"/>
-              <a:t>Aceitação</a:t>
+              <a:t>Teste de Aceitação</a:t>
             </a:r>
           </a:p>
           <a:p>
@@ -5760,6 +8015,7 @@
           <a:p>
             <a:fld id="{3D12642F-FC9C-42CD-9EE4-23EF85AE02E3}" type="slidenum">
               <a:rPr lang="pt-BR" smtClean="0"/>
+              <a:pPr/>
               <a:t>6</a:t>
             </a:fld>
             <a:endParaRPr lang="pt-BR"/>
@@ -5771,6 +8027,13 @@
   <p:clrMapOvr>
     <a:masterClrMapping/>
   </p:clrMapOvr>
+  <p:timing>
+    <p:tnLst>
+      <p:par>
+        <p:cTn id="1" dur="indefinite" restart="never" nodeType="tmRoot"/>
+      </p:par>
+    </p:tnLst>
+  </p:timing>
 </p:sld>
 </file>
 
@@ -5834,13 +8097,8 @@
             </a:pPr>
             <a:r>
               <a:rPr lang="pt-BR" dirty="0" smtClean="0"/>
-              <a:t>O planejamento e projeto dos testes devem ocorrer de cima para baixo, ou </a:t>
-            </a:r>
-            <a:r>
-              <a:rPr lang="pt-BR" dirty="0" smtClean="0"/>
-              <a:t>seja, planejar a partir:</a:t>
-            </a:r>
-            <a:endParaRPr lang="pt-BR" dirty="0" smtClean="0"/>
+              <a:t>O planejamento e projeto dos testes devem ocorrer de cima para baixo, ou seja, planejar a partir:</a:t>
+            </a:r>
           </a:p>
           <a:p>
             <a:pPr marL="596646" indent="-514350">
@@ -5859,19 +8117,7 @@
             </a:pPr>
             <a:r>
               <a:rPr lang="pt-BR" dirty="0" smtClean="0"/>
-              <a:t>D</a:t>
-            </a:r>
-            <a:r>
-              <a:rPr lang="pt-BR" dirty="0" smtClean="0"/>
-              <a:t>o </a:t>
-            </a:r>
-            <a:r>
-              <a:rPr lang="pt-BR" dirty="0" smtClean="0"/>
-              <a:t>projeto de alto nível do </a:t>
-            </a:r>
-            <a:r>
-              <a:rPr lang="pt-BR" dirty="0" smtClean="0"/>
-              <a:t>software o Teste de Sistema</a:t>
+              <a:t>Do projeto de alto nível do software o Teste de Sistema</a:t>
             </a:r>
           </a:p>
           <a:p>
@@ -5920,6 +8166,7 @@
           <a:p>
             <a:fld id="{3D12642F-FC9C-42CD-9EE4-23EF85AE02E3}" type="slidenum">
               <a:rPr lang="pt-BR" smtClean="0"/>
+              <a:pPr/>
               <a:t>7</a:t>
             </a:fld>
             <a:endParaRPr lang="pt-BR"/>
@@ -5931,6 +8178,13 @@
   <p:clrMapOvr>
     <a:masterClrMapping/>
   </p:clrMapOvr>
+  <p:timing>
+    <p:tnLst>
+      <p:par>
+        <p:cTn id="1" dur="indefinite" restart="never" nodeType="tmRoot"/>
+      </p:par>
+    </p:tnLst>
+  </p:timing>
 </p:sld>
 </file>
 
@@ -6018,6 +8272,7 @@
           <a:p>
             <a:fld id="{3D12642F-FC9C-42CD-9EE4-23EF85AE02E3}" type="slidenum">
               <a:rPr lang="pt-BR" smtClean="0"/>
+              <a:pPr/>
               <a:t>8</a:t>
             </a:fld>
             <a:endParaRPr lang="pt-BR"/>
@@ -6055,6 +8310,13 @@
   <p:clrMapOvr>
     <a:masterClrMapping/>
   </p:clrMapOvr>
+  <p:timing>
+    <p:tnLst>
+      <p:par>
+        <p:cTn id="1" dur="indefinite" restart="never" nodeType="tmRoot"/>
+      </p:par>
+    </p:tnLst>
+  </p:timing>
 </p:sld>
 </file>
 
@@ -6117,13 +8379,8 @@
           <a:p>
             <a:r>
               <a:rPr lang="pt-BR" dirty="0" smtClean="0"/>
-              <a:t>Comportamento </a:t>
-            </a:r>
-            <a:r>
-              <a:rPr lang="pt-BR" dirty="0" smtClean="0"/>
-              <a:t>interno </a:t>
-            </a:r>
-            <a:endParaRPr lang="pt-BR" dirty="0" smtClean="0"/>
+              <a:t>Comportamento interno </a:t>
+            </a:r>
           </a:p>
           <a:p>
             <a:r>
@@ -6157,17 +8414,51 @@
           <a:p>
             <a:fld id="{3D12642F-FC9C-42CD-9EE4-23EF85AE02E3}" type="slidenum">
               <a:rPr lang="pt-BR" smtClean="0"/>
+              <a:pPr/>
               <a:t>9</a:t>
             </a:fld>
             <a:endParaRPr lang="pt-BR"/>
           </a:p>
         </p:txBody>
       </p:sp>
+      <p:pic>
+        <p:nvPicPr>
+          <p:cNvPr id="3074" name="Picture 2" descr="http://www.papillonribbon.com/assets/universal/swatches/ceco-box/eza-1239/EZA1239_glossy-white.jpg"/>
+          <p:cNvPicPr>
+            <a:picLocks noChangeAspect="1" noChangeArrowheads="1"/>
+          </p:cNvPicPr>
+          <p:nvPr/>
+        </p:nvPicPr>
+        <p:blipFill>
+          <a:blip r:embed="rId2" cstate="print"/>
+          <a:srcRect/>
+          <a:stretch>
+            <a:fillRect/>
+          </a:stretch>
+        </p:blipFill>
+        <p:spPr bwMode="auto">
+          <a:xfrm>
+            <a:off x="3131840" y="3068960"/>
+            <a:ext cx="3206380" cy="3206380"/>
+          </a:xfrm>
+          <a:prstGeom prst="rect">
+            <a:avLst/>
+          </a:prstGeom>
+          <a:noFill/>
+        </p:spPr>
+      </p:pic>
     </p:spTree>
   </p:cSld>
   <p:clrMapOvr>
     <a:masterClrMapping/>
   </p:clrMapOvr>
+  <p:timing>
+    <p:tnLst>
+      <p:par>
+        <p:cTn id="1" dur="indefinite" restart="never" nodeType="tmRoot"/>
+      </p:par>
+    </p:tnLst>
+  </p:timing>
 </p:sld>
 </file>
 

</xml_diff>

<commit_message>
Versão final da apresentação
O commit do Paulo esta dando pau professora... vamos tentar ver se
resolvemos antes do término do horário
</commit_message>
<xml_diff>
--- a/Trab Eng Software/Projeto sobre Testes/Teste de Software apoiado por ferramentas livres.pptx
+++ b/Trab Eng Software/Projeto sobre Testes/Teste de Software apoiado por ferramentas livres.pptx
@@ -5,10 +5,10 @@
     <p:sldMasterId id="2147483660" r:id="rId1"/>
   </p:sldMasterIdLst>
   <p:notesMasterIdLst>
-    <p:notesMasterId r:id="rId26"/>
+    <p:notesMasterId r:id="rId28"/>
   </p:notesMasterIdLst>
   <p:handoutMasterIdLst>
-    <p:handoutMasterId r:id="rId27"/>
+    <p:handoutMasterId r:id="rId29"/>
   </p:handoutMasterIdLst>
   <p:sldIdLst>
     <p:sldId id="256" r:id="rId2"/>
@@ -23,18 +23,20 @@
     <p:sldId id="266" r:id="rId11"/>
     <p:sldId id="267" r:id="rId12"/>
     <p:sldId id="268" r:id="rId13"/>
-    <p:sldId id="269" r:id="rId14"/>
-    <p:sldId id="270" r:id="rId15"/>
-    <p:sldId id="271" r:id="rId16"/>
-    <p:sldId id="274" r:id="rId17"/>
-    <p:sldId id="275" r:id="rId18"/>
-    <p:sldId id="276" r:id="rId19"/>
-    <p:sldId id="277" r:id="rId20"/>
-    <p:sldId id="278" r:id="rId21"/>
-    <p:sldId id="279" r:id="rId22"/>
-    <p:sldId id="262" r:id="rId23"/>
-    <p:sldId id="273" r:id="rId24"/>
-    <p:sldId id="272" r:id="rId25"/>
+    <p:sldId id="280" r:id="rId14"/>
+    <p:sldId id="281" r:id="rId15"/>
+    <p:sldId id="269" r:id="rId16"/>
+    <p:sldId id="270" r:id="rId17"/>
+    <p:sldId id="271" r:id="rId18"/>
+    <p:sldId id="274" r:id="rId19"/>
+    <p:sldId id="275" r:id="rId20"/>
+    <p:sldId id="276" r:id="rId21"/>
+    <p:sldId id="277" r:id="rId22"/>
+    <p:sldId id="278" r:id="rId23"/>
+    <p:sldId id="279" r:id="rId24"/>
+    <p:sldId id="262" r:id="rId25"/>
+    <p:sldId id="273" r:id="rId26"/>
+    <p:sldId id="272" r:id="rId27"/>
   </p:sldIdLst>
   <p:sldSz cx="9144000" cy="6858000" type="screen4x3"/>
   <p:notesSz cx="6858000" cy="9144000"/>
@@ -5041,13 +5043,8 @@
           <a:p>
             <a:r>
               <a:rPr lang="pt-BR" dirty="0" smtClean="0"/>
-              <a:t>Não </a:t>
-            </a:r>
-            <a:r>
-              <a:rPr lang="pt-BR" dirty="0" smtClean="0"/>
-              <a:t>se considera o comportamento interno </a:t>
-            </a:r>
-            <a:endParaRPr lang="pt-BR" dirty="0" smtClean="0"/>
+              <a:t>Não se considera o comportamento interno </a:t>
+            </a:r>
           </a:p>
           <a:p>
             <a:r>
@@ -5194,11 +5191,7 @@
           <a:p>
             <a:r>
               <a:rPr lang="pt-BR" dirty="0" smtClean="0"/>
-              <a:t>Esse critério de teste explora os limites dos valores de cada classe de equivalência para preparar os casos de teste (Pressman, 2005</a:t>
-            </a:r>
-            <a:r>
-              <a:rPr lang="pt-BR" dirty="0" smtClean="0"/>
-              <a:t>)</a:t>
+              <a:t>Esse critério de teste explora os limites dos valores de cada classe de equivalência para preparar os casos de teste (Pressman, 2005)</a:t>
             </a:r>
           </a:p>
           <a:p>
@@ -5301,25 +5294,86 @@
         </p:nvSpPr>
         <p:spPr/>
         <p:txBody>
-          <a:bodyPr/>
+          <a:bodyPr>
+            <a:normAutofit fontScale="92500"/>
+          </a:bodyPr>
           <a:lstStyle/>
           <a:p>
+            <a:pPr lvl="0"/>
+            <a:r>
+              <a:rPr lang="pt-BR" dirty="0" err="1" smtClean="0"/>
+              <a:t>Behat</a:t>
+            </a:r>
+            <a:endParaRPr lang="pt-BR" dirty="0" smtClean="0"/>
+          </a:p>
+          <a:p>
+            <a:pPr lvl="0"/>
+            <a:r>
+              <a:rPr lang="pt-BR" dirty="0" err="1" smtClean="0"/>
+              <a:t>Selenium</a:t>
+            </a:r>
+            <a:endParaRPr lang="pt-BR" dirty="0" smtClean="0"/>
+          </a:p>
+          <a:p>
+            <a:pPr lvl="0"/>
+            <a:r>
+              <a:rPr lang="pt-BR" dirty="0" err="1" smtClean="0"/>
+              <a:t>Goutte</a:t>
+            </a:r>
+            <a:endParaRPr lang="pt-BR" dirty="0" smtClean="0"/>
+          </a:p>
+          <a:p>
+            <a:pPr lvl="0"/>
+            <a:r>
+              <a:rPr lang="pt-BR" dirty="0" err="1" smtClean="0"/>
+              <a:t>Sahi</a:t>
+            </a:r>
+            <a:endParaRPr lang="pt-BR" dirty="0" smtClean="0"/>
+          </a:p>
+          <a:p>
+            <a:pPr lvl="0"/>
+            <a:r>
+              <a:rPr lang="pt-BR" dirty="0" err="1" smtClean="0"/>
+              <a:t>Junit</a:t>
+            </a:r>
+            <a:endParaRPr lang="pt-BR" dirty="0" smtClean="0"/>
+          </a:p>
+          <a:p>
+            <a:pPr lvl="0"/>
             <a:r>
               <a:rPr lang="pt-BR" dirty="0" smtClean="0"/>
-              <a:t>A</a:t>
-            </a:r>
-          </a:p>
-          <a:p>
+              <a:t>etc</a:t>
+            </a:r>
             <a:r>
               <a:rPr lang="pt-BR" dirty="0" smtClean="0"/>
-              <a:t>B</a:t>
-            </a:r>
-          </a:p>
-          <a:p>
+              <a:t>.</a:t>
+            </a:r>
+          </a:p>
+          <a:p>
+            <a:pPr lvl="0"/>
+            <a:r>
+              <a:rPr lang="pt-BR" dirty="0" smtClean="0"/>
+              <a:t>Possuem comportamentos e </a:t>
+            </a:r>
             <a:r>
               <a:rPr lang="pt-BR" dirty="0" err="1" smtClean="0"/>
-              <a:t>JUnit</a:t>
-            </a:r>
+              <a:t>APIs</a:t>
+            </a:r>
+            <a:r>
+              <a:rPr lang="pt-BR" dirty="0" smtClean="0"/>
+              <a:t> diferentes</a:t>
+            </a:r>
+          </a:p>
+          <a:p>
+            <a:pPr lvl="0"/>
+            <a:r>
+              <a:rPr lang="pt-BR" dirty="0" smtClean="0"/>
+              <a:t>Voltadas para testes de tipos diferentes</a:t>
+            </a:r>
+            <a:endParaRPr lang="pt-BR" dirty="0" smtClean="0"/>
+          </a:p>
+          <a:p>
+            <a:pPr lvl="0"/>
             <a:endParaRPr lang="pt-BR" dirty="0"/>
           </a:p>
         </p:txBody>
@@ -5365,7 +5419,7 @@
         </p:blipFill>
         <p:spPr bwMode="auto">
           <a:xfrm>
-            <a:off x="5076056" y="3645024"/>
+            <a:off x="4860032" y="1484784"/>
             <a:ext cx="3810000" cy="2695576"/>
           </a:xfrm>
           <a:prstGeom prst="rect">
@@ -5423,7 +5477,7 @@
           <a:p>
             <a:r>
               <a:rPr lang="pt-BR" dirty="0" err="1" smtClean="0"/>
-              <a:t>JUnit</a:t>
+              <a:t>Behat</a:t>
             </a:r>
             <a:endParaRPr lang="pt-BR" dirty="0"/>
           </a:p>
@@ -5446,51 +5500,14 @@
           <a:p>
             <a:r>
               <a:rPr lang="pt-BR" dirty="0" smtClean="0"/>
-              <a:t>Framework open source para programas em Java</a:t>
-            </a:r>
-          </a:p>
-          <a:p>
-            <a:r>
-              <a:rPr lang="pt-BR" dirty="0" err="1" smtClean="0"/>
-              <a:t>IDEs</a:t>
-            </a:r>
+              <a:t>BDD - Comportamento direcional de desenvolvimento.</a:t>
+            </a:r>
+          </a:p>
+          <a:p>
             <a:r>
               <a:rPr lang="pt-BR" dirty="0" smtClean="0"/>
-              <a:t> com suporte: (permite uma área nativa para rodar os testes)</a:t>
-            </a:r>
-          </a:p>
-          <a:p>
-            <a:pPr lvl="1"/>
-            <a:r>
-              <a:rPr lang="pt-BR" dirty="0" err="1" smtClean="0"/>
-              <a:t>NetBeans</a:t>
-            </a:r>
-            <a:endParaRPr lang="pt-BR" dirty="0" smtClean="0"/>
-          </a:p>
-          <a:p>
-            <a:pPr lvl="1"/>
-            <a:r>
-              <a:rPr lang="pt-BR" dirty="0" smtClean="0"/>
-              <a:t>Eclipse</a:t>
-            </a:r>
-            <a:endParaRPr lang="pt-BR" dirty="0" smtClean="0"/>
-          </a:p>
-          <a:p>
-            <a:pPr lvl="1"/>
-            <a:r>
-              <a:rPr lang="pt-BR" dirty="0" err="1" smtClean="0"/>
-              <a:t>IntelliJ</a:t>
-            </a:r>
-            <a:r>
-              <a:rPr lang="pt-BR" dirty="0" smtClean="0"/>
-              <a:t> </a:t>
-            </a:r>
-            <a:r>
-              <a:rPr lang="pt-BR" dirty="0" smtClean="0"/>
-              <a:t>Idea</a:t>
-            </a:r>
-          </a:p>
-          <a:p>
+              <a:t>Consiste em desenvolver documentação de fácil entendimento, explicando o comportamento do sistema</a:t>
+            </a:r>
             <a:endParaRPr lang="pt-BR" dirty="0"/>
           </a:p>
         </p:txBody>
@@ -5514,6 +5531,300 @@
               <a:rPr lang="pt-BR" smtClean="0"/>
               <a:pPr/>
               <a:t>13</a:t>
+            </a:fld>
+            <a:endParaRPr lang="pt-BR"/>
+          </a:p>
+        </p:txBody>
+      </p:sp>
+      <p:pic>
+        <p:nvPicPr>
+          <p:cNvPr id="1026" name="Picture 2" descr="http://knplabs.com/images/blog/news/behat-11.jpg"/>
+          <p:cNvPicPr>
+            <a:picLocks noChangeAspect="1" noChangeArrowheads="1"/>
+          </p:cNvPicPr>
+          <p:nvPr/>
+        </p:nvPicPr>
+        <p:blipFill>
+          <a:blip r:embed="rId2" cstate="print"/>
+          <a:srcRect/>
+          <a:stretch>
+            <a:fillRect/>
+          </a:stretch>
+        </p:blipFill>
+        <p:spPr bwMode="auto">
+          <a:xfrm>
+            <a:off x="3563888" y="4509120"/>
+            <a:ext cx="2381250" cy="1190625"/>
+          </a:xfrm>
+          <a:prstGeom prst="rect">
+            <a:avLst/>
+          </a:prstGeom>
+          <a:noFill/>
+        </p:spPr>
+      </p:pic>
+    </p:spTree>
+  </p:cSld>
+  <p:clrMapOvr>
+    <a:masterClrMapping/>
+  </p:clrMapOvr>
+</p:sld>
+</file>
+
+<file path=ppt/slides/slide14.xml><?xml version="1.0" encoding="utf-8"?>
+<p:sld xmlns:a="http://schemas.openxmlformats.org/drawingml/2006/main" xmlns:r="http://schemas.openxmlformats.org/officeDocument/2006/relationships" xmlns:p="http://schemas.openxmlformats.org/presentationml/2006/main">
+  <p:cSld>
+    <p:spTree>
+      <p:nvGrpSpPr>
+        <p:cNvPr id="1" name=""/>
+        <p:cNvGrpSpPr/>
+        <p:nvPr/>
+      </p:nvGrpSpPr>
+      <p:grpSpPr>
+        <a:xfrm>
+          <a:off x="0" y="0"/>
+          <a:ext cx="0" cy="0"/>
+          <a:chOff x="0" y="0"/>
+          <a:chExt cx="0" cy="0"/>
+        </a:xfrm>
+      </p:grpSpPr>
+      <p:sp>
+        <p:nvSpPr>
+          <p:cNvPr id="2" name="Title 1"/>
+          <p:cNvSpPr>
+            <a:spLocks noGrp="1"/>
+          </p:cNvSpPr>
+          <p:nvPr>
+            <p:ph type="title"/>
+          </p:nvPr>
+        </p:nvSpPr>
+        <p:spPr/>
+        <p:txBody>
+          <a:bodyPr/>
+          <a:lstStyle/>
+          <a:p>
+            <a:r>
+              <a:rPr lang="pt-BR" dirty="0" err="1" smtClean="0"/>
+              <a:t>Selenium</a:t>
+            </a:r>
+            <a:endParaRPr lang="pt-BR" dirty="0"/>
+          </a:p>
+        </p:txBody>
+      </p:sp>
+      <p:sp>
+        <p:nvSpPr>
+          <p:cNvPr id="3" name="Content Placeholder 2"/>
+          <p:cNvSpPr>
+            <a:spLocks noGrp="1"/>
+          </p:cNvSpPr>
+          <p:nvPr>
+            <p:ph idx="1"/>
+          </p:nvPr>
+        </p:nvSpPr>
+        <p:spPr/>
+        <p:txBody>
+          <a:bodyPr/>
+          <a:lstStyle/>
+          <a:p>
+            <a:r>
+              <a:rPr lang="pt-BR" dirty="0" smtClean="0"/>
+              <a:t>Voltado para desenvolvimento web</a:t>
+            </a:r>
+          </a:p>
+          <a:p>
+            <a:r>
+              <a:rPr lang="pt-BR" dirty="0" smtClean="0"/>
+              <a:t>Simula interações entre browsers e </a:t>
+            </a:r>
+            <a:r>
+              <a:rPr lang="pt-BR" dirty="0" smtClean="0"/>
+              <a:t>usuários</a:t>
+            </a:r>
+            <a:r>
+              <a:rPr lang="pt-BR" dirty="0" smtClean="0"/>
+              <a:t>.</a:t>
+            </a:r>
+            <a:endParaRPr lang="pt-BR" dirty="0"/>
+          </a:p>
+        </p:txBody>
+      </p:sp>
+      <p:sp>
+        <p:nvSpPr>
+          <p:cNvPr id="4" name="Slide Number Placeholder 3"/>
+          <p:cNvSpPr>
+            <a:spLocks noGrp="1"/>
+          </p:cNvSpPr>
+          <p:nvPr>
+            <p:ph type="sldNum" sz="quarter" idx="12"/>
+          </p:nvPr>
+        </p:nvSpPr>
+        <p:spPr/>
+        <p:txBody>
+          <a:bodyPr/>
+          <a:lstStyle/>
+          <a:p>
+            <a:fld id="{3D12642F-FC9C-42CD-9EE4-23EF85AE02E3}" type="slidenum">
+              <a:rPr lang="pt-BR" smtClean="0"/>
+              <a:pPr/>
+              <a:t>14</a:t>
+            </a:fld>
+            <a:endParaRPr lang="pt-BR"/>
+          </a:p>
+        </p:txBody>
+      </p:sp>
+      <p:pic>
+        <p:nvPicPr>
+          <p:cNvPr id="43010" name="Picture 2" descr="http://www.seleniumhq.org/images/big-logo.png"/>
+          <p:cNvPicPr>
+            <a:picLocks noChangeAspect="1" noChangeArrowheads="1"/>
+          </p:cNvPicPr>
+          <p:nvPr/>
+        </p:nvPicPr>
+        <p:blipFill>
+          <a:blip r:embed="rId2" cstate="print"/>
+          <a:srcRect/>
+          <a:stretch>
+            <a:fillRect/>
+          </a:stretch>
+        </p:blipFill>
+        <p:spPr bwMode="auto">
+          <a:xfrm>
+            <a:off x="3995936" y="3861048"/>
+            <a:ext cx="1905000" cy="1724025"/>
+          </a:xfrm>
+          <a:prstGeom prst="rect">
+            <a:avLst/>
+          </a:prstGeom>
+          <a:noFill/>
+        </p:spPr>
+      </p:pic>
+    </p:spTree>
+  </p:cSld>
+  <p:clrMapOvr>
+    <a:masterClrMapping/>
+  </p:clrMapOvr>
+</p:sld>
+</file>
+
+<file path=ppt/slides/slide15.xml><?xml version="1.0" encoding="utf-8"?>
+<p:sld xmlns:a="http://schemas.openxmlformats.org/drawingml/2006/main" xmlns:r="http://schemas.openxmlformats.org/officeDocument/2006/relationships" xmlns:p="http://schemas.openxmlformats.org/presentationml/2006/main">
+  <p:cSld>
+    <p:spTree>
+      <p:nvGrpSpPr>
+        <p:cNvPr id="1" name=""/>
+        <p:cNvGrpSpPr/>
+        <p:nvPr/>
+      </p:nvGrpSpPr>
+      <p:grpSpPr>
+        <a:xfrm>
+          <a:off x="0" y="0"/>
+          <a:ext cx="0" cy="0"/>
+          <a:chOff x="0" y="0"/>
+          <a:chExt cx="0" cy="0"/>
+        </a:xfrm>
+      </p:grpSpPr>
+      <p:sp>
+        <p:nvSpPr>
+          <p:cNvPr id="2" name="Title 1"/>
+          <p:cNvSpPr>
+            <a:spLocks noGrp="1"/>
+          </p:cNvSpPr>
+          <p:nvPr>
+            <p:ph type="title"/>
+          </p:nvPr>
+        </p:nvSpPr>
+        <p:spPr/>
+        <p:txBody>
+          <a:bodyPr/>
+          <a:lstStyle/>
+          <a:p>
+            <a:r>
+              <a:rPr lang="pt-BR" dirty="0" err="1" smtClean="0"/>
+              <a:t>JUnit</a:t>
+            </a:r>
+            <a:endParaRPr lang="pt-BR" dirty="0"/>
+          </a:p>
+        </p:txBody>
+      </p:sp>
+      <p:sp>
+        <p:nvSpPr>
+          <p:cNvPr id="3" name="Content Placeholder 2"/>
+          <p:cNvSpPr>
+            <a:spLocks noGrp="1"/>
+          </p:cNvSpPr>
+          <p:nvPr>
+            <p:ph idx="1"/>
+          </p:nvPr>
+        </p:nvSpPr>
+        <p:spPr/>
+        <p:txBody>
+          <a:bodyPr/>
+          <a:lstStyle/>
+          <a:p>
+            <a:r>
+              <a:rPr lang="pt-BR" dirty="0" smtClean="0"/>
+              <a:t>Framework open source para programas em Java</a:t>
+            </a:r>
+          </a:p>
+          <a:p>
+            <a:r>
+              <a:rPr lang="pt-BR" dirty="0" err="1" smtClean="0"/>
+              <a:t>IDEs</a:t>
+            </a:r>
+            <a:r>
+              <a:rPr lang="pt-BR" dirty="0" smtClean="0"/>
+              <a:t> com suporte: (permite uma área nativa para rodar os testes)</a:t>
+            </a:r>
+          </a:p>
+          <a:p>
+            <a:pPr lvl="1"/>
+            <a:r>
+              <a:rPr lang="pt-BR" dirty="0" err="1" smtClean="0"/>
+              <a:t>NetBeans</a:t>
+            </a:r>
+            <a:endParaRPr lang="pt-BR" dirty="0" smtClean="0"/>
+          </a:p>
+          <a:p>
+            <a:pPr lvl="1"/>
+            <a:r>
+              <a:rPr lang="pt-BR" dirty="0" smtClean="0"/>
+              <a:t>Eclipse</a:t>
+            </a:r>
+          </a:p>
+          <a:p>
+            <a:pPr lvl="1"/>
+            <a:r>
+              <a:rPr lang="pt-BR" dirty="0" err="1" smtClean="0"/>
+              <a:t>IntelliJ</a:t>
+            </a:r>
+            <a:r>
+              <a:rPr lang="pt-BR" dirty="0" smtClean="0"/>
+              <a:t> Idea</a:t>
+            </a:r>
+          </a:p>
+          <a:p>
+            <a:endParaRPr lang="pt-BR" dirty="0"/>
+          </a:p>
+        </p:txBody>
+      </p:sp>
+      <p:sp>
+        <p:nvSpPr>
+          <p:cNvPr id="4" name="Slide Number Placeholder 3"/>
+          <p:cNvSpPr>
+            <a:spLocks noGrp="1"/>
+          </p:cNvSpPr>
+          <p:nvPr>
+            <p:ph type="sldNum" sz="quarter" idx="12"/>
+          </p:nvPr>
+        </p:nvSpPr>
+        <p:spPr/>
+        <p:txBody>
+          <a:bodyPr/>
+          <a:lstStyle/>
+          <a:p>
+            <a:fld id="{3D12642F-FC9C-42CD-9EE4-23EF85AE02E3}" type="slidenum">
+              <a:rPr lang="pt-BR" smtClean="0"/>
+              <a:pPr/>
+              <a:t>15</a:t>
             </a:fld>
             <a:endParaRPr lang="pt-BR"/>
           </a:p>
@@ -5638,7 +5949,7 @@
 </p:sld>
 </file>
 
-<file path=ppt/slides/slide14.xml><?xml version="1.0" encoding="utf-8"?>
+<file path=ppt/slides/slide16.xml><?xml version="1.0" encoding="utf-8"?>
 <p:sld xmlns:a="http://schemas.openxmlformats.org/drawingml/2006/main" xmlns:r="http://schemas.openxmlformats.org/officeDocument/2006/relationships" xmlns:p="http://schemas.openxmlformats.org/presentationml/2006/main">
   <p:cSld>
     <p:spTree>
@@ -5705,7 +6016,6 @@
               <a:rPr lang="pt-BR" dirty="0" smtClean="0"/>
               <a:t> </a:t>
             </a:r>
-            <a:endParaRPr lang="pt-BR" dirty="0" smtClean="0"/>
           </a:p>
           <a:p>
             <a:r>
@@ -5731,13 +6041,8 @@
             <a:pPr lvl="1"/>
             <a:r>
               <a:rPr lang="pt-BR" dirty="0" smtClean="0"/>
-              <a:t>Valores </a:t>
-            </a:r>
-            <a:r>
-              <a:rPr lang="pt-BR" dirty="0" smtClean="0"/>
-              <a:t>Incorretos</a:t>
-            </a:r>
-            <a:endParaRPr lang="pt-BR" dirty="0" smtClean="0"/>
+              <a:t>Valores Incorretos</a:t>
+            </a:r>
           </a:p>
           <a:p>
             <a:endParaRPr lang="pt-BR" dirty="0" smtClean="0"/>
@@ -5762,7 +6067,7 @@
             <a:fld id="{3D12642F-FC9C-42CD-9EE4-23EF85AE02E3}" type="slidenum">
               <a:rPr lang="pt-BR" smtClean="0"/>
               <a:pPr/>
-              <a:t>14</a:t>
+              <a:t>16</a:t>
             </a:fld>
             <a:endParaRPr lang="pt-BR"/>
           </a:p>
@@ -5783,7 +6088,7 @@
 </p:sld>
 </file>
 
-<file path=ppt/slides/slide15.xml><?xml version="1.0" encoding="utf-8"?>
+<file path=ppt/slides/slide17.xml><?xml version="1.0" encoding="utf-8"?>
 <p:sld xmlns:a="http://schemas.openxmlformats.org/drawingml/2006/main" xmlns:r="http://schemas.openxmlformats.org/officeDocument/2006/relationships" xmlns:p="http://schemas.openxmlformats.org/presentationml/2006/main">
   <p:cSld>
     <p:spTree>
@@ -5852,7 +6157,6 @@
               <a:rPr lang="pt-BR" dirty="0" smtClean="0"/>
               <a:t> - @)</a:t>
             </a:r>
-            <a:endParaRPr lang="pt-BR" dirty="0" smtClean="0"/>
           </a:p>
           <a:p>
             <a:pPr lvl="1"/>
@@ -5918,11 +6222,7 @@
             </a:r>
             <a:r>
               <a:rPr lang="pt-BR" dirty="0" smtClean="0"/>
-              <a:t> ou para customizar as já existentes</a:t>
-            </a:r>
-            <a:r>
-              <a:rPr lang="pt-BR" dirty="0" smtClean="0"/>
-              <a:t>. Ex: </a:t>
+              <a:t> ou para customizar as já existentes. Ex: </a:t>
             </a:r>
             <a:r>
               <a:rPr lang="pt-BR" dirty="0" err="1" smtClean="0"/>
@@ -5953,7 +6253,7 @@
             <a:fld id="{3D12642F-FC9C-42CD-9EE4-23EF85AE02E3}" type="slidenum">
               <a:rPr lang="pt-BR" smtClean="0"/>
               <a:pPr/>
-              <a:t>15</a:t>
+              <a:t>17</a:t>
             </a:fld>
             <a:endParaRPr lang="pt-BR"/>
           </a:p>
@@ -6000,7 +6300,7 @@
 </p:sld>
 </file>
 
-<file path=ppt/slides/slide16.xml><?xml version="1.0" encoding="utf-8"?>
+<file path=ppt/slides/slide18.xml><?xml version="1.0" encoding="utf-8"?>
 <p:sld xmlns:a="http://schemas.openxmlformats.org/drawingml/2006/main" xmlns:r="http://schemas.openxmlformats.org/officeDocument/2006/relationships" xmlns:p="http://schemas.openxmlformats.org/presentationml/2006/main">
   <p:cSld>
     <p:spTree>
@@ -6077,7 +6377,7 @@
             <a:fld id="{3D12642F-FC9C-42CD-9EE4-23EF85AE02E3}" type="slidenum">
               <a:rPr lang="pt-BR" smtClean="0"/>
               <a:pPr/>
-              <a:t>16</a:t>
+              <a:t>18</a:t>
             </a:fld>
             <a:endParaRPr lang="pt-BR"/>
           </a:p>
@@ -6162,7 +6462,7 @@
 </p:sld>
 </file>
 
-<file path=ppt/slides/slide17.xml><?xml version="1.0" encoding="utf-8"?>
+<file path=ppt/slides/slide19.xml><?xml version="1.0" encoding="utf-8"?>
 <p:sld xmlns:a="http://schemas.openxmlformats.org/drawingml/2006/main" xmlns:r="http://schemas.openxmlformats.org/officeDocument/2006/relationships" xmlns:p="http://schemas.openxmlformats.org/presentationml/2006/main">
   <p:cSld>
     <p:spTree>
@@ -6239,7 +6539,7 @@
             <a:fld id="{3D12642F-FC9C-42CD-9EE4-23EF85AE02E3}" type="slidenum">
               <a:rPr lang="pt-BR" smtClean="0"/>
               <a:pPr/>
-              <a:t>17</a:t>
+              <a:t>19</a:t>
             </a:fld>
             <a:endParaRPr lang="pt-BR"/>
           </a:p>
@@ -6324,266 +6624,6 @@
 </p:sld>
 </file>
 
-<file path=ppt/slides/slide18.xml><?xml version="1.0" encoding="utf-8"?>
-<p:sld xmlns:a="http://schemas.openxmlformats.org/drawingml/2006/main" xmlns:r="http://schemas.openxmlformats.org/officeDocument/2006/relationships" xmlns:p="http://schemas.openxmlformats.org/presentationml/2006/main">
-  <p:cSld>
-    <p:spTree>
-      <p:nvGrpSpPr>
-        <p:cNvPr id="1" name=""/>
-        <p:cNvGrpSpPr/>
-        <p:nvPr/>
-      </p:nvGrpSpPr>
-      <p:grpSpPr>
-        <a:xfrm>
-          <a:off x="0" y="0"/>
-          <a:ext cx="0" cy="0"/>
-          <a:chOff x="0" y="0"/>
-          <a:chExt cx="0" cy="0"/>
-        </a:xfrm>
-      </p:grpSpPr>
-      <p:sp>
-        <p:nvSpPr>
-          <p:cNvPr id="2" name="Title 1"/>
-          <p:cNvSpPr>
-            <a:spLocks noGrp="1"/>
-          </p:cNvSpPr>
-          <p:nvPr>
-            <p:ph type="title"/>
-          </p:nvPr>
-        </p:nvSpPr>
-        <p:spPr/>
-        <p:txBody>
-          <a:bodyPr/>
-          <a:lstStyle/>
-          <a:p>
-            <a:r>
-              <a:rPr lang="pt-BR" dirty="0" smtClean="0"/>
-              <a:t>Exemplo</a:t>
-            </a:r>
-            <a:endParaRPr lang="pt-BR" dirty="0"/>
-          </a:p>
-        </p:txBody>
-      </p:sp>
-      <p:sp>
-        <p:nvSpPr>
-          <p:cNvPr id="3" name="Content Placeholder 2"/>
-          <p:cNvSpPr>
-            <a:spLocks noGrp="1"/>
-          </p:cNvSpPr>
-          <p:nvPr>
-            <p:ph idx="1"/>
-          </p:nvPr>
-        </p:nvSpPr>
-        <p:spPr/>
-        <p:txBody>
-          <a:bodyPr/>
-          <a:lstStyle/>
-          <a:p>
-            <a:endParaRPr lang="pt-BR"/>
-          </a:p>
-        </p:txBody>
-      </p:sp>
-      <p:sp>
-        <p:nvSpPr>
-          <p:cNvPr id="4" name="Slide Number Placeholder 3"/>
-          <p:cNvSpPr>
-            <a:spLocks noGrp="1"/>
-          </p:cNvSpPr>
-          <p:nvPr>
-            <p:ph type="sldNum" sz="quarter" idx="12"/>
-          </p:nvPr>
-        </p:nvSpPr>
-        <p:spPr/>
-        <p:txBody>
-          <a:bodyPr/>
-          <a:lstStyle/>
-          <a:p>
-            <a:fld id="{3D12642F-FC9C-42CD-9EE4-23EF85AE02E3}" type="slidenum">
-              <a:rPr lang="pt-BR" smtClean="0"/>
-              <a:pPr/>
-              <a:t>18</a:t>
-            </a:fld>
-            <a:endParaRPr lang="pt-BR"/>
-          </a:p>
-        </p:txBody>
-      </p:sp>
-      <p:pic>
-        <p:nvPicPr>
-          <p:cNvPr id="35842" name="Picture 2"/>
-          <p:cNvPicPr>
-            <a:picLocks noChangeAspect="1" noChangeArrowheads="1"/>
-          </p:cNvPicPr>
-          <p:nvPr/>
-        </p:nvPicPr>
-        <p:blipFill>
-          <a:blip r:embed="rId2" cstate="print"/>
-          <a:srcRect/>
-          <a:stretch>
-            <a:fillRect/>
-          </a:stretch>
-        </p:blipFill>
-        <p:spPr bwMode="auto">
-          <a:xfrm>
-            <a:off x="179512" y="1196752"/>
-            <a:ext cx="8663608" cy="5414755"/>
-          </a:xfrm>
-          <a:prstGeom prst="rect">
-            <a:avLst/>
-          </a:prstGeom>
-          <a:noFill/>
-          <a:ln w="9525">
-            <a:noFill/>
-            <a:miter lim="800000"/>
-            <a:headEnd/>
-            <a:tailEnd/>
-          </a:ln>
-        </p:spPr>
-      </p:pic>
-    </p:spTree>
-  </p:cSld>
-  <p:clrMapOvr>
-    <a:masterClrMapping/>
-  </p:clrMapOvr>
-  <p:timing>
-    <p:tnLst>
-      <p:par>
-        <p:cTn id="1" dur="indefinite" restart="never" nodeType="tmRoot"/>
-      </p:par>
-    </p:tnLst>
-  </p:timing>
-</p:sld>
-</file>
-
-<file path=ppt/slides/slide19.xml><?xml version="1.0" encoding="utf-8"?>
-<p:sld xmlns:a="http://schemas.openxmlformats.org/drawingml/2006/main" xmlns:r="http://schemas.openxmlformats.org/officeDocument/2006/relationships" xmlns:p="http://schemas.openxmlformats.org/presentationml/2006/main">
-  <p:cSld>
-    <p:spTree>
-      <p:nvGrpSpPr>
-        <p:cNvPr id="1" name=""/>
-        <p:cNvGrpSpPr/>
-        <p:nvPr/>
-      </p:nvGrpSpPr>
-      <p:grpSpPr>
-        <a:xfrm>
-          <a:off x="0" y="0"/>
-          <a:ext cx="0" cy="0"/>
-          <a:chOff x="0" y="0"/>
-          <a:chExt cx="0" cy="0"/>
-        </a:xfrm>
-      </p:grpSpPr>
-      <p:sp>
-        <p:nvSpPr>
-          <p:cNvPr id="2" name="Title 1"/>
-          <p:cNvSpPr>
-            <a:spLocks noGrp="1"/>
-          </p:cNvSpPr>
-          <p:nvPr>
-            <p:ph type="title"/>
-          </p:nvPr>
-        </p:nvSpPr>
-        <p:spPr/>
-        <p:txBody>
-          <a:bodyPr/>
-          <a:lstStyle/>
-          <a:p>
-            <a:r>
-              <a:rPr lang="pt-BR" dirty="0" smtClean="0"/>
-              <a:t>DOJO</a:t>
-            </a:r>
-            <a:endParaRPr lang="pt-BR" dirty="0"/>
-          </a:p>
-        </p:txBody>
-      </p:sp>
-      <p:sp>
-        <p:nvSpPr>
-          <p:cNvPr id="3" name="Content Placeholder 2"/>
-          <p:cNvSpPr>
-            <a:spLocks noGrp="1"/>
-          </p:cNvSpPr>
-          <p:nvPr>
-            <p:ph idx="1"/>
-          </p:nvPr>
-        </p:nvSpPr>
-        <p:spPr/>
-        <p:txBody>
-          <a:bodyPr/>
-          <a:lstStyle/>
-          <a:p>
-            <a:endParaRPr lang="pt-BR"/>
-          </a:p>
-        </p:txBody>
-      </p:sp>
-      <p:sp>
-        <p:nvSpPr>
-          <p:cNvPr id="4" name="Slide Number Placeholder 3"/>
-          <p:cNvSpPr>
-            <a:spLocks noGrp="1"/>
-          </p:cNvSpPr>
-          <p:nvPr>
-            <p:ph type="sldNum" sz="quarter" idx="12"/>
-          </p:nvPr>
-        </p:nvSpPr>
-        <p:spPr/>
-        <p:txBody>
-          <a:bodyPr/>
-          <a:lstStyle/>
-          <a:p>
-            <a:fld id="{3D12642F-FC9C-42CD-9EE4-23EF85AE02E3}" type="slidenum">
-              <a:rPr lang="pt-BR" smtClean="0"/>
-              <a:pPr/>
-              <a:t>19</a:t>
-            </a:fld>
-            <a:endParaRPr lang="pt-BR"/>
-          </a:p>
-        </p:txBody>
-      </p:sp>
-      <p:pic>
-        <p:nvPicPr>
-          <p:cNvPr id="36866" name="Picture 2"/>
-          <p:cNvPicPr>
-            <a:picLocks noChangeAspect="1" noChangeArrowheads="1"/>
-          </p:cNvPicPr>
-          <p:nvPr/>
-        </p:nvPicPr>
-        <p:blipFill>
-          <a:blip r:embed="rId2" cstate="print"/>
-          <a:srcRect/>
-          <a:stretch>
-            <a:fillRect/>
-          </a:stretch>
-        </p:blipFill>
-        <p:spPr bwMode="auto">
-          <a:xfrm>
-            <a:off x="1835696" y="1209153"/>
-            <a:ext cx="6697613" cy="5648847"/>
-          </a:xfrm>
-          <a:prstGeom prst="rect">
-            <a:avLst/>
-          </a:prstGeom>
-          <a:noFill/>
-          <a:ln w="9525">
-            <a:noFill/>
-            <a:miter lim="800000"/>
-            <a:headEnd/>
-            <a:tailEnd/>
-          </a:ln>
-        </p:spPr>
-      </p:pic>
-    </p:spTree>
-  </p:cSld>
-  <p:clrMapOvr>
-    <a:masterClrMapping/>
-  </p:clrMapOvr>
-  <p:timing>
-    <p:tnLst>
-      <p:par>
-        <p:cTn id="1" dur="indefinite" restart="never" nodeType="tmRoot"/>
-      </p:par>
-    </p:tnLst>
-  </p:timing>
-</p:sld>
-</file>
-
 <file path=ppt/slides/slide2.xml><?xml version="1.0" encoding="utf-8"?>
 <p:sld xmlns:a="http://schemas.openxmlformats.org/drawingml/2006/main" xmlns:r="http://schemas.openxmlformats.org/officeDocument/2006/relationships" xmlns:p="http://schemas.openxmlformats.org/presentationml/2006/main">
   <p:cSld>
@@ -6764,7 +6804,7 @@
           <a:p>
             <a:r>
               <a:rPr lang="pt-BR" dirty="0" smtClean="0"/>
-              <a:t>DOJO</a:t>
+              <a:t>Exemplo</a:t>
             </a:r>
             <a:endParaRPr lang="pt-BR" dirty="0"/>
           </a:p>
@@ -6785,56 +6825,7 @@
           <a:bodyPr/>
           <a:lstStyle/>
           <a:p>
-            <a:r>
-              <a:rPr lang="pt-BR" dirty="0" smtClean="0"/>
-              <a:t>Ambiente Seguro</a:t>
-            </a:r>
-          </a:p>
-          <a:p>
-            <a:r>
-              <a:rPr lang="pt-BR" dirty="0" smtClean="0"/>
-              <a:t>Aprendizado contínuo</a:t>
-            </a:r>
-          </a:p>
-          <a:p>
-            <a:r>
-              <a:rPr lang="pt-BR" dirty="0" smtClean="0"/>
-              <a:t>Regras:</a:t>
-            </a:r>
-          </a:p>
-          <a:p>
-            <a:pPr lvl="1"/>
-            <a:r>
-              <a:rPr lang="pt-BR" dirty="0" smtClean="0"/>
-              <a:t>Usar TDD</a:t>
-            </a:r>
-          </a:p>
-          <a:p>
-            <a:pPr lvl="1"/>
-            <a:r>
-              <a:rPr lang="pt-BR" dirty="0" smtClean="0"/>
-              <a:t>Baby </a:t>
-            </a:r>
-            <a:r>
-              <a:rPr lang="pt-BR" dirty="0" err="1" smtClean="0"/>
-              <a:t>Steps</a:t>
-            </a:r>
-            <a:endParaRPr lang="pt-BR" dirty="0" smtClean="0"/>
-          </a:p>
-          <a:p>
-            <a:pPr lvl="1"/>
-            <a:r>
-              <a:rPr lang="pt-BR" dirty="0" smtClean="0"/>
-              <a:t>Programação em Par</a:t>
-            </a:r>
-          </a:p>
-          <a:p>
-            <a:pPr lvl="1"/>
-            <a:r>
-              <a:rPr lang="pt-BR" dirty="0" smtClean="0"/>
-              <a:t>Todos devem entender</a:t>
-            </a:r>
-            <a:endParaRPr lang="pt-BR" dirty="0"/>
+            <a:endParaRPr lang="pt-BR"/>
           </a:p>
         </p:txBody>
       </p:sp>
@@ -6862,6 +6853,38 @@
           </a:p>
         </p:txBody>
       </p:sp>
+      <p:pic>
+        <p:nvPicPr>
+          <p:cNvPr id="35842" name="Picture 2"/>
+          <p:cNvPicPr>
+            <a:picLocks noChangeAspect="1" noChangeArrowheads="1"/>
+          </p:cNvPicPr>
+          <p:nvPr/>
+        </p:nvPicPr>
+        <p:blipFill>
+          <a:blip r:embed="rId2" cstate="print"/>
+          <a:srcRect/>
+          <a:stretch>
+            <a:fillRect/>
+          </a:stretch>
+        </p:blipFill>
+        <p:spPr bwMode="auto">
+          <a:xfrm>
+            <a:off x="179512" y="1196752"/>
+            <a:ext cx="8663608" cy="5414755"/>
+          </a:xfrm>
+          <a:prstGeom prst="rect">
+            <a:avLst/>
+          </a:prstGeom>
+          <a:noFill/>
+          <a:ln w="9525">
+            <a:noFill/>
+            <a:miter lim="800000"/>
+            <a:headEnd/>
+            <a:tailEnd/>
+          </a:ln>
+        </p:spPr>
+      </p:pic>
     </p:spTree>
   </p:cSld>
   <p:clrMapOvr>
@@ -6911,6 +6934,283 @@
           <a:p>
             <a:r>
               <a:rPr lang="pt-BR" dirty="0" smtClean="0"/>
+              <a:t>DOJO</a:t>
+            </a:r>
+            <a:endParaRPr lang="pt-BR" dirty="0"/>
+          </a:p>
+        </p:txBody>
+      </p:sp>
+      <p:sp>
+        <p:nvSpPr>
+          <p:cNvPr id="3" name="Content Placeholder 2"/>
+          <p:cNvSpPr>
+            <a:spLocks noGrp="1"/>
+          </p:cNvSpPr>
+          <p:nvPr>
+            <p:ph idx="1"/>
+          </p:nvPr>
+        </p:nvSpPr>
+        <p:spPr/>
+        <p:txBody>
+          <a:bodyPr/>
+          <a:lstStyle/>
+          <a:p>
+            <a:endParaRPr lang="pt-BR"/>
+          </a:p>
+        </p:txBody>
+      </p:sp>
+      <p:sp>
+        <p:nvSpPr>
+          <p:cNvPr id="4" name="Slide Number Placeholder 3"/>
+          <p:cNvSpPr>
+            <a:spLocks noGrp="1"/>
+          </p:cNvSpPr>
+          <p:nvPr>
+            <p:ph type="sldNum" sz="quarter" idx="12"/>
+          </p:nvPr>
+        </p:nvSpPr>
+        <p:spPr/>
+        <p:txBody>
+          <a:bodyPr/>
+          <a:lstStyle/>
+          <a:p>
+            <a:fld id="{3D12642F-FC9C-42CD-9EE4-23EF85AE02E3}" type="slidenum">
+              <a:rPr lang="pt-BR" smtClean="0"/>
+              <a:pPr/>
+              <a:t>21</a:t>
+            </a:fld>
+            <a:endParaRPr lang="pt-BR"/>
+          </a:p>
+        </p:txBody>
+      </p:sp>
+      <p:pic>
+        <p:nvPicPr>
+          <p:cNvPr id="36866" name="Picture 2"/>
+          <p:cNvPicPr>
+            <a:picLocks noChangeAspect="1" noChangeArrowheads="1"/>
+          </p:cNvPicPr>
+          <p:nvPr/>
+        </p:nvPicPr>
+        <p:blipFill>
+          <a:blip r:embed="rId2" cstate="print"/>
+          <a:srcRect/>
+          <a:stretch>
+            <a:fillRect/>
+          </a:stretch>
+        </p:blipFill>
+        <p:spPr bwMode="auto">
+          <a:xfrm>
+            <a:off x="1835696" y="1209153"/>
+            <a:ext cx="6697613" cy="5648847"/>
+          </a:xfrm>
+          <a:prstGeom prst="rect">
+            <a:avLst/>
+          </a:prstGeom>
+          <a:noFill/>
+          <a:ln w="9525">
+            <a:noFill/>
+            <a:miter lim="800000"/>
+            <a:headEnd/>
+            <a:tailEnd/>
+          </a:ln>
+        </p:spPr>
+      </p:pic>
+    </p:spTree>
+  </p:cSld>
+  <p:clrMapOvr>
+    <a:masterClrMapping/>
+  </p:clrMapOvr>
+  <p:timing>
+    <p:tnLst>
+      <p:par>
+        <p:cTn id="1" dur="indefinite" restart="never" nodeType="tmRoot"/>
+      </p:par>
+    </p:tnLst>
+  </p:timing>
+</p:sld>
+</file>
+
+<file path=ppt/slides/slide22.xml><?xml version="1.0" encoding="utf-8"?>
+<p:sld xmlns:a="http://schemas.openxmlformats.org/drawingml/2006/main" xmlns:r="http://schemas.openxmlformats.org/officeDocument/2006/relationships" xmlns:p="http://schemas.openxmlformats.org/presentationml/2006/main">
+  <p:cSld>
+    <p:spTree>
+      <p:nvGrpSpPr>
+        <p:cNvPr id="1" name=""/>
+        <p:cNvGrpSpPr/>
+        <p:nvPr/>
+      </p:nvGrpSpPr>
+      <p:grpSpPr>
+        <a:xfrm>
+          <a:off x="0" y="0"/>
+          <a:ext cx="0" cy="0"/>
+          <a:chOff x="0" y="0"/>
+          <a:chExt cx="0" cy="0"/>
+        </a:xfrm>
+      </p:grpSpPr>
+      <p:sp>
+        <p:nvSpPr>
+          <p:cNvPr id="2" name="Title 1"/>
+          <p:cNvSpPr>
+            <a:spLocks noGrp="1"/>
+          </p:cNvSpPr>
+          <p:nvPr>
+            <p:ph type="title"/>
+          </p:nvPr>
+        </p:nvSpPr>
+        <p:spPr/>
+        <p:txBody>
+          <a:bodyPr/>
+          <a:lstStyle/>
+          <a:p>
+            <a:r>
+              <a:rPr lang="pt-BR" dirty="0" smtClean="0"/>
+              <a:t>DOJO</a:t>
+            </a:r>
+            <a:endParaRPr lang="pt-BR" dirty="0"/>
+          </a:p>
+        </p:txBody>
+      </p:sp>
+      <p:sp>
+        <p:nvSpPr>
+          <p:cNvPr id="3" name="Content Placeholder 2"/>
+          <p:cNvSpPr>
+            <a:spLocks noGrp="1"/>
+          </p:cNvSpPr>
+          <p:nvPr>
+            <p:ph idx="1"/>
+          </p:nvPr>
+        </p:nvSpPr>
+        <p:spPr/>
+        <p:txBody>
+          <a:bodyPr/>
+          <a:lstStyle/>
+          <a:p>
+            <a:r>
+              <a:rPr lang="pt-BR" dirty="0" smtClean="0"/>
+              <a:t>Ambiente Seguro</a:t>
+            </a:r>
+          </a:p>
+          <a:p>
+            <a:r>
+              <a:rPr lang="pt-BR" dirty="0" smtClean="0"/>
+              <a:t>Aprendizado contínuo</a:t>
+            </a:r>
+          </a:p>
+          <a:p>
+            <a:r>
+              <a:rPr lang="pt-BR" dirty="0" smtClean="0"/>
+              <a:t>Regras:</a:t>
+            </a:r>
+          </a:p>
+          <a:p>
+            <a:pPr lvl="1"/>
+            <a:r>
+              <a:rPr lang="pt-BR" dirty="0" smtClean="0"/>
+              <a:t>Usar TDD</a:t>
+            </a:r>
+          </a:p>
+          <a:p>
+            <a:pPr lvl="1"/>
+            <a:r>
+              <a:rPr lang="pt-BR" dirty="0" smtClean="0"/>
+              <a:t>Baby </a:t>
+            </a:r>
+            <a:r>
+              <a:rPr lang="pt-BR" dirty="0" err="1" smtClean="0"/>
+              <a:t>Steps</a:t>
+            </a:r>
+            <a:endParaRPr lang="pt-BR" dirty="0" smtClean="0"/>
+          </a:p>
+          <a:p>
+            <a:pPr lvl="1"/>
+            <a:r>
+              <a:rPr lang="pt-BR" dirty="0" smtClean="0"/>
+              <a:t>Programação em Par</a:t>
+            </a:r>
+          </a:p>
+          <a:p>
+            <a:pPr lvl="1"/>
+            <a:r>
+              <a:rPr lang="pt-BR" dirty="0" smtClean="0"/>
+              <a:t>Todos devem entender</a:t>
+            </a:r>
+            <a:endParaRPr lang="pt-BR" dirty="0"/>
+          </a:p>
+        </p:txBody>
+      </p:sp>
+      <p:sp>
+        <p:nvSpPr>
+          <p:cNvPr id="4" name="Slide Number Placeholder 3"/>
+          <p:cNvSpPr>
+            <a:spLocks noGrp="1"/>
+          </p:cNvSpPr>
+          <p:nvPr>
+            <p:ph type="sldNum" sz="quarter" idx="12"/>
+          </p:nvPr>
+        </p:nvSpPr>
+        <p:spPr/>
+        <p:txBody>
+          <a:bodyPr/>
+          <a:lstStyle/>
+          <a:p>
+            <a:fld id="{3D12642F-FC9C-42CD-9EE4-23EF85AE02E3}" type="slidenum">
+              <a:rPr lang="pt-BR" smtClean="0"/>
+              <a:pPr/>
+              <a:t>22</a:t>
+            </a:fld>
+            <a:endParaRPr lang="pt-BR"/>
+          </a:p>
+        </p:txBody>
+      </p:sp>
+    </p:spTree>
+  </p:cSld>
+  <p:clrMapOvr>
+    <a:masterClrMapping/>
+  </p:clrMapOvr>
+  <p:timing>
+    <p:tnLst>
+      <p:par>
+        <p:cTn id="1" dur="indefinite" restart="never" nodeType="tmRoot"/>
+      </p:par>
+    </p:tnLst>
+  </p:timing>
+</p:sld>
+</file>
+
+<file path=ppt/slides/slide23.xml><?xml version="1.0" encoding="utf-8"?>
+<p:sld xmlns:a="http://schemas.openxmlformats.org/drawingml/2006/main" xmlns:r="http://schemas.openxmlformats.org/officeDocument/2006/relationships" xmlns:p="http://schemas.openxmlformats.org/presentationml/2006/main">
+  <p:cSld>
+    <p:spTree>
+      <p:nvGrpSpPr>
+        <p:cNvPr id="1" name=""/>
+        <p:cNvGrpSpPr/>
+        <p:nvPr/>
+      </p:nvGrpSpPr>
+      <p:grpSpPr>
+        <a:xfrm>
+          <a:off x="0" y="0"/>
+          <a:ext cx="0" cy="0"/>
+          <a:chOff x="0" y="0"/>
+          <a:chExt cx="0" cy="0"/>
+        </a:xfrm>
+      </p:grpSpPr>
+      <p:sp>
+        <p:nvSpPr>
+          <p:cNvPr id="2" name="Title 1"/>
+          <p:cNvSpPr>
+            <a:spLocks noGrp="1"/>
+          </p:cNvSpPr>
+          <p:nvPr>
+            <p:ph type="title"/>
+          </p:nvPr>
+        </p:nvSpPr>
+        <p:spPr/>
+        <p:txBody>
+          <a:bodyPr/>
+          <a:lstStyle/>
+          <a:p>
+            <a:r>
+              <a:rPr lang="pt-BR" dirty="0" smtClean="0"/>
               <a:t>Vamos praticar?</a:t>
             </a:r>
             <a:endParaRPr lang="pt-BR" dirty="0"/>
@@ -6959,7 +7259,7 @@
             <a:fld id="{3D12642F-FC9C-42CD-9EE4-23EF85AE02E3}" type="slidenum">
               <a:rPr lang="pt-BR" smtClean="0"/>
               <a:pPr/>
-              <a:t>21</a:t>
+              <a:t>23</a:t>
             </a:fld>
             <a:endParaRPr lang="pt-BR"/>
           </a:p>
@@ -7102,296 +7402,6 @@
 </p:sld>
 </file>
 
-<file path=ppt/slides/slide22.xml><?xml version="1.0" encoding="utf-8"?>
-<p:sld xmlns:a="http://schemas.openxmlformats.org/drawingml/2006/main" xmlns:r="http://schemas.openxmlformats.org/officeDocument/2006/relationships" xmlns:p="http://schemas.openxmlformats.org/presentationml/2006/main">
-  <p:cSld>
-    <p:spTree>
-      <p:nvGrpSpPr>
-        <p:cNvPr id="1" name=""/>
-        <p:cNvGrpSpPr/>
-        <p:nvPr/>
-      </p:nvGrpSpPr>
-      <p:grpSpPr>
-        <a:xfrm>
-          <a:off x="0" y="0"/>
-          <a:ext cx="0" cy="0"/>
-          <a:chOff x="0" y="0"/>
-          <a:chExt cx="0" cy="0"/>
-        </a:xfrm>
-      </p:grpSpPr>
-      <p:sp>
-        <p:nvSpPr>
-          <p:cNvPr id="2" name="Title 1"/>
-          <p:cNvSpPr>
-            <a:spLocks noGrp="1"/>
-          </p:cNvSpPr>
-          <p:nvPr>
-            <p:ph type="title"/>
-          </p:nvPr>
-        </p:nvSpPr>
-        <p:spPr/>
-        <p:txBody>
-          <a:bodyPr/>
-          <a:lstStyle/>
-          <a:p>
-            <a:r>
-              <a:rPr lang="pt-BR" dirty="0" smtClean="0"/>
-              <a:t>Fontes e Referencias</a:t>
-            </a:r>
-            <a:endParaRPr lang="pt-BR" dirty="0"/>
-          </a:p>
-        </p:txBody>
-      </p:sp>
-      <p:sp>
-        <p:nvSpPr>
-          <p:cNvPr id="3" name="Content Placeholder 2"/>
-          <p:cNvSpPr>
-            <a:spLocks noGrp="1"/>
-          </p:cNvSpPr>
-          <p:nvPr>
-            <p:ph idx="1"/>
-          </p:nvPr>
-        </p:nvSpPr>
-        <p:spPr/>
-        <p:txBody>
-          <a:bodyPr>
-            <a:normAutofit fontScale="92500" lnSpcReduction="10000"/>
-          </a:bodyPr>
-          <a:lstStyle/>
-          <a:p>
-            <a:r>
-              <a:rPr lang="pt-BR" dirty="0" smtClean="0"/>
-              <a:t>¹Qualidade de Software – Teoria e Prática” (ROCHA </a:t>
-            </a:r>
-            <a:r>
-              <a:rPr lang="pt-BR" i="1" dirty="0" err="1" smtClean="0"/>
-              <a:t>et</a:t>
-            </a:r>
-            <a:r>
-              <a:rPr lang="pt-BR" i="1" dirty="0" smtClean="0"/>
-              <a:t> al</a:t>
-            </a:r>
-            <a:r>
-              <a:rPr lang="pt-BR" dirty="0" smtClean="0"/>
-              <a:t>., 2001</a:t>
-            </a:r>
-            <a:r>
-              <a:rPr lang="pt-BR" dirty="0" smtClean="0"/>
-              <a:t>)</a:t>
-            </a:r>
-          </a:p>
-          <a:p>
-            <a:r>
-              <a:rPr lang="pt-BR" u="sng" dirty="0" smtClean="0">
-                <a:hlinkClick r:id="rId2"/>
-              </a:rPr>
-              <a:t>www.devmedia.com.br/artigo-engenharia-de-software-introducao-a-teste-de-software/8035</a:t>
-            </a:r>
-            <a:endParaRPr lang="pt-BR" dirty="0" smtClean="0"/>
-          </a:p>
-          <a:p>
-            <a:r>
-              <a:rPr lang="pt-BR" dirty="0" smtClean="0"/>
-              <a:t>Pressman</a:t>
-            </a:r>
-            <a:r>
-              <a:rPr lang="pt-BR" dirty="0" smtClean="0"/>
-              <a:t>, 2005</a:t>
-            </a:r>
-          </a:p>
-          <a:p>
-            <a:r>
-              <a:rPr lang="pt-BR" dirty="0" smtClean="0">
-                <a:hlinkClick r:id="rId3"/>
-              </a:rPr>
-              <a:t>https</a:t>
-            </a:r>
-            <a:r>
-              <a:rPr lang="pt-BR" dirty="0" smtClean="0">
-                <a:hlinkClick r:id="rId3"/>
-              </a:rPr>
-              <a:t>://prezi.com/.../desenvolvimento-orientado-a-testes</a:t>
-            </a:r>
-            <a:r>
-              <a:rPr lang="pt-BR" dirty="0" smtClean="0">
-                <a:hlinkClick r:id="rId3"/>
-              </a:rPr>
-              <a:t>.../</a:t>
-            </a:r>
-            <a:endParaRPr lang="pt-BR" dirty="0" smtClean="0"/>
-          </a:p>
-          <a:p>
-            <a:r>
-              <a:rPr lang="pt-BR" dirty="0" smtClean="0">
-                <a:hlinkClick r:id="rId4"/>
-              </a:rPr>
-              <a:t>https</a:t>
-            </a:r>
-            <a:r>
-              <a:rPr lang="pt-BR" dirty="0" smtClean="0">
-                <a:hlinkClick r:id="rId4"/>
-              </a:rPr>
-              <a:t>://github.com/.../getcomp-tdd-solucao/tree/master/src</a:t>
-            </a:r>
-            <a:endParaRPr lang="pt-BR" dirty="0" smtClean="0"/>
-          </a:p>
-          <a:p>
-            <a:endParaRPr lang="pt-BR" dirty="0"/>
-          </a:p>
-        </p:txBody>
-      </p:sp>
-      <p:sp>
-        <p:nvSpPr>
-          <p:cNvPr id="4" name="Slide Number Placeholder 3"/>
-          <p:cNvSpPr>
-            <a:spLocks noGrp="1"/>
-          </p:cNvSpPr>
-          <p:nvPr>
-            <p:ph type="sldNum" sz="quarter" idx="12"/>
-          </p:nvPr>
-        </p:nvSpPr>
-        <p:spPr/>
-        <p:txBody>
-          <a:bodyPr/>
-          <a:lstStyle/>
-          <a:p>
-            <a:fld id="{3D12642F-FC9C-42CD-9EE4-23EF85AE02E3}" type="slidenum">
-              <a:rPr lang="pt-BR" smtClean="0"/>
-              <a:pPr/>
-              <a:t>22</a:t>
-            </a:fld>
-            <a:endParaRPr lang="pt-BR"/>
-          </a:p>
-        </p:txBody>
-      </p:sp>
-    </p:spTree>
-  </p:cSld>
-  <p:clrMapOvr>
-    <a:masterClrMapping/>
-  </p:clrMapOvr>
-  <p:timing>
-    <p:tnLst>
-      <p:par>
-        <p:cTn id="1" dur="indefinite" restart="never" nodeType="tmRoot"/>
-      </p:par>
-    </p:tnLst>
-  </p:timing>
-</p:sld>
-</file>
-
-<file path=ppt/slides/slide23.xml><?xml version="1.0" encoding="utf-8"?>
-<p:sld xmlns:a="http://schemas.openxmlformats.org/drawingml/2006/main" xmlns:r="http://schemas.openxmlformats.org/officeDocument/2006/relationships" xmlns:p="http://schemas.openxmlformats.org/presentationml/2006/main">
-  <p:cSld>
-    <p:spTree>
-      <p:nvGrpSpPr>
-        <p:cNvPr id="1" name=""/>
-        <p:cNvGrpSpPr/>
-        <p:nvPr/>
-      </p:nvGrpSpPr>
-      <p:grpSpPr>
-        <a:xfrm>
-          <a:off x="0" y="0"/>
-          <a:ext cx="0" cy="0"/>
-          <a:chOff x="0" y="0"/>
-          <a:chExt cx="0" cy="0"/>
-        </a:xfrm>
-      </p:grpSpPr>
-      <p:sp>
-        <p:nvSpPr>
-          <p:cNvPr id="2" name="Title 1"/>
-          <p:cNvSpPr>
-            <a:spLocks noGrp="1"/>
-          </p:cNvSpPr>
-          <p:nvPr>
-            <p:ph type="title"/>
-          </p:nvPr>
-        </p:nvSpPr>
-        <p:spPr/>
-        <p:txBody>
-          <a:bodyPr/>
-          <a:lstStyle/>
-          <a:p>
-            <a:r>
-              <a:rPr lang="pt-BR" dirty="0" smtClean="0"/>
-              <a:t>Fontes e Referencias</a:t>
-            </a:r>
-            <a:endParaRPr lang="pt-BR" dirty="0"/>
-          </a:p>
-        </p:txBody>
-      </p:sp>
-      <p:sp>
-        <p:nvSpPr>
-          <p:cNvPr id="3" name="Content Placeholder 2"/>
-          <p:cNvSpPr>
-            <a:spLocks noGrp="1"/>
-          </p:cNvSpPr>
-          <p:nvPr>
-            <p:ph idx="1"/>
-          </p:nvPr>
-        </p:nvSpPr>
-        <p:spPr/>
-        <p:txBody>
-          <a:bodyPr/>
-          <a:lstStyle/>
-          <a:p>
-            <a:r>
-              <a:rPr lang="pt-BR" dirty="0" smtClean="0">
-                <a:hlinkClick r:id="rId2"/>
-              </a:rPr>
-              <a:t>http://junit.org</a:t>
-            </a:r>
-            <a:r>
-              <a:rPr lang="pt-BR" dirty="0" smtClean="0">
-                <a:hlinkClick r:id="rId2"/>
-              </a:rPr>
-              <a:t>/</a:t>
-            </a:r>
-            <a:endParaRPr lang="pt-BR" dirty="0" smtClean="0"/>
-          </a:p>
-          <a:p>
-            <a:endParaRPr lang="pt-BR" dirty="0"/>
-          </a:p>
-        </p:txBody>
-      </p:sp>
-      <p:sp>
-        <p:nvSpPr>
-          <p:cNvPr id="4" name="Slide Number Placeholder 3"/>
-          <p:cNvSpPr>
-            <a:spLocks noGrp="1"/>
-          </p:cNvSpPr>
-          <p:nvPr>
-            <p:ph type="sldNum" sz="quarter" idx="12"/>
-          </p:nvPr>
-        </p:nvSpPr>
-        <p:spPr/>
-        <p:txBody>
-          <a:bodyPr/>
-          <a:lstStyle/>
-          <a:p>
-            <a:fld id="{3D12642F-FC9C-42CD-9EE4-23EF85AE02E3}" type="slidenum">
-              <a:rPr lang="pt-BR" smtClean="0"/>
-              <a:pPr/>
-              <a:t>23</a:t>
-            </a:fld>
-            <a:endParaRPr lang="pt-BR"/>
-          </a:p>
-        </p:txBody>
-      </p:sp>
-    </p:spTree>
-  </p:cSld>
-  <p:clrMapOvr>
-    <a:masterClrMapping/>
-  </p:clrMapOvr>
-  <p:timing>
-    <p:tnLst>
-      <p:par>
-        <p:cTn id="1" dur="indefinite" restart="never" nodeType="tmRoot"/>
-      </p:par>
-    </p:tnLst>
-  </p:timing>
-</p:sld>
-</file>
-
 <file path=ppt/slides/slide24.xml><?xml version="1.0" encoding="utf-8"?>
 <p:sld xmlns:a="http://schemas.openxmlformats.org/drawingml/2006/main" xmlns:r="http://schemas.openxmlformats.org/officeDocument/2006/relationships" xmlns:p="http://schemas.openxmlformats.org/presentationml/2006/main">
   <p:cSld>
@@ -7426,7 +7436,7 @@
           <a:p>
             <a:r>
               <a:rPr lang="pt-BR" dirty="0" smtClean="0"/>
-              <a:t>Obrigado</a:t>
+              <a:t>Fontes e Referencias</a:t>
             </a:r>
             <a:endParaRPr lang="pt-BR" dirty="0"/>
           </a:p>
@@ -7444,10 +7454,63 @@
         </p:nvSpPr>
         <p:spPr/>
         <p:txBody>
-          <a:bodyPr/>
+          <a:bodyPr>
+            <a:normAutofit fontScale="92500" lnSpcReduction="10000"/>
+          </a:bodyPr>
           <a:lstStyle/>
           <a:p>
-            <a:endParaRPr lang="pt-BR"/>
+            <a:r>
+              <a:rPr lang="pt-BR" dirty="0" smtClean="0"/>
+              <a:t>¹Qualidade de Software – Teoria e Prática” (ROCHA </a:t>
+            </a:r>
+            <a:r>
+              <a:rPr lang="pt-BR" i="1" dirty="0" err="1" smtClean="0"/>
+              <a:t>et</a:t>
+            </a:r>
+            <a:r>
+              <a:rPr lang="pt-BR" i="1" dirty="0" smtClean="0"/>
+              <a:t> al</a:t>
+            </a:r>
+            <a:r>
+              <a:rPr lang="pt-BR" dirty="0" smtClean="0"/>
+              <a:t>., 2001)</a:t>
+            </a:r>
+          </a:p>
+          <a:p>
+            <a:r>
+              <a:rPr lang="pt-BR" u="sng" dirty="0" smtClean="0">
+                <a:hlinkClick r:id="rId2"/>
+              </a:rPr>
+              <a:t>www.devmedia.com.br/artigo-engenharia-de-software-introducao-a-teste-de-software/8035</a:t>
+            </a:r>
+            <a:endParaRPr lang="pt-BR" dirty="0" smtClean="0"/>
+          </a:p>
+          <a:p>
+            <a:r>
+              <a:rPr lang="pt-BR" dirty="0" smtClean="0"/>
+              <a:t>Pressman, 2005</a:t>
+            </a:r>
+          </a:p>
+          <a:p>
+            <a:r>
+              <a:rPr lang="pt-BR" dirty="0" smtClean="0">
+                <a:hlinkClick r:id="rId3"/>
+              </a:rPr>
+              <a:t>https://prezi.com/.../desenvolvimento-orientado-a-testes.../</a:t>
+            </a:r>
+            <a:endParaRPr lang="pt-BR" dirty="0" smtClean="0"/>
+          </a:p>
+          <a:p>
+            <a:r>
+              <a:rPr lang="pt-BR" dirty="0" smtClean="0">
+                <a:hlinkClick r:id="rId4"/>
+              </a:rPr>
+              <a:t>https://github.com/.../getcomp-tdd-solucao/tree/master/src</a:t>
+            </a:r>
+            <a:endParaRPr lang="pt-BR" dirty="0" smtClean="0"/>
+          </a:p>
+          <a:p>
+            <a:endParaRPr lang="pt-BR" dirty="0"/>
           </a:p>
         </p:txBody>
       </p:sp>
@@ -7470,6 +7533,211 @@
               <a:rPr lang="pt-BR" smtClean="0"/>
               <a:pPr/>
               <a:t>24</a:t>
+            </a:fld>
+            <a:endParaRPr lang="pt-BR"/>
+          </a:p>
+        </p:txBody>
+      </p:sp>
+    </p:spTree>
+  </p:cSld>
+  <p:clrMapOvr>
+    <a:masterClrMapping/>
+  </p:clrMapOvr>
+  <p:timing>
+    <p:tnLst>
+      <p:par>
+        <p:cTn id="1" dur="indefinite" restart="never" nodeType="tmRoot"/>
+      </p:par>
+    </p:tnLst>
+  </p:timing>
+</p:sld>
+</file>
+
+<file path=ppt/slides/slide25.xml><?xml version="1.0" encoding="utf-8"?>
+<p:sld xmlns:a="http://schemas.openxmlformats.org/drawingml/2006/main" xmlns:r="http://schemas.openxmlformats.org/officeDocument/2006/relationships" xmlns:p="http://schemas.openxmlformats.org/presentationml/2006/main">
+  <p:cSld>
+    <p:spTree>
+      <p:nvGrpSpPr>
+        <p:cNvPr id="1" name=""/>
+        <p:cNvGrpSpPr/>
+        <p:nvPr/>
+      </p:nvGrpSpPr>
+      <p:grpSpPr>
+        <a:xfrm>
+          <a:off x="0" y="0"/>
+          <a:ext cx="0" cy="0"/>
+          <a:chOff x="0" y="0"/>
+          <a:chExt cx="0" cy="0"/>
+        </a:xfrm>
+      </p:grpSpPr>
+      <p:sp>
+        <p:nvSpPr>
+          <p:cNvPr id="2" name="Title 1"/>
+          <p:cNvSpPr>
+            <a:spLocks noGrp="1"/>
+          </p:cNvSpPr>
+          <p:nvPr>
+            <p:ph type="title"/>
+          </p:nvPr>
+        </p:nvSpPr>
+        <p:spPr/>
+        <p:txBody>
+          <a:bodyPr/>
+          <a:lstStyle/>
+          <a:p>
+            <a:r>
+              <a:rPr lang="pt-BR" dirty="0" smtClean="0"/>
+              <a:t>Fontes e Referencias</a:t>
+            </a:r>
+            <a:endParaRPr lang="pt-BR" dirty="0"/>
+          </a:p>
+        </p:txBody>
+      </p:sp>
+      <p:sp>
+        <p:nvSpPr>
+          <p:cNvPr id="3" name="Content Placeholder 2"/>
+          <p:cNvSpPr>
+            <a:spLocks noGrp="1"/>
+          </p:cNvSpPr>
+          <p:nvPr>
+            <p:ph idx="1"/>
+          </p:nvPr>
+        </p:nvSpPr>
+        <p:spPr/>
+        <p:txBody>
+          <a:bodyPr/>
+          <a:lstStyle/>
+          <a:p>
+            <a:r>
+              <a:rPr lang="pt-BR" dirty="0" smtClean="0">
+                <a:hlinkClick r:id="rId2"/>
+              </a:rPr>
+              <a:t>http://junit.org/</a:t>
+            </a:r>
+            <a:endParaRPr lang="pt-BR" dirty="0" smtClean="0"/>
+          </a:p>
+          <a:p>
+            <a:endParaRPr lang="pt-BR" dirty="0"/>
+          </a:p>
+        </p:txBody>
+      </p:sp>
+      <p:sp>
+        <p:nvSpPr>
+          <p:cNvPr id="4" name="Slide Number Placeholder 3"/>
+          <p:cNvSpPr>
+            <a:spLocks noGrp="1"/>
+          </p:cNvSpPr>
+          <p:nvPr>
+            <p:ph type="sldNum" sz="quarter" idx="12"/>
+          </p:nvPr>
+        </p:nvSpPr>
+        <p:spPr/>
+        <p:txBody>
+          <a:bodyPr/>
+          <a:lstStyle/>
+          <a:p>
+            <a:fld id="{3D12642F-FC9C-42CD-9EE4-23EF85AE02E3}" type="slidenum">
+              <a:rPr lang="pt-BR" smtClean="0"/>
+              <a:pPr/>
+              <a:t>25</a:t>
+            </a:fld>
+            <a:endParaRPr lang="pt-BR"/>
+          </a:p>
+        </p:txBody>
+      </p:sp>
+    </p:spTree>
+  </p:cSld>
+  <p:clrMapOvr>
+    <a:masterClrMapping/>
+  </p:clrMapOvr>
+  <p:timing>
+    <p:tnLst>
+      <p:par>
+        <p:cTn id="1" dur="indefinite" restart="never" nodeType="tmRoot"/>
+      </p:par>
+    </p:tnLst>
+  </p:timing>
+</p:sld>
+</file>
+
+<file path=ppt/slides/slide26.xml><?xml version="1.0" encoding="utf-8"?>
+<p:sld xmlns:a="http://schemas.openxmlformats.org/drawingml/2006/main" xmlns:r="http://schemas.openxmlformats.org/officeDocument/2006/relationships" xmlns:p="http://schemas.openxmlformats.org/presentationml/2006/main">
+  <p:cSld>
+    <p:spTree>
+      <p:nvGrpSpPr>
+        <p:cNvPr id="1" name=""/>
+        <p:cNvGrpSpPr/>
+        <p:nvPr/>
+      </p:nvGrpSpPr>
+      <p:grpSpPr>
+        <a:xfrm>
+          <a:off x="0" y="0"/>
+          <a:ext cx="0" cy="0"/>
+          <a:chOff x="0" y="0"/>
+          <a:chExt cx="0" cy="0"/>
+        </a:xfrm>
+      </p:grpSpPr>
+      <p:sp>
+        <p:nvSpPr>
+          <p:cNvPr id="2" name="Title 1"/>
+          <p:cNvSpPr>
+            <a:spLocks noGrp="1"/>
+          </p:cNvSpPr>
+          <p:nvPr>
+            <p:ph type="title"/>
+          </p:nvPr>
+        </p:nvSpPr>
+        <p:spPr/>
+        <p:txBody>
+          <a:bodyPr/>
+          <a:lstStyle/>
+          <a:p>
+            <a:r>
+              <a:rPr lang="pt-BR" dirty="0" smtClean="0"/>
+              <a:t>Obrigado</a:t>
+            </a:r>
+            <a:endParaRPr lang="pt-BR" dirty="0"/>
+          </a:p>
+        </p:txBody>
+      </p:sp>
+      <p:sp>
+        <p:nvSpPr>
+          <p:cNvPr id="3" name="Content Placeholder 2"/>
+          <p:cNvSpPr>
+            <a:spLocks noGrp="1"/>
+          </p:cNvSpPr>
+          <p:nvPr>
+            <p:ph idx="1"/>
+          </p:nvPr>
+        </p:nvSpPr>
+        <p:spPr/>
+        <p:txBody>
+          <a:bodyPr/>
+          <a:lstStyle/>
+          <a:p>
+            <a:endParaRPr lang="pt-BR"/>
+          </a:p>
+        </p:txBody>
+      </p:sp>
+      <p:sp>
+        <p:nvSpPr>
+          <p:cNvPr id="4" name="Slide Number Placeholder 3"/>
+          <p:cNvSpPr>
+            <a:spLocks noGrp="1"/>
+          </p:cNvSpPr>
+          <p:nvPr>
+            <p:ph type="sldNum" sz="quarter" idx="12"/>
+          </p:nvPr>
+        </p:nvSpPr>
+        <p:spPr/>
+        <p:txBody>
+          <a:bodyPr/>
+          <a:lstStyle/>
+          <a:p>
+            <a:fld id="{3D12642F-FC9C-42CD-9EE4-23EF85AE02E3}" type="slidenum">
+              <a:rPr lang="pt-BR" smtClean="0"/>
+              <a:pPr/>
+              <a:t>26</a:t>
             </a:fld>
             <a:endParaRPr lang="pt-BR"/>
           </a:p>

</xml_diff>